<commit_message>
work in progress, still need to resolve eventuality
</commit_message>
<xml_diff>
--- a/public/documentation/sources/Hum.pptx
+++ b/public/documentation/sources/Hum.pptx
@@ -2136,7 +2136,7 @@
           <a:p>
             <a:fld id="{EA726304-1CAA-4280-8B62-A33B971AD302}" type="datetimeFigureOut">
               <a:rPr lang="en-US" smtClean="0"/>
-              <a:t>11/7/2019</a:t>
+              <a:t>11/12/2019</a:t>
             </a:fld>
             <a:endParaRPr lang="en-US"/>
           </a:p>
@@ -2334,7 +2334,7 @@
           <a:p>
             <a:fld id="{EA726304-1CAA-4280-8B62-A33B971AD302}" type="datetimeFigureOut">
               <a:rPr lang="en-US" smtClean="0"/>
-              <a:t>11/7/2019</a:t>
+              <a:t>11/12/2019</a:t>
             </a:fld>
             <a:endParaRPr lang="en-US"/>
           </a:p>
@@ -2542,7 +2542,7 @@
           <a:p>
             <a:fld id="{EA726304-1CAA-4280-8B62-A33B971AD302}" type="datetimeFigureOut">
               <a:rPr lang="en-US" smtClean="0"/>
-              <a:t>11/7/2019</a:t>
+              <a:t>11/12/2019</a:t>
             </a:fld>
             <a:endParaRPr lang="en-US"/>
           </a:p>
@@ -2740,7 +2740,7 @@
           <a:p>
             <a:fld id="{EA726304-1CAA-4280-8B62-A33B971AD302}" type="datetimeFigureOut">
               <a:rPr lang="en-US" smtClean="0"/>
-              <a:t>11/7/2019</a:t>
+              <a:t>11/12/2019</a:t>
             </a:fld>
             <a:endParaRPr lang="en-US"/>
           </a:p>
@@ -3015,7 +3015,7 @@
           <a:p>
             <a:fld id="{EA726304-1CAA-4280-8B62-A33B971AD302}" type="datetimeFigureOut">
               <a:rPr lang="en-US" smtClean="0"/>
-              <a:t>11/7/2019</a:t>
+              <a:t>11/12/2019</a:t>
             </a:fld>
             <a:endParaRPr lang="en-US"/>
           </a:p>
@@ -3280,7 +3280,7 @@
           <a:p>
             <a:fld id="{EA726304-1CAA-4280-8B62-A33B971AD302}" type="datetimeFigureOut">
               <a:rPr lang="en-US" smtClean="0"/>
-              <a:t>11/7/2019</a:t>
+              <a:t>11/12/2019</a:t>
             </a:fld>
             <a:endParaRPr lang="en-US"/>
           </a:p>
@@ -3692,7 +3692,7 @@
           <a:p>
             <a:fld id="{EA726304-1CAA-4280-8B62-A33B971AD302}" type="datetimeFigureOut">
               <a:rPr lang="en-US" smtClean="0"/>
-              <a:t>11/7/2019</a:t>
+              <a:t>11/12/2019</a:t>
             </a:fld>
             <a:endParaRPr lang="en-US"/>
           </a:p>
@@ -3833,7 +3833,7 @@
           <a:p>
             <a:fld id="{EA726304-1CAA-4280-8B62-A33B971AD302}" type="datetimeFigureOut">
               <a:rPr lang="en-US" smtClean="0"/>
-              <a:t>11/7/2019</a:t>
+              <a:t>11/12/2019</a:t>
             </a:fld>
             <a:endParaRPr lang="en-US"/>
           </a:p>
@@ -3946,7 +3946,7 @@
           <a:p>
             <a:fld id="{EA726304-1CAA-4280-8B62-A33B971AD302}" type="datetimeFigureOut">
               <a:rPr lang="en-US" smtClean="0"/>
-              <a:t>11/7/2019</a:t>
+              <a:t>11/12/2019</a:t>
             </a:fld>
             <a:endParaRPr lang="en-US"/>
           </a:p>
@@ -4257,7 +4257,7 @@
           <a:p>
             <a:fld id="{EA726304-1CAA-4280-8B62-A33B971AD302}" type="datetimeFigureOut">
               <a:rPr lang="en-US" smtClean="0"/>
-              <a:t>11/7/2019</a:t>
+              <a:t>11/12/2019</a:t>
             </a:fld>
             <a:endParaRPr lang="en-US"/>
           </a:p>
@@ -4545,7 +4545,7 @@
           <a:p>
             <a:fld id="{EA726304-1CAA-4280-8B62-A33B971AD302}" type="datetimeFigureOut">
               <a:rPr lang="en-US" smtClean="0"/>
-              <a:t>11/7/2019</a:t>
+              <a:t>11/12/2019</a:t>
             </a:fld>
             <a:endParaRPr lang="en-US"/>
           </a:p>
@@ -4786,7 +4786,7 @@
           <a:p>
             <a:fld id="{EA726304-1CAA-4280-8B62-A33B971AD302}" type="datetimeFigureOut">
               <a:rPr lang="en-US" smtClean="0"/>
-              <a:t>11/7/2019</a:t>
+              <a:t>11/12/2019</a:t>
             </a:fld>
             <a:endParaRPr lang="en-US"/>
           </a:p>
@@ -11763,7 +11763,7 @@
             <a:pPr lvl="1"/>
             <a:r>
               <a:rPr lang="en-US" dirty="0"/>
-              <a:t>Solve: A decision that solves the activity – </a:t>
+              <a:t>Solved: A decision that solves the activity – </a:t>
             </a:r>
             <a:r>
               <a:rPr lang="en-US" sz="2000" dirty="0">
@@ -11779,7 +11779,7 @@
             <a:pPr lvl="1"/>
             <a:r>
               <a:rPr lang="en-US" dirty="0"/>
-              <a:t>Fail: A decision that does not solve the activity – </a:t>
+              <a:t>Failed: A decision that does not solve the activity – </a:t>
             </a:r>
             <a:r>
               <a:rPr lang="en-US" sz="2000" dirty="0">
@@ -12548,7 +12548,7 @@
         </p:blipFill>
         <p:spPr>
           <a:xfrm>
-            <a:off x="0" y="377818"/>
+            <a:off x="0" y="359438"/>
             <a:ext cx="12192000" cy="6102363"/>
           </a:xfrm>
           <a:prstGeom prst="rect">
@@ -12755,6 +12755,114 @@
                 <a:schemeClr val="tx1"/>
               </a:solidFill>
             </a:endParaRPr>
+          </a:p>
+        </p:txBody>
+      </p:sp>
+      <p:sp>
+        <p:nvSpPr>
+          <p:cNvPr id="9" name="TextBox 8">
+            <a:extLst>
+              <a:ext uri="{FF2B5EF4-FFF2-40B4-BE49-F238E27FC236}">
+                <a16:creationId xmlns:a16="http://schemas.microsoft.com/office/drawing/2014/main" id="{6CA64E1F-14A1-451C-BDBF-B88A40223A9B}"/>
+              </a:ext>
+            </a:extLst>
+          </p:cNvPr>
+          <p:cNvSpPr txBox="1"/>
+          <p:nvPr/>
+        </p:nvSpPr>
+        <p:spPr>
+          <a:xfrm>
+            <a:off x="9195985" y="5016976"/>
+            <a:ext cx="828497" cy="369332"/>
+          </a:xfrm>
+          <a:prstGeom prst="rect">
+            <a:avLst/>
+          </a:prstGeom>
+          <a:noFill/>
+        </p:spPr>
+        <p:txBody>
+          <a:bodyPr wrap="none" rtlCol="0">
+            <a:spAutoFit/>
+          </a:bodyPr>
+          <a:lstStyle/>
+          <a:p>
+            <a:r>
+              <a:rPr lang="en-US" dirty="0"/>
+              <a:t>Reflow</a:t>
+            </a:r>
+          </a:p>
+        </p:txBody>
+      </p:sp>
+      <p:sp>
+        <p:nvSpPr>
+          <p:cNvPr id="10" name="TextBox 9">
+            <a:extLst>
+              <a:ext uri="{FF2B5EF4-FFF2-40B4-BE49-F238E27FC236}">
+                <a16:creationId xmlns:a16="http://schemas.microsoft.com/office/drawing/2014/main" id="{3BACD4C4-AA99-4A71-9101-E89121B97A08}"/>
+              </a:ext>
+            </a:extLst>
+          </p:cNvPr>
+          <p:cNvSpPr txBox="1"/>
+          <p:nvPr/>
+        </p:nvSpPr>
+        <p:spPr>
+          <a:xfrm>
+            <a:off x="10170886" y="4526079"/>
+            <a:ext cx="1110753" cy="307777"/>
+          </a:xfrm>
+          <a:prstGeom prst="rect">
+            <a:avLst/>
+          </a:prstGeom>
+          <a:solidFill>
+            <a:schemeClr val="bg1"/>
+          </a:solidFill>
+        </p:spPr>
+        <p:txBody>
+          <a:bodyPr wrap="none" rtlCol="0">
+            <a:spAutoFit/>
+          </a:bodyPr>
+          <a:lstStyle/>
+          <a:p>
+            <a:r>
+              <a:rPr lang="en-US" sz="1400" dirty="0"/>
+              <a:t>Control Flow</a:t>
+            </a:r>
+          </a:p>
+        </p:txBody>
+      </p:sp>
+      <p:sp>
+        <p:nvSpPr>
+          <p:cNvPr id="11" name="TextBox 10">
+            <a:extLst>
+              <a:ext uri="{FF2B5EF4-FFF2-40B4-BE49-F238E27FC236}">
+                <a16:creationId xmlns:a16="http://schemas.microsoft.com/office/drawing/2014/main" id="{6D423E12-0415-4751-99D0-410A1BF9A6CB}"/>
+              </a:ext>
+            </a:extLst>
+          </p:cNvPr>
+          <p:cNvSpPr txBox="1"/>
+          <p:nvPr/>
+        </p:nvSpPr>
+        <p:spPr>
+          <a:xfrm>
+            <a:off x="878405" y="3290768"/>
+            <a:ext cx="1352422" cy="369332"/>
+          </a:xfrm>
+          <a:prstGeom prst="rect">
+            <a:avLst/>
+          </a:prstGeom>
+          <a:noFill/>
+        </p:spPr>
+        <p:txBody>
+          <a:bodyPr wrap="none" rtlCol="0">
+            <a:spAutoFit/>
+          </a:bodyPr>
+          <a:lstStyle/>
+          <a:p>
+            <a:r>
+              <a:rPr lang="en-US" dirty="0" err="1"/>
+              <a:t>StateUpdate</a:t>
+            </a:r>
+            <a:endParaRPr lang="en-US" dirty="0"/>
           </a:p>
         </p:txBody>
       </p:sp>

</xml_diff>

<commit_message>
update ppt with master
</commit_message>
<xml_diff>
--- a/public/documentation/sources/Hum.pptx
+++ b/public/documentation/sources/Hum.pptx
@@ -6,11 +6,13 @@
   </p:sldMasterIdLst>
   <p:sldIdLst>
     <p:sldId id="256" r:id="rId2"/>
-    <p:sldId id="262" r:id="rId3"/>
-    <p:sldId id="257" r:id="rId4"/>
-    <p:sldId id="258" r:id="rId5"/>
-    <p:sldId id="259" r:id="rId6"/>
-    <p:sldId id="260" r:id="rId7"/>
+    <p:sldId id="264" r:id="rId3"/>
+    <p:sldId id="263" r:id="rId4"/>
+    <p:sldId id="262" r:id="rId5"/>
+    <p:sldId id="257" r:id="rId6"/>
+    <p:sldId id="258" r:id="rId7"/>
+    <p:sldId id="259" r:id="rId8"/>
+    <p:sldId id="260" r:id="rId9"/>
   </p:sldIdLst>
   <p:sldSz cx="12192000" cy="6858000"/>
   <p:notesSz cx="6858000" cy="9144000"/>
@@ -2136,7 +2138,7 @@
           <a:p>
             <a:fld id="{EA726304-1CAA-4280-8B62-A33B971AD302}" type="datetimeFigureOut">
               <a:rPr lang="en-US" smtClean="0"/>
-              <a:t>11/12/2019</a:t>
+              <a:t>11/13/2019</a:t>
             </a:fld>
             <a:endParaRPr lang="en-US"/>
           </a:p>
@@ -2334,7 +2336,7 @@
           <a:p>
             <a:fld id="{EA726304-1CAA-4280-8B62-A33B971AD302}" type="datetimeFigureOut">
               <a:rPr lang="en-US" smtClean="0"/>
-              <a:t>11/12/2019</a:t>
+              <a:t>11/13/2019</a:t>
             </a:fld>
             <a:endParaRPr lang="en-US"/>
           </a:p>
@@ -2542,7 +2544,7 @@
           <a:p>
             <a:fld id="{EA726304-1CAA-4280-8B62-A33B971AD302}" type="datetimeFigureOut">
               <a:rPr lang="en-US" smtClean="0"/>
-              <a:t>11/12/2019</a:t>
+              <a:t>11/13/2019</a:t>
             </a:fld>
             <a:endParaRPr lang="en-US"/>
           </a:p>
@@ -2740,7 +2742,7 @@
           <a:p>
             <a:fld id="{EA726304-1CAA-4280-8B62-A33B971AD302}" type="datetimeFigureOut">
               <a:rPr lang="en-US" smtClean="0"/>
-              <a:t>11/12/2019</a:t>
+              <a:t>11/13/2019</a:t>
             </a:fld>
             <a:endParaRPr lang="en-US"/>
           </a:p>
@@ -3015,7 +3017,7 @@
           <a:p>
             <a:fld id="{EA726304-1CAA-4280-8B62-A33B971AD302}" type="datetimeFigureOut">
               <a:rPr lang="en-US" smtClean="0"/>
-              <a:t>11/12/2019</a:t>
+              <a:t>11/13/2019</a:t>
             </a:fld>
             <a:endParaRPr lang="en-US"/>
           </a:p>
@@ -3280,7 +3282,7 @@
           <a:p>
             <a:fld id="{EA726304-1CAA-4280-8B62-A33B971AD302}" type="datetimeFigureOut">
               <a:rPr lang="en-US" smtClean="0"/>
-              <a:t>11/12/2019</a:t>
+              <a:t>11/13/2019</a:t>
             </a:fld>
             <a:endParaRPr lang="en-US"/>
           </a:p>
@@ -3692,7 +3694,7 @@
           <a:p>
             <a:fld id="{EA726304-1CAA-4280-8B62-A33B971AD302}" type="datetimeFigureOut">
               <a:rPr lang="en-US" smtClean="0"/>
-              <a:t>11/12/2019</a:t>
+              <a:t>11/13/2019</a:t>
             </a:fld>
             <a:endParaRPr lang="en-US"/>
           </a:p>
@@ -3833,7 +3835,7 @@
           <a:p>
             <a:fld id="{EA726304-1CAA-4280-8B62-A33B971AD302}" type="datetimeFigureOut">
               <a:rPr lang="en-US" smtClean="0"/>
-              <a:t>11/12/2019</a:t>
+              <a:t>11/13/2019</a:t>
             </a:fld>
             <a:endParaRPr lang="en-US"/>
           </a:p>
@@ -3946,7 +3948,7 @@
           <a:p>
             <a:fld id="{EA726304-1CAA-4280-8B62-A33B971AD302}" type="datetimeFigureOut">
               <a:rPr lang="en-US" smtClean="0"/>
-              <a:t>11/12/2019</a:t>
+              <a:t>11/13/2019</a:t>
             </a:fld>
             <a:endParaRPr lang="en-US"/>
           </a:p>
@@ -4257,7 +4259,7 @@
           <a:p>
             <a:fld id="{EA726304-1CAA-4280-8B62-A33B971AD302}" type="datetimeFigureOut">
               <a:rPr lang="en-US" smtClean="0"/>
-              <a:t>11/12/2019</a:t>
+              <a:t>11/13/2019</a:t>
             </a:fld>
             <a:endParaRPr lang="en-US"/>
           </a:p>
@@ -4545,7 +4547,7 @@
           <a:p>
             <a:fld id="{EA726304-1CAA-4280-8B62-A33B971AD302}" type="datetimeFigureOut">
               <a:rPr lang="en-US" smtClean="0"/>
-              <a:t>11/12/2019</a:t>
+              <a:t>11/13/2019</a:t>
             </a:fld>
             <a:endParaRPr lang="en-US"/>
           </a:p>
@@ -4786,7 +4788,7 @@
           <a:p>
             <a:fld id="{EA726304-1CAA-4280-8B62-A33B971AD302}" type="datetimeFigureOut">
               <a:rPr lang="en-US" smtClean="0"/>
-              <a:t>11/12/2019</a:t>
+              <a:t>11/13/2019</a:t>
             </a:fld>
             <a:endParaRPr lang="en-US"/>
           </a:p>
@@ -9493,6 +9495,2143 @@
           <a:chExt cx="0" cy="0"/>
         </a:xfrm>
       </p:grpSpPr>
+      <p:sp>
+        <p:nvSpPr>
+          <p:cNvPr id="2" name="Title 1">
+            <a:extLst>
+              <a:ext uri="{FF2B5EF4-FFF2-40B4-BE49-F238E27FC236}">
+                <a16:creationId xmlns:a16="http://schemas.microsoft.com/office/drawing/2014/main" id="{1C14ABA7-0161-45DD-9754-224D9F5A74C9}"/>
+              </a:ext>
+            </a:extLst>
+          </p:cNvPr>
+          <p:cNvSpPr>
+            <a:spLocks noGrp="1"/>
+          </p:cNvSpPr>
+          <p:nvPr>
+            <p:ph type="ctrTitle"/>
+          </p:nvPr>
+        </p:nvSpPr>
+        <p:spPr>
+          <a:xfrm>
+            <a:off x="1524000" y="165542"/>
+            <a:ext cx="9144000" cy="786565"/>
+          </a:xfrm>
+        </p:spPr>
+        <p:txBody>
+          <a:bodyPr>
+            <a:normAutofit fontScale="90000"/>
+          </a:bodyPr>
+          <a:lstStyle/>
+          <a:p>
+            <a:r>
+              <a:rPr lang="en-US" dirty="0" err="1"/>
+              <a:t>Parseq</a:t>
+            </a:r>
+            <a:endParaRPr lang="en-US" dirty="0"/>
+          </a:p>
+        </p:txBody>
+      </p:sp>
+      <p:sp>
+        <p:nvSpPr>
+          <p:cNvPr id="10" name="TextBox 9">
+            <a:extLst>
+              <a:ext uri="{FF2B5EF4-FFF2-40B4-BE49-F238E27FC236}">
+                <a16:creationId xmlns:a16="http://schemas.microsoft.com/office/drawing/2014/main" id="{B2A35F1C-3ACC-41FF-8632-486370A9612F}"/>
+              </a:ext>
+            </a:extLst>
+          </p:cNvPr>
+          <p:cNvSpPr txBox="1"/>
+          <p:nvPr/>
+        </p:nvSpPr>
+        <p:spPr>
+          <a:xfrm>
+            <a:off x="683241" y="4007966"/>
+            <a:ext cx="4496744" cy="461665"/>
+          </a:xfrm>
+          <a:prstGeom prst="rect">
+            <a:avLst/>
+          </a:prstGeom>
+          <a:noFill/>
+        </p:spPr>
+        <p:txBody>
+          <a:bodyPr wrap="none" rtlCol="0">
+            <a:spAutoFit/>
+          </a:bodyPr>
+          <a:lstStyle/>
+          <a:p>
+            <a:r>
+              <a:rPr lang="en-US" sz="2400" dirty="0"/>
+              <a:t>Sequence</a:t>
+            </a:r>
+            <a:r>
+              <a:rPr lang="en-US" dirty="0"/>
+              <a:t> (Fix-forward, all solves required)</a:t>
+            </a:r>
+            <a:endParaRPr lang="en-US" sz="2400" dirty="0"/>
+          </a:p>
+        </p:txBody>
+      </p:sp>
+      <p:sp>
+        <p:nvSpPr>
+          <p:cNvPr id="54" name="Oval 53">
+            <a:extLst>
+              <a:ext uri="{FF2B5EF4-FFF2-40B4-BE49-F238E27FC236}">
+                <a16:creationId xmlns:a16="http://schemas.microsoft.com/office/drawing/2014/main" id="{735F9DBA-5CB1-456C-96F2-65071332B2D1}"/>
+              </a:ext>
+            </a:extLst>
+          </p:cNvPr>
+          <p:cNvSpPr/>
+          <p:nvPr/>
+        </p:nvSpPr>
+        <p:spPr>
+          <a:xfrm>
+            <a:off x="839876" y="4852232"/>
+            <a:ext cx="170014" cy="170014"/>
+          </a:xfrm>
+          <a:prstGeom prst="ellipse">
+            <a:avLst/>
+          </a:prstGeom>
+        </p:spPr>
+        <p:style>
+          <a:lnRef idx="2">
+            <a:schemeClr val="dk1"/>
+          </a:lnRef>
+          <a:fillRef idx="1">
+            <a:schemeClr val="lt1"/>
+          </a:fillRef>
+          <a:effectRef idx="0">
+            <a:schemeClr val="dk1"/>
+          </a:effectRef>
+          <a:fontRef idx="minor">
+            <a:schemeClr val="dk1"/>
+          </a:fontRef>
+        </p:style>
+        <p:txBody>
+          <a:bodyPr rtlCol="0" anchor="ctr"/>
+          <a:lstStyle/>
+          <a:p>
+            <a:pPr algn="ctr"/>
+            <a:endParaRPr lang="en-US"/>
+          </a:p>
+        </p:txBody>
+      </p:sp>
+      <p:cxnSp>
+        <p:nvCxnSpPr>
+          <p:cNvPr id="55" name="Straight Arrow Connector 54">
+            <a:extLst>
+              <a:ext uri="{FF2B5EF4-FFF2-40B4-BE49-F238E27FC236}">
+                <a16:creationId xmlns:a16="http://schemas.microsoft.com/office/drawing/2014/main" id="{D22DFC66-F956-431F-A9C4-393DEC2B97B9}"/>
+              </a:ext>
+            </a:extLst>
+          </p:cNvPr>
+          <p:cNvCxnSpPr>
+            <a:cxnSpLocks/>
+            <a:stCxn id="54" idx="6"/>
+            <a:endCxn id="57" idx="1"/>
+          </p:cNvCxnSpPr>
+          <p:nvPr/>
+        </p:nvCxnSpPr>
+        <p:spPr>
+          <a:xfrm flipV="1">
+            <a:off x="1009890" y="4935906"/>
+            <a:ext cx="275163" cy="1333"/>
+          </a:xfrm>
+          <a:prstGeom prst="straightConnector1">
+            <a:avLst/>
+          </a:prstGeom>
+          <a:ln>
+            <a:tailEnd type="triangle"/>
+          </a:ln>
+        </p:spPr>
+        <p:style>
+          <a:lnRef idx="2">
+            <a:schemeClr val="dk1"/>
+          </a:lnRef>
+          <a:fillRef idx="1">
+            <a:schemeClr val="lt1"/>
+          </a:fillRef>
+          <a:effectRef idx="0">
+            <a:schemeClr val="dk1"/>
+          </a:effectRef>
+          <a:fontRef idx="minor">
+            <a:schemeClr val="dk1"/>
+          </a:fontRef>
+        </p:style>
+      </p:cxnSp>
+      <p:sp>
+        <p:nvSpPr>
+          <p:cNvPr id="57" name="Rectangle: Rounded Corners 56">
+            <a:extLst>
+              <a:ext uri="{FF2B5EF4-FFF2-40B4-BE49-F238E27FC236}">
+                <a16:creationId xmlns:a16="http://schemas.microsoft.com/office/drawing/2014/main" id="{C4FC3D41-817E-4298-8332-A0F369FB4A67}"/>
+              </a:ext>
+            </a:extLst>
+          </p:cNvPr>
+          <p:cNvSpPr/>
+          <p:nvPr/>
+        </p:nvSpPr>
+        <p:spPr>
+          <a:xfrm>
+            <a:off x="1285053" y="4748548"/>
+            <a:ext cx="1106481" cy="374715"/>
+          </a:xfrm>
+          <a:prstGeom prst="roundRect">
+            <a:avLst/>
+          </a:prstGeom>
+        </p:spPr>
+        <p:style>
+          <a:lnRef idx="2">
+            <a:schemeClr val="dk1"/>
+          </a:lnRef>
+          <a:fillRef idx="1">
+            <a:schemeClr val="lt1"/>
+          </a:fillRef>
+          <a:effectRef idx="0">
+            <a:schemeClr val="dk1"/>
+          </a:effectRef>
+          <a:fontRef idx="minor">
+            <a:schemeClr val="dk1"/>
+          </a:fontRef>
+        </p:style>
+        <p:txBody>
+          <a:bodyPr rtlCol="0" anchor="ctr"/>
+          <a:lstStyle/>
+          <a:p>
+            <a:r>
+              <a:rPr lang="en-US" sz="1200" dirty="0"/>
+              <a:t>Activity 1</a:t>
+            </a:r>
+          </a:p>
+        </p:txBody>
+      </p:sp>
+      <p:sp>
+        <p:nvSpPr>
+          <p:cNvPr id="58" name="Diamond 57">
+            <a:extLst>
+              <a:ext uri="{FF2B5EF4-FFF2-40B4-BE49-F238E27FC236}">
+                <a16:creationId xmlns:a16="http://schemas.microsoft.com/office/drawing/2014/main" id="{8B652205-9CD7-4D18-9A0A-F079DB665FAF}"/>
+              </a:ext>
+            </a:extLst>
+          </p:cNvPr>
+          <p:cNvSpPr/>
+          <p:nvPr/>
+        </p:nvSpPr>
+        <p:spPr>
+          <a:xfrm>
+            <a:off x="2076102" y="4798056"/>
+            <a:ext cx="275698" cy="275698"/>
+          </a:xfrm>
+          <a:prstGeom prst="diamond">
+            <a:avLst/>
+          </a:prstGeom>
+        </p:spPr>
+        <p:style>
+          <a:lnRef idx="2">
+            <a:schemeClr val="dk1"/>
+          </a:lnRef>
+          <a:fillRef idx="1">
+            <a:schemeClr val="lt1"/>
+          </a:fillRef>
+          <a:effectRef idx="0">
+            <a:schemeClr val="dk1"/>
+          </a:effectRef>
+          <a:fontRef idx="minor">
+            <a:schemeClr val="dk1"/>
+          </a:fontRef>
+        </p:style>
+        <p:txBody>
+          <a:bodyPr rtlCol="0" anchor="ctr"/>
+          <a:lstStyle/>
+          <a:p>
+            <a:endParaRPr lang="en-US"/>
+          </a:p>
+        </p:txBody>
+      </p:sp>
+      <p:sp>
+        <p:nvSpPr>
+          <p:cNvPr id="68" name="Rectangle: Rounded Corners 67">
+            <a:extLst>
+              <a:ext uri="{FF2B5EF4-FFF2-40B4-BE49-F238E27FC236}">
+                <a16:creationId xmlns:a16="http://schemas.microsoft.com/office/drawing/2014/main" id="{F3C08B52-8B1D-4C06-B038-ED3C7DB4B99F}"/>
+              </a:ext>
+            </a:extLst>
+          </p:cNvPr>
+          <p:cNvSpPr/>
+          <p:nvPr/>
+        </p:nvSpPr>
+        <p:spPr>
+          <a:xfrm>
+            <a:off x="4277961" y="4748547"/>
+            <a:ext cx="1170457" cy="374715"/>
+          </a:xfrm>
+          <a:prstGeom prst="roundRect">
+            <a:avLst/>
+          </a:prstGeom>
+        </p:spPr>
+        <p:style>
+          <a:lnRef idx="2">
+            <a:schemeClr val="dk1"/>
+          </a:lnRef>
+          <a:fillRef idx="1">
+            <a:schemeClr val="lt1"/>
+          </a:fillRef>
+          <a:effectRef idx="0">
+            <a:schemeClr val="dk1"/>
+          </a:effectRef>
+          <a:fontRef idx="minor">
+            <a:schemeClr val="dk1"/>
+          </a:fontRef>
+        </p:style>
+        <p:txBody>
+          <a:bodyPr rtlCol="0" anchor="ctr"/>
+          <a:lstStyle/>
+          <a:p>
+            <a:r>
+              <a:rPr lang="en-US" sz="1200" dirty="0"/>
+              <a:t>Activity 2</a:t>
+            </a:r>
+          </a:p>
+        </p:txBody>
+      </p:sp>
+      <p:sp>
+        <p:nvSpPr>
+          <p:cNvPr id="69" name="Diamond 68">
+            <a:extLst>
+              <a:ext uri="{FF2B5EF4-FFF2-40B4-BE49-F238E27FC236}">
+                <a16:creationId xmlns:a16="http://schemas.microsoft.com/office/drawing/2014/main" id="{CBBB397C-3253-4A13-B309-21C8E15A446D}"/>
+              </a:ext>
+            </a:extLst>
+          </p:cNvPr>
+          <p:cNvSpPr/>
+          <p:nvPr/>
+        </p:nvSpPr>
+        <p:spPr>
+          <a:xfrm>
+            <a:off x="5126896" y="4798055"/>
+            <a:ext cx="275698" cy="275698"/>
+          </a:xfrm>
+          <a:prstGeom prst="diamond">
+            <a:avLst/>
+          </a:prstGeom>
+        </p:spPr>
+        <p:style>
+          <a:lnRef idx="2">
+            <a:schemeClr val="dk1"/>
+          </a:lnRef>
+          <a:fillRef idx="1">
+            <a:schemeClr val="lt1"/>
+          </a:fillRef>
+          <a:effectRef idx="0">
+            <a:schemeClr val="dk1"/>
+          </a:effectRef>
+          <a:fontRef idx="minor">
+            <a:schemeClr val="dk1"/>
+          </a:fontRef>
+        </p:style>
+        <p:txBody>
+          <a:bodyPr rtlCol="0" anchor="ctr"/>
+          <a:lstStyle/>
+          <a:p>
+            <a:endParaRPr lang="en-US"/>
+          </a:p>
+        </p:txBody>
+      </p:sp>
+      <p:sp>
+        <p:nvSpPr>
+          <p:cNvPr id="72" name="Rectangle: Rounded Corners 71">
+            <a:extLst>
+              <a:ext uri="{FF2B5EF4-FFF2-40B4-BE49-F238E27FC236}">
+                <a16:creationId xmlns:a16="http://schemas.microsoft.com/office/drawing/2014/main" id="{565DB360-9004-4ED2-B4FD-07365E27B4D2}"/>
+              </a:ext>
+            </a:extLst>
+          </p:cNvPr>
+          <p:cNvSpPr/>
+          <p:nvPr/>
+        </p:nvSpPr>
+        <p:spPr>
+          <a:xfrm>
+            <a:off x="7369088" y="4748546"/>
+            <a:ext cx="1107149" cy="374715"/>
+          </a:xfrm>
+          <a:prstGeom prst="roundRect">
+            <a:avLst/>
+          </a:prstGeom>
+        </p:spPr>
+        <p:style>
+          <a:lnRef idx="2">
+            <a:schemeClr val="dk1"/>
+          </a:lnRef>
+          <a:fillRef idx="1">
+            <a:schemeClr val="lt1"/>
+          </a:fillRef>
+          <a:effectRef idx="0">
+            <a:schemeClr val="dk1"/>
+          </a:effectRef>
+          <a:fontRef idx="minor">
+            <a:schemeClr val="dk1"/>
+          </a:fontRef>
+        </p:style>
+        <p:txBody>
+          <a:bodyPr rtlCol="0" anchor="ctr"/>
+          <a:lstStyle/>
+          <a:p>
+            <a:r>
+              <a:rPr lang="en-US" sz="1200" dirty="0"/>
+              <a:t>Activity 3</a:t>
+            </a:r>
+          </a:p>
+        </p:txBody>
+      </p:sp>
+      <p:cxnSp>
+        <p:nvCxnSpPr>
+          <p:cNvPr id="74" name="Straight Arrow Connector 73">
+            <a:extLst>
+              <a:ext uri="{FF2B5EF4-FFF2-40B4-BE49-F238E27FC236}">
+                <a16:creationId xmlns:a16="http://schemas.microsoft.com/office/drawing/2014/main" id="{39A80621-31ED-4A93-8064-437131DCBE80}"/>
+              </a:ext>
+            </a:extLst>
+          </p:cNvPr>
+          <p:cNvCxnSpPr>
+            <a:cxnSpLocks/>
+            <a:stCxn id="168" idx="3"/>
+            <a:endCxn id="82" idx="2"/>
+          </p:cNvCxnSpPr>
+          <p:nvPr/>
+        </p:nvCxnSpPr>
+        <p:spPr>
+          <a:xfrm flipV="1">
+            <a:off x="8444072" y="4933898"/>
+            <a:ext cx="1667448" cy="7543"/>
+          </a:xfrm>
+          <a:prstGeom prst="straightConnector1">
+            <a:avLst/>
+          </a:prstGeom>
+          <a:ln>
+            <a:tailEnd type="triangle"/>
+          </a:ln>
+        </p:spPr>
+        <p:style>
+          <a:lnRef idx="2">
+            <a:schemeClr val="dk1"/>
+          </a:lnRef>
+          <a:fillRef idx="1">
+            <a:schemeClr val="lt1"/>
+          </a:fillRef>
+          <a:effectRef idx="0">
+            <a:schemeClr val="dk1"/>
+          </a:effectRef>
+          <a:fontRef idx="minor">
+            <a:schemeClr val="dk1"/>
+          </a:fontRef>
+        </p:style>
+      </p:cxnSp>
+      <p:cxnSp>
+        <p:nvCxnSpPr>
+          <p:cNvPr id="75" name="Straight Arrow Connector 74">
+            <a:extLst>
+              <a:ext uri="{FF2B5EF4-FFF2-40B4-BE49-F238E27FC236}">
+                <a16:creationId xmlns:a16="http://schemas.microsoft.com/office/drawing/2014/main" id="{944F0AFD-D16B-4A21-95DD-CAA08DE5FED0}"/>
+              </a:ext>
+            </a:extLst>
+          </p:cNvPr>
+          <p:cNvCxnSpPr>
+            <a:cxnSpLocks/>
+            <a:stCxn id="58" idx="3"/>
+            <a:endCxn id="68" idx="1"/>
+          </p:cNvCxnSpPr>
+          <p:nvPr/>
+        </p:nvCxnSpPr>
+        <p:spPr>
+          <a:xfrm>
+            <a:off x="2351800" y="4935905"/>
+            <a:ext cx="1926161" cy="0"/>
+          </a:xfrm>
+          <a:prstGeom prst="straightConnector1">
+            <a:avLst/>
+          </a:prstGeom>
+          <a:ln>
+            <a:tailEnd type="triangle"/>
+          </a:ln>
+        </p:spPr>
+        <p:style>
+          <a:lnRef idx="2">
+            <a:schemeClr val="dk1"/>
+          </a:lnRef>
+          <a:fillRef idx="1">
+            <a:schemeClr val="lt1"/>
+          </a:fillRef>
+          <a:effectRef idx="0">
+            <a:schemeClr val="dk1"/>
+          </a:effectRef>
+          <a:fontRef idx="minor">
+            <a:schemeClr val="dk1"/>
+          </a:fontRef>
+        </p:style>
+      </p:cxnSp>
+      <p:cxnSp>
+        <p:nvCxnSpPr>
+          <p:cNvPr id="78" name="Straight Arrow Connector 77">
+            <a:extLst>
+              <a:ext uri="{FF2B5EF4-FFF2-40B4-BE49-F238E27FC236}">
+                <a16:creationId xmlns:a16="http://schemas.microsoft.com/office/drawing/2014/main" id="{C9E32D5B-F5A8-496D-97F8-E51E8844E558}"/>
+              </a:ext>
+            </a:extLst>
+          </p:cNvPr>
+          <p:cNvCxnSpPr>
+            <a:cxnSpLocks/>
+            <a:stCxn id="69" idx="3"/>
+            <a:endCxn id="72" idx="1"/>
+          </p:cNvCxnSpPr>
+          <p:nvPr/>
+        </p:nvCxnSpPr>
+        <p:spPr>
+          <a:xfrm>
+            <a:off x="5402594" y="4935904"/>
+            <a:ext cx="1966494" cy="0"/>
+          </a:xfrm>
+          <a:prstGeom prst="straightConnector1">
+            <a:avLst/>
+          </a:prstGeom>
+          <a:ln>
+            <a:tailEnd type="triangle"/>
+          </a:ln>
+        </p:spPr>
+        <p:style>
+          <a:lnRef idx="2">
+            <a:schemeClr val="dk1"/>
+          </a:lnRef>
+          <a:fillRef idx="1">
+            <a:schemeClr val="lt1"/>
+          </a:fillRef>
+          <a:effectRef idx="0">
+            <a:schemeClr val="dk1"/>
+          </a:effectRef>
+          <a:fontRef idx="minor">
+            <a:schemeClr val="dk1"/>
+          </a:fontRef>
+        </p:style>
+      </p:cxnSp>
+      <p:sp>
+        <p:nvSpPr>
+          <p:cNvPr id="82" name="Oval 81">
+            <a:extLst>
+              <a:ext uri="{FF2B5EF4-FFF2-40B4-BE49-F238E27FC236}">
+                <a16:creationId xmlns:a16="http://schemas.microsoft.com/office/drawing/2014/main" id="{74AC24E2-DC44-468E-977C-792F73D705DD}"/>
+              </a:ext>
+            </a:extLst>
+          </p:cNvPr>
+          <p:cNvSpPr/>
+          <p:nvPr/>
+        </p:nvSpPr>
+        <p:spPr>
+          <a:xfrm>
+            <a:off x="10111520" y="4848891"/>
+            <a:ext cx="170014" cy="170014"/>
+          </a:xfrm>
+          <a:prstGeom prst="ellipse">
+            <a:avLst/>
+          </a:prstGeom>
+        </p:spPr>
+        <p:style>
+          <a:lnRef idx="2">
+            <a:schemeClr val="dk1">
+              <a:shade val="50000"/>
+            </a:schemeClr>
+          </a:lnRef>
+          <a:fillRef idx="1">
+            <a:schemeClr val="dk1"/>
+          </a:fillRef>
+          <a:effectRef idx="0">
+            <a:schemeClr val="dk1"/>
+          </a:effectRef>
+          <a:fontRef idx="minor">
+            <a:schemeClr val="lt1"/>
+          </a:fontRef>
+        </p:style>
+        <p:txBody>
+          <a:bodyPr rtlCol="0" anchor="ctr"/>
+          <a:lstStyle/>
+          <a:p>
+            <a:pPr algn="ctr"/>
+            <a:endParaRPr lang="en-US"/>
+          </a:p>
+        </p:txBody>
+      </p:sp>
+      <p:sp>
+        <p:nvSpPr>
+          <p:cNvPr id="88" name="Oval 87">
+            <a:extLst>
+              <a:ext uri="{FF2B5EF4-FFF2-40B4-BE49-F238E27FC236}">
+                <a16:creationId xmlns:a16="http://schemas.microsoft.com/office/drawing/2014/main" id="{C15C70EF-7B4C-473F-887A-9FDB64EAE99B}"/>
+              </a:ext>
+            </a:extLst>
+          </p:cNvPr>
+          <p:cNvSpPr/>
+          <p:nvPr/>
+        </p:nvSpPr>
+        <p:spPr>
+          <a:xfrm>
+            <a:off x="10111520" y="5409696"/>
+            <a:ext cx="170014" cy="170014"/>
+          </a:xfrm>
+          <a:prstGeom prst="ellipse">
+            <a:avLst/>
+          </a:prstGeom>
+          <a:solidFill>
+            <a:schemeClr val="bg1"/>
+          </a:solidFill>
+          <a:ln>
+            <a:prstDash val="sysDash"/>
+          </a:ln>
+        </p:spPr>
+        <p:style>
+          <a:lnRef idx="2">
+            <a:schemeClr val="dk1">
+              <a:shade val="50000"/>
+            </a:schemeClr>
+          </a:lnRef>
+          <a:fillRef idx="1">
+            <a:schemeClr val="dk1"/>
+          </a:fillRef>
+          <a:effectRef idx="0">
+            <a:schemeClr val="dk1"/>
+          </a:effectRef>
+          <a:fontRef idx="minor">
+            <a:schemeClr val="lt1"/>
+          </a:fontRef>
+        </p:style>
+        <p:txBody>
+          <a:bodyPr rtlCol="0" anchor="ctr"/>
+          <a:lstStyle/>
+          <a:p>
+            <a:pPr algn="ctr"/>
+            <a:endParaRPr lang="en-US"/>
+          </a:p>
+        </p:txBody>
+      </p:sp>
+      <p:cxnSp>
+        <p:nvCxnSpPr>
+          <p:cNvPr id="89" name="Connector: Elbow 88">
+            <a:extLst>
+              <a:ext uri="{FF2B5EF4-FFF2-40B4-BE49-F238E27FC236}">
+                <a16:creationId xmlns:a16="http://schemas.microsoft.com/office/drawing/2014/main" id="{01FF7671-B6C8-4B3F-B0E7-BC0A18A9CC1B}"/>
+              </a:ext>
+            </a:extLst>
+          </p:cNvPr>
+          <p:cNvCxnSpPr>
+            <a:cxnSpLocks/>
+            <a:stCxn id="58" idx="2"/>
+            <a:endCxn id="88" idx="2"/>
+          </p:cNvCxnSpPr>
+          <p:nvPr/>
+        </p:nvCxnSpPr>
+        <p:spPr>
+          <a:xfrm rot="16200000" flipH="1">
+            <a:off x="5952261" y="1335443"/>
+            <a:ext cx="420949" cy="7897569"/>
+          </a:xfrm>
+          <a:prstGeom prst="bentConnector2">
+            <a:avLst/>
+          </a:prstGeom>
+          <a:ln>
+            <a:prstDash val="sysDash"/>
+            <a:tailEnd type="triangle"/>
+          </a:ln>
+        </p:spPr>
+        <p:style>
+          <a:lnRef idx="2">
+            <a:schemeClr val="dk1"/>
+          </a:lnRef>
+          <a:fillRef idx="1">
+            <a:schemeClr val="lt1"/>
+          </a:fillRef>
+          <a:effectRef idx="0">
+            <a:schemeClr val="dk1"/>
+          </a:effectRef>
+          <a:fontRef idx="minor">
+            <a:schemeClr val="dk1"/>
+          </a:fontRef>
+        </p:style>
+      </p:cxnSp>
+      <p:cxnSp>
+        <p:nvCxnSpPr>
+          <p:cNvPr id="92" name="Connector: Elbow 91">
+            <a:extLst>
+              <a:ext uri="{FF2B5EF4-FFF2-40B4-BE49-F238E27FC236}">
+                <a16:creationId xmlns:a16="http://schemas.microsoft.com/office/drawing/2014/main" id="{479E5507-7E38-47AC-8168-F1FABD7D076D}"/>
+              </a:ext>
+            </a:extLst>
+          </p:cNvPr>
+          <p:cNvCxnSpPr>
+            <a:cxnSpLocks/>
+            <a:stCxn id="69" idx="2"/>
+            <a:endCxn id="88" idx="2"/>
+          </p:cNvCxnSpPr>
+          <p:nvPr/>
+        </p:nvCxnSpPr>
+        <p:spPr>
+          <a:xfrm rot="16200000" flipH="1">
+            <a:off x="7477657" y="2860840"/>
+            <a:ext cx="420950" cy="4846775"/>
+          </a:xfrm>
+          <a:prstGeom prst="bentConnector2">
+            <a:avLst/>
+          </a:prstGeom>
+          <a:ln>
+            <a:prstDash val="dashDot"/>
+            <a:tailEnd type="triangle"/>
+          </a:ln>
+        </p:spPr>
+        <p:style>
+          <a:lnRef idx="2">
+            <a:schemeClr val="dk1"/>
+          </a:lnRef>
+          <a:fillRef idx="1">
+            <a:schemeClr val="lt1"/>
+          </a:fillRef>
+          <a:effectRef idx="0">
+            <a:schemeClr val="dk1"/>
+          </a:effectRef>
+          <a:fontRef idx="minor">
+            <a:schemeClr val="dk1"/>
+          </a:fontRef>
+        </p:style>
+      </p:cxnSp>
+      <p:sp>
+        <p:nvSpPr>
+          <p:cNvPr id="158" name="Rectangle 157">
+            <a:extLst>
+              <a:ext uri="{FF2B5EF4-FFF2-40B4-BE49-F238E27FC236}">
+                <a16:creationId xmlns:a16="http://schemas.microsoft.com/office/drawing/2014/main" id="{086731A4-E1F1-432D-ACD5-64FDEEFF49C0}"/>
+              </a:ext>
+            </a:extLst>
+          </p:cNvPr>
+          <p:cNvSpPr/>
+          <p:nvPr/>
+        </p:nvSpPr>
+        <p:spPr>
+          <a:xfrm>
+            <a:off x="5754429" y="4330404"/>
+            <a:ext cx="1388970" cy="307777"/>
+          </a:xfrm>
+          <a:prstGeom prst="rect">
+            <a:avLst/>
+          </a:prstGeom>
+        </p:spPr>
+        <p:txBody>
+          <a:bodyPr wrap="none">
+            <a:spAutoFit/>
+          </a:bodyPr>
+          <a:lstStyle/>
+          <a:p>
+            <a:r>
+              <a:rPr lang="en-US" sz="1400" b="1" dirty="0"/>
+              <a:t>All are required.</a:t>
+            </a:r>
+          </a:p>
+        </p:txBody>
+      </p:sp>
+      <p:sp>
+        <p:nvSpPr>
+          <p:cNvPr id="159" name="Rectangle 158">
+            <a:extLst>
+              <a:ext uri="{FF2B5EF4-FFF2-40B4-BE49-F238E27FC236}">
+                <a16:creationId xmlns:a16="http://schemas.microsoft.com/office/drawing/2014/main" id="{B79D64FB-3C90-4F49-ACEC-F1428DFA0C9D}"/>
+              </a:ext>
+            </a:extLst>
+          </p:cNvPr>
+          <p:cNvSpPr/>
+          <p:nvPr/>
+        </p:nvSpPr>
+        <p:spPr>
+          <a:xfrm>
+            <a:off x="3814131" y="5612550"/>
+            <a:ext cx="1203471" cy="307777"/>
+          </a:xfrm>
+          <a:prstGeom prst="rect">
+            <a:avLst/>
+          </a:prstGeom>
+        </p:spPr>
+        <p:txBody>
+          <a:bodyPr wrap="none">
+            <a:spAutoFit/>
+          </a:bodyPr>
+          <a:lstStyle/>
+          <a:p>
+            <a:r>
+              <a:rPr lang="en-US" sz="1400" b="1" dirty="0"/>
+              <a:t>None can fail.</a:t>
+            </a:r>
+          </a:p>
+        </p:txBody>
+      </p:sp>
+      <p:sp>
+        <p:nvSpPr>
+          <p:cNvPr id="168" name="Diamond 167">
+            <a:extLst>
+              <a:ext uri="{FF2B5EF4-FFF2-40B4-BE49-F238E27FC236}">
+                <a16:creationId xmlns:a16="http://schemas.microsoft.com/office/drawing/2014/main" id="{931BD952-1907-4136-A093-336F73B27107}"/>
+              </a:ext>
+            </a:extLst>
+          </p:cNvPr>
+          <p:cNvSpPr/>
+          <p:nvPr/>
+        </p:nvSpPr>
+        <p:spPr>
+          <a:xfrm>
+            <a:off x="8168374" y="4803592"/>
+            <a:ext cx="275698" cy="275698"/>
+          </a:xfrm>
+          <a:prstGeom prst="diamond">
+            <a:avLst/>
+          </a:prstGeom>
+        </p:spPr>
+        <p:style>
+          <a:lnRef idx="2">
+            <a:schemeClr val="dk1"/>
+          </a:lnRef>
+          <a:fillRef idx="1">
+            <a:schemeClr val="lt1"/>
+          </a:fillRef>
+          <a:effectRef idx="0">
+            <a:schemeClr val="dk1"/>
+          </a:effectRef>
+          <a:fontRef idx="minor">
+            <a:schemeClr val="dk1"/>
+          </a:fontRef>
+        </p:style>
+        <p:txBody>
+          <a:bodyPr rtlCol="0" anchor="ctr"/>
+          <a:lstStyle/>
+          <a:p>
+            <a:endParaRPr lang="en-US"/>
+          </a:p>
+        </p:txBody>
+      </p:sp>
+      <p:sp>
+        <p:nvSpPr>
+          <p:cNvPr id="96" name="Oval 95">
+            <a:extLst>
+              <a:ext uri="{FF2B5EF4-FFF2-40B4-BE49-F238E27FC236}">
+                <a16:creationId xmlns:a16="http://schemas.microsoft.com/office/drawing/2014/main" id="{EC50BD75-2E64-465F-A1D6-40F1428C9193}"/>
+              </a:ext>
+            </a:extLst>
+          </p:cNvPr>
+          <p:cNvSpPr/>
+          <p:nvPr/>
+        </p:nvSpPr>
+        <p:spPr>
+          <a:xfrm>
+            <a:off x="683241" y="1846091"/>
+            <a:ext cx="170014" cy="170014"/>
+          </a:xfrm>
+          <a:prstGeom prst="ellipse">
+            <a:avLst/>
+          </a:prstGeom>
+        </p:spPr>
+        <p:style>
+          <a:lnRef idx="2">
+            <a:schemeClr val="dk1"/>
+          </a:lnRef>
+          <a:fillRef idx="1">
+            <a:schemeClr val="lt1"/>
+          </a:fillRef>
+          <a:effectRef idx="0">
+            <a:schemeClr val="dk1"/>
+          </a:effectRef>
+          <a:fontRef idx="minor">
+            <a:schemeClr val="dk1"/>
+          </a:fontRef>
+        </p:style>
+        <p:txBody>
+          <a:bodyPr rtlCol="0" anchor="ctr"/>
+          <a:lstStyle/>
+          <a:p>
+            <a:pPr algn="ctr"/>
+            <a:endParaRPr lang="en-US"/>
+          </a:p>
+        </p:txBody>
+      </p:sp>
+      <p:cxnSp>
+        <p:nvCxnSpPr>
+          <p:cNvPr id="97" name="Straight Arrow Connector 96">
+            <a:extLst>
+              <a:ext uri="{FF2B5EF4-FFF2-40B4-BE49-F238E27FC236}">
+                <a16:creationId xmlns:a16="http://schemas.microsoft.com/office/drawing/2014/main" id="{EE047658-CAAA-4FFD-BC1E-1D74AAC0E962}"/>
+              </a:ext>
+            </a:extLst>
+          </p:cNvPr>
+          <p:cNvCxnSpPr>
+            <a:cxnSpLocks/>
+            <a:stCxn id="96" idx="6"/>
+            <a:endCxn id="99" idx="1"/>
+          </p:cNvCxnSpPr>
+          <p:nvPr/>
+        </p:nvCxnSpPr>
+        <p:spPr>
+          <a:xfrm flipV="1">
+            <a:off x="853255" y="1929765"/>
+            <a:ext cx="329821" cy="1333"/>
+          </a:xfrm>
+          <a:prstGeom prst="straightConnector1">
+            <a:avLst/>
+          </a:prstGeom>
+          <a:ln>
+            <a:tailEnd type="triangle"/>
+          </a:ln>
+        </p:spPr>
+        <p:style>
+          <a:lnRef idx="2">
+            <a:schemeClr val="dk1"/>
+          </a:lnRef>
+          <a:fillRef idx="1">
+            <a:schemeClr val="lt1"/>
+          </a:fillRef>
+          <a:effectRef idx="0">
+            <a:schemeClr val="dk1"/>
+          </a:effectRef>
+          <a:fontRef idx="minor">
+            <a:schemeClr val="dk1"/>
+          </a:fontRef>
+        </p:style>
+      </p:cxnSp>
+      <p:sp>
+        <p:nvSpPr>
+          <p:cNvPr id="99" name="Rectangle: Rounded Corners 98">
+            <a:extLst>
+              <a:ext uri="{FF2B5EF4-FFF2-40B4-BE49-F238E27FC236}">
+                <a16:creationId xmlns:a16="http://schemas.microsoft.com/office/drawing/2014/main" id="{0CAE1770-6662-442A-B407-2FA21A866E5F}"/>
+              </a:ext>
+            </a:extLst>
+          </p:cNvPr>
+          <p:cNvSpPr/>
+          <p:nvPr/>
+        </p:nvSpPr>
+        <p:spPr>
+          <a:xfrm>
+            <a:off x="1183076" y="1742407"/>
+            <a:ext cx="1051823" cy="374715"/>
+          </a:xfrm>
+          <a:prstGeom prst="roundRect">
+            <a:avLst/>
+          </a:prstGeom>
+        </p:spPr>
+        <p:style>
+          <a:lnRef idx="2">
+            <a:schemeClr val="dk1"/>
+          </a:lnRef>
+          <a:fillRef idx="1">
+            <a:schemeClr val="lt1"/>
+          </a:fillRef>
+          <a:effectRef idx="0">
+            <a:schemeClr val="dk1"/>
+          </a:effectRef>
+          <a:fontRef idx="minor">
+            <a:schemeClr val="dk1"/>
+          </a:fontRef>
+        </p:style>
+        <p:txBody>
+          <a:bodyPr rtlCol="0" anchor="ctr"/>
+          <a:lstStyle/>
+          <a:p>
+            <a:r>
+              <a:rPr lang="en-US" sz="1200" dirty="0"/>
+              <a:t>Activity 1</a:t>
+            </a:r>
+          </a:p>
+        </p:txBody>
+      </p:sp>
+      <p:sp>
+        <p:nvSpPr>
+          <p:cNvPr id="100" name="Diamond 99">
+            <a:extLst>
+              <a:ext uri="{FF2B5EF4-FFF2-40B4-BE49-F238E27FC236}">
+                <a16:creationId xmlns:a16="http://schemas.microsoft.com/office/drawing/2014/main" id="{A0F01015-CEA3-4643-8FF4-E2A2AD1177F3}"/>
+              </a:ext>
+            </a:extLst>
+          </p:cNvPr>
+          <p:cNvSpPr/>
+          <p:nvPr/>
+        </p:nvSpPr>
+        <p:spPr>
+          <a:xfrm>
+            <a:off x="1912571" y="1791915"/>
+            <a:ext cx="275698" cy="275698"/>
+          </a:xfrm>
+          <a:prstGeom prst="diamond">
+            <a:avLst/>
+          </a:prstGeom>
+        </p:spPr>
+        <p:style>
+          <a:lnRef idx="2">
+            <a:schemeClr val="dk1"/>
+          </a:lnRef>
+          <a:fillRef idx="1">
+            <a:schemeClr val="lt1"/>
+          </a:fillRef>
+          <a:effectRef idx="0">
+            <a:schemeClr val="dk1"/>
+          </a:effectRef>
+          <a:fontRef idx="minor">
+            <a:schemeClr val="dk1"/>
+          </a:fontRef>
+        </p:style>
+        <p:txBody>
+          <a:bodyPr rtlCol="0" anchor="ctr"/>
+          <a:lstStyle/>
+          <a:p>
+            <a:endParaRPr lang="en-US"/>
+          </a:p>
+        </p:txBody>
+      </p:sp>
+      <p:sp>
+        <p:nvSpPr>
+          <p:cNvPr id="103" name="Rectangle: Rounded Corners 102">
+            <a:extLst>
+              <a:ext uri="{FF2B5EF4-FFF2-40B4-BE49-F238E27FC236}">
+                <a16:creationId xmlns:a16="http://schemas.microsoft.com/office/drawing/2014/main" id="{282E6976-5E30-4F15-86F8-C54318572E9D}"/>
+              </a:ext>
+            </a:extLst>
+          </p:cNvPr>
+          <p:cNvSpPr/>
+          <p:nvPr/>
+        </p:nvSpPr>
+        <p:spPr>
+          <a:xfrm>
+            <a:off x="4473940" y="1742406"/>
+            <a:ext cx="1051823" cy="374715"/>
+          </a:xfrm>
+          <a:prstGeom prst="roundRect">
+            <a:avLst/>
+          </a:prstGeom>
+        </p:spPr>
+        <p:style>
+          <a:lnRef idx="2">
+            <a:schemeClr val="dk1"/>
+          </a:lnRef>
+          <a:fillRef idx="1">
+            <a:schemeClr val="lt1"/>
+          </a:fillRef>
+          <a:effectRef idx="0">
+            <a:schemeClr val="dk1"/>
+          </a:effectRef>
+          <a:fontRef idx="minor">
+            <a:schemeClr val="dk1"/>
+          </a:fontRef>
+        </p:style>
+        <p:txBody>
+          <a:bodyPr rtlCol="0" anchor="ctr"/>
+          <a:lstStyle/>
+          <a:p>
+            <a:r>
+              <a:rPr lang="en-US" sz="1200" dirty="0"/>
+              <a:t>Activity 2</a:t>
+            </a:r>
+          </a:p>
+        </p:txBody>
+      </p:sp>
+      <p:sp>
+        <p:nvSpPr>
+          <p:cNvPr id="104" name="Diamond 103">
+            <a:extLst>
+              <a:ext uri="{FF2B5EF4-FFF2-40B4-BE49-F238E27FC236}">
+                <a16:creationId xmlns:a16="http://schemas.microsoft.com/office/drawing/2014/main" id="{EFBC3FE2-5A26-4742-B3DB-CE3F4013CD3B}"/>
+              </a:ext>
+            </a:extLst>
+          </p:cNvPr>
+          <p:cNvSpPr/>
+          <p:nvPr/>
+        </p:nvSpPr>
+        <p:spPr>
+          <a:xfrm>
+            <a:off x="5210265" y="1791914"/>
+            <a:ext cx="275698" cy="275698"/>
+          </a:xfrm>
+          <a:prstGeom prst="diamond">
+            <a:avLst/>
+          </a:prstGeom>
+        </p:spPr>
+        <p:style>
+          <a:lnRef idx="2">
+            <a:schemeClr val="dk1"/>
+          </a:lnRef>
+          <a:fillRef idx="1">
+            <a:schemeClr val="lt1"/>
+          </a:fillRef>
+          <a:effectRef idx="0">
+            <a:schemeClr val="dk1"/>
+          </a:effectRef>
+          <a:fontRef idx="minor">
+            <a:schemeClr val="dk1"/>
+          </a:fontRef>
+        </p:style>
+        <p:txBody>
+          <a:bodyPr rtlCol="0" anchor="ctr"/>
+          <a:lstStyle/>
+          <a:p>
+            <a:endParaRPr lang="en-US"/>
+          </a:p>
+        </p:txBody>
+      </p:sp>
+      <p:sp>
+        <p:nvSpPr>
+          <p:cNvPr id="106" name="Rectangle: Rounded Corners 105">
+            <a:extLst>
+              <a:ext uri="{FF2B5EF4-FFF2-40B4-BE49-F238E27FC236}">
+                <a16:creationId xmlns:a16="http://schemas.microsoft.com/office/drawing/2014/main" id="{E4D92D40-90E4-4DDD-9ADB-AA6479A4493B}"/>
+              </a:ext>
+            </a:extLst>
+          </p:cNvPr>
+          <p:cNvSpPr/>
+          <p:nvPr/>
+        </p:nvSpPr>
+        <p:spPr>
+          <a:xfrm>
+            <a:off x="7369088" y="1742405"/>
+            <a:ext cx="1132041" cy="374715"/>
+          </a:xfrm>
+          <a:prstGeom prst="roundRect">
+            <a:avLst/>
+          </a:prstGeom>
+        </p:spPr>
+        <p:style>
+          <a:lnRef idx="2">
+            <a:schemeClr val="dk1"/>
+          </a:lnRef>
+          <a:fillRef idx="1">
+            <a:schemeClr val="lt1"/>
+          </a:fillRef>
+          <a:effectRef idx="0">
+            <a:schemeClr val="dk1"/>
+          </a:effectRef>
+          <a:fontRef idx="minor">
+            <a:schemeClr val="dk1"/>
+          </a:fontRef>
+        </p:style>
+        <p:txBody>
+          <a:bodyPr rtlCol="0" anchor="ctr"/>
+          <a:lstStyle/>
+          <a:p>
+            <a:r>
+              <a:rPr lang="en-US" sz="1200" dirty="0"/>
+              <a:t>Activity 3</a:t>
+            </a:r>
+          </a:p>
+        </p:txBody>
+      </p:sp>
+      <p:sp>
+        <p:nvSpPr>
+          <p:cNvPr id="111" name="Oval 110">
+            <a:extLst>
+              <a:ext uri="{FF2B5EF4-FFF2-40B4-BE49-F238E27FC236}">
+                <a16:creationId xmlns:a16="http://schemas.microsoft.com/office/drawing/2014/main" id="{FE00284F-8E9D-4E3D-A0DA-F4DBEA1D0F91}"/>
+              </a:ext>
+            </a:extLst>
+          </p:cNvPr>
+          <p:cNvSpPr/>
+          <p:nvPr/>
+        </p:nvSpPr>
+        <p:spPr>
+          <a:xfrm>
+            <a:off x="9666782" y="1840498"/>
+            <a:ext cx="170014" cy="170014"/>
+          </a:xfrm>
+          <a:prstGeom prst="ellipse">
+            <a:avLst/>
+          </a:prstGeom>
+          <a:solidFill>
+            <a:schemeClr val="bg1"/>
+          </a:solidFill>
+          <a:ln>
+            <a:prstDash val="sysDash"/>
+          </a:ln>
+        </p:spPr>
+        <p:style>
+          <a:lnRef idx="2">
+            <a:schemeClr val="dk1">
+              <a:shade val="50000"/>
+            </a:schemeClr>
+          </a:lnRef>
+          <a:fillRef idx="1">
+            <a:schemeClr val="dk1"/>
+          </a:fillRef>
+          <a:effectRef idx="0">
+            <a:schemeClr val="dk1"/>
+          </a:effectRef>
+          <a:fontRef idx="minor">
+            <a:schemeClr val="lt1"/>
+          </a:fontRef>
+        </p:style>
+        <p:txBody>
+          <a:bodyPr rtlCol="0" anchor="ctr"/>
+          <a:lstStyle/>
+          <a:p>
+            <a:pPr algn="ctr"/>
+            <a:endParaRPr lang="en-US"/>
+          </a:p>
+        </p:txBody>
+      </p:sp>
+      <p:cxnSp>
+        <p:nvCxnSpPr>
+          <p:cNvPr id="120" name="Connector: Elbow 119">
+            <a:extLst>
+              <a:ext uri="{FF2B5EF4-FFF2-40B4-BE49-F238E27FC236}">
+                <a16:creationId xmlns:a16="http://schemas.microsoft.com/office/drawing/2014/main" id="{89A7FB32-64DD-48A4-814C-96A456E89E16}"/>
+              </a:ext>
+            </a:extLst>
+          </p:cNvPr>
+          <p:cNvCxnSpPr>
+            <a:cxnSpLocks/>
+            <a:stCxn id="100" idx="2"/>
+            <a:endCxn id="123" idx="2"/>
+          </p:cNvCxnSpPr>
+          <p:nvPr/>
+        </p:nvCxnSpPr>
+        <p:spPr>
+          <a:xfrm rot="16200000" flipH="1">
+            <a:off x="5447187" y="-1329154"/>
+            <a:ext cx="827425" cy="7620958"/>
+          </a:xfrm>
+          <a:prstGeom prst="bentConnector2">
+            <a:avLst/>
+          </a:prstGeom>
+          <a:ln>
+            <a:tailEnd type="triangle"/>
+          </a:ln>
+        </p:spPr>
+        <p:style>
+          <a:lnRef idx="2">
+            <a:schemeClr val="dk1"/>
+          </a:lnRef>
+          <a:fillRef idx="1">
+            <a:schemeClr val="lt1"/>
+          </a:fillRef>
+          <a:effectRef idx="0">
+            <a:schemeClr val="dk1"/>
+          </a:effectRef>
+          <a:fontRef idx="minor">
+            <a:schemeClr val="dk1"/>
+          </a:fontRef>
+        </p:style>
+      </p:cxnSp>
+      <p:sp>
+        <p:nvSpPr>
+          <p:cNvPr id="123" name="Oval 122">
+            <a:extLst>
+              <a:ext uri="{FF2B5EF4-FFF2-40B4-BE49-F238E27FC236}">
+                <a16:creationId xmlns:a16="http://schemas.microsoft.com/office/drawing/2014/main" id="{E8B7DE2B-B790-48B1-A1DA-0121EDBF3E01}"/>
+              </a:ext>
+            </a:extLst>
+          </p:cNvPr>
+          <p:cNvSpPr/>
+          <p:nvPr/>
+        </p:nvSpPr>
+        <p:spPr>
+          <a:xfrm>
+            <a:off x="9671378" y="2810031"/>
+            <a:ext cx="170014" cy="170014"/>
+          </a:xfrm>
+          <a:prstGeom prst="ellipse">
+            <a:avLst/>
+          </a:prstGeom>
+        </p:spPr>
+        <p:style>
+          <a:lnRef idx="2">
+            <a:schemeClr val="dk1">
+              <a:shade val="50000"/>
+            </a:schemeClr>
+          </a:lnRef>
+          <a:fillRef idx="1">
+            <a:schemeClr val="dk1"/>
+          </a:fillRef>
+          <a:effectRef idx="0">
+            <a:schemeClr val="dk1"/>
+          </a:effectRef>
+          <a:fontRef idx="minor">
+            <a:schemeClr val="lt1"/>
+          </a:fontRef>
+        </p:style>
+        <p:txBody>
+          <a:bodyPr rtlCol="0" anchor="ctr"/>
+          <a:lstStyle/>
+          <a:p>
+            <a:pPr algn="ctr"/>
+            <a:endParaRPr lang="en-US"/>
+          </a:p>
+        </p:txBody>
+      </p:sp>
+      <p:cxnSp>
+        <p:nvCxnSpPr>
+          <p:cNvPr id="126" name="Straight Arrow Connector 125">
+            <a:extLst>
+              <a:ext uri="{FF2B5EF4-FFF2-40B4-BE49-F238E27FC236}">
+                <a16:creationId xmlns:a16="http://schemas.microsoft.com/office/drawing/2014/main" id="{ABBF06A7-6932-4FA1-9B4A-C7C650E1A3A8}"/>
+              </a:ext>
+            </a:extLst>
+          </p:cNvPr>
+          <p:cNvCxnSpPr>
+            <a:cxnSpLocks/>
+            <a:stCxn id="100" idx="3"/>
+            <a:endCxn id="103" idx="1"/>
+          </p:cNvCxnSpPr>
+          <p:nvPr/>
+        </p:nvCxnSpPr>
+        <p:spPr>
+          <a:xfrm>
+            <a:off x="2188269" y="1929764"/>
+            <a:ext cx="2285671" cy="0"/>
+          </a:xfrm>
+          <a:prstGeom prst="straightConnector1">
+            <a:avLst/>
+          </a:prstGeom>
+          <a:ln>
+            <a:prstDash val="dash"/>
+            <a:tailEnd type="triangle"/>
+          </a:ln>
+        </p:spPr>
+        <p:style>
+          <a:lnRef idx="2">
+            <a:schemeClr val="dk1"/>
+          </a:lnRef>
+          <a:fillRef idx="1">
+            <a:schemeClr val="lt1"/>
+          </a:fillRef>
+          <a:effectRef idx="0">
+            <a:schemeClr val="dk1"/>
+          </a:effectRef>
+          <a:fontRef idx="minor">
+            <a:schemeClr val="dk1"/>
+          </a:fontRef>
+        </p:style>
+      </p:cxnSp>
+      <p:sp>
+        <p:nvSpPr>
+          <p:cNvPr id="129" name="Diamond 128">
+            <a:extLst>
+              <a:ext uri="{FF2B5EF4-FFF2-40B4-BE49-F238E27FC236}">
+                <a16:creationId xmlns:a16="http://schemas.microsoft.com/office/drawing/2014/main" id="{7394365D-FB0D-4F25-8D67-C6753AD42A8A}"/>
+              </a:ext>
+            </a:extLst>
+          </p:cNvPr>
+          <p:cNvSpPr/>
+          <p:nvPr/>
+        </p:nvSpPr>
+        <p:spPr>
+          <a:xfrm>
+            <a:off x="8161511" y="1787656"/>
+            <a:ext cx="275698" cy="275698"/>
+          </a:xfrm>
+          <a:prstGeom prst="diamond">
+            <a:avLst/>
+          </a:prstGeom>
+        </p:spPr>
+        <p:style>
+          <a:lnRef idx="2">
+            <a:schemeClr val="dk1"/>
+          </a:lnRef>
+          <a:fillRef idx="1">
+            <a:schemeClr val="lt1"/>
+          </a:fillRef>
+          <a:effectRef idx="0">
+            <a:schemeClr val="dk1"/>
+          </a:effectRef>
+          <a:fontRef idx="minor">
+            <a:schemeClr val="dk1"/>
+          </a:fontRef>
+        </p:style>
+        <p:txBody>
+          <a:bodyPr rtlCol="0" anchor="ctr"/>
+          <a:lstStyle/>
+          <a:p>
+            <a:pPr algn="ctr"/>
+            <a:endParaRPr lang="en-US"/>
+          </a:p>
+        </p:txBody>
+      </p:sp>
+      <p:cxnSp>
+        <p:nvCxnSpPr>
+          <p:cNvPr id="131" name="Straight Arrow Connector 130">
+            <a:extLst>
+              <a:ext uri="{FF2B5EF4-FFF2-40B4-BE49-F238E27FC236}">
+                <a16:creationId xmlns:a16="http://schemas.microsoft.com/office/drawing/2014/main" id="{F25B3486-3D84-4B5B-9E2C-A56D55E5993D}"/>
+              </a:ext>
+            </a:extLst>
+          </p:cNvPr>
+          <p:cNvCxnSpPr>
+            <a:cxnSpLocks/>
+            <a:stCxn id="104" idx="3"/>
+            <a:endCxn id="106" idx="1"/>
+          </p:cNvCxnSpPr>
+          <p:nvPr/>
+        </p:nvCxnSpPr>
+        <p:spPr>
+          <a:xfrm>
+            <a:off x="5485963" y="1929763"/>
+            <a:ext cx="1883125" cy="0"/>
+          </a:xfrm>
+          <a:prstGeom prst="straightConnector1">
+            <a:avLst/>
+          </a:prstGeom>
+          <a:ln>
+            <a:prstDash val="dash"/>
+            <a:tailEnd type="triangle"/>
+          </a:ln>
+        </p:spPr>
+        <p:style>
+          <a:lnRef idx="2">
+            <a:schemeClr val="dk1"/>
+          </a:lnRef>
+          <a:fillRef idx="1">
+            <a:schemeClr val="lt1"/>
+          </a:fillRef>
+          <a:effectRef idx="0">
+            <a:schemeClr val="dk1"/>
+          </a:effectRef>
+          <a:fontRef idx="minor">
+            <a:schemeClr val="dk1"/>
+          </a:fontRef>
+        </p:style>
+      </p:cxnSp>
+      <p:cxnSp>
+        <p:nvCxnSpPr>
+          <p:cNvPr id="132" name="Straight Arrow Connector 131">
+            <a:extLst>
+              <a:ext uri="{FF2B5EF4-FFF2-40B4-BE49-F238E27FC236}">
+                <a16:creationId xmlns:a16="http://schemas.microsoft.com/office/drawing/2014/main" id="{6ACFCBAC-AF59-45FA-BB1F-ACFF730DED3F}"/>
+              </a:ext>
+            </a:extLst>
+          </p:cNvPr>
+          <p:cNvCxnSpPr>
+            <a:cxnSpLocks/>
+            <a:stCxn id="129" idx="3"/>
+            <a:endCxn id="111" idx="2"/>
+          </p:cNvCxnSpPr>
+          <p:nvPr/>
+        </p:nvCxnSpPr>
+        <p:spPr>
+          <a:xfrm>
+            <a:off x="8437209" y="1925505"/>
+            <a:ext cx="1229573" cy="0"/>
+          </a:xfrm>
+          <a:prstGeom prst="straightConnector1">
+            <a:avLst/>
+          </a:prstGeom>
+          <a:ln>
+            <a:prstDash val="dash"/>
+            <a:tailEnd type="triangle"/>
+          </a:ln>
+        </p:spPr>
+        <p:style>
+          <a:lnRef idx="2">
+            <a:schemeClr val="dk1"/>
+          </a:lnRef>
+          <a:fillRef idx="1">
+            <a:schemeClr val="lt1"/>
+          </a:fillRef>
+          <a:effectRef idx="0">
+            <a:schemeClr val="dk1"/>
+          </a:effectRef>
+          <a:fontRef idx="minor">
+            <a:schemeClr val="dk1"/>
+          </a:fontRef>
+        </p:style>
+      </p:cxnSp>
+      <p:cxnSp>
+        <p:nvCxnSpPr>
+          <p:cNvPr id="141" name="Connector: Elbow 140">
+            <a:extLst>
+              <a:ext uri="{FF2B5EF4-FFF2-40B4-BE49-F238E27FC236}">
+                <a16:creationId xmlns:a16="http://schemas.microsoft.com/office/drawing/2014/main" id="{39A6B3A8-021A-49D3-A975-96B09FCC699F}"/>
+              </a:ext>
+            </a:extLst>
+          </p:cNvPr>
+          <p:cNvCxnSpPr>
+            <a:cxnSpLocks/>
+            <a:stCxn id="129" idx="2"/>
+            <a:endCxn id="123" idx="2"/>
+          </p:cNvCxnSpPr>
+          <p:nvPr/>
+        </p:nvCxnSpPr>
+        <p:spPr>
+          <a:xfrm rot="16200000" flipH="1">
+            <a:off x="8569527" y="1793187"/>
+            <a:ext cx="831684" cy="1372018"/>
+          </a:xfrm>
+          <a:prstGeom prst="bentConnector2">
+            <a:avLst/>
+          </a:prstGeom>
+          <a:ln>
+            <a:tailEnd type="triangle"/>
+          </a:ln>
+        </p:spPr>
+        <p:style>
+          <a:lnRef idx="2">
+            <a:schemeClr val="dk1"/>
+          </a:lnRef>
+          <a:fillRef idx="1">
+            <a:schemeClr val="lt1"/>
+          </a:fillRef>
+          <a:effectRef idx="0">
+            <a:schemeClr val="dk1"/>
+          </a:effectRef>
+          <a:fontRef idx="minor">
+            <a:schemeClr val="dk1"/>
+          </a:fontRef>
+        </p:style>
+      </p:cxnSp>
+      <p:cxnSp>
+        <p:nvCxnSpPr>
+          <p:cNvPr id="144" name="Connector: Elbow 143">
+            <a:extLst>
+              <a:ext uri="{FF2B5EF4-FFF2-40B4-BE49-F238E27FC236}">
+                <a16:creationId xmlns:a16="http://schemas.microsoft.com/office/drawing/2014/main" id="{CAE866DE-95F5-4296-AA48-5026DF863AEA}"/>
+              </a:ext>
+            </a:extLst>
+          </p:cNvPr>
+          <p:cNvCxnSpPr>
+            <a:cxnSpLocks/>
+            <a:stCxn id="104" idx="2"/>
+            <a:endCxn id="123" idx="2"/>
+          </p:cNvCxnSpPr>
+          <p:nvPr/>
+        </p:nvCxnSpPr>
+        <p:spPr>
+          <a:xfrm rot="16200000" flipH="1">
+            <a:off x="7096033" y="319693"/>
+            <a:ext cx="827426" cy="4323264"/>
+          </a:xfrm>
+          <a:prstGeom prst="bentConnector2">
+            <a:avLst/>
+          </a:prstGeom>
+          <a:ln>
+            <a:tailEnd type="triangle"/>
+          </a:ln>
+        </p:spPr>
+        <p:style>
+          <a:lnRef idx="2">
+            <a:schemeClr val="dk1"/>
+          </a:lnRef>
+          <a:fillRef idx="1">
+            <a:schemeClr val="lt1"/>
+          </a:fillRef>
+          <a:effectRef idx="0">
+            <a:schemeClr val="dk1"/>
+          </a:effectRef>
+          <a:fontRef idx="minor">
+            <a:schemeClr val="dk1"/>
+          </a:fontRef>
+        </p:style>
+      </p:cxnSp>
+      <p:sp>
+        <p:nvSpPr>
+          <p:cNvPr id="152" name="Rectangle 151">
+            <a:extLst>
+              <a:ext uri="{FF2B5EF4-FFF2-40B4-BE49-F238E27FC236}">
+                <a16:creationId xmlns:a16="http://schemas.microsoft.com/office/drawing/2014/main" id="{49E27D63-F47E-46E6-A231-625EA11F6C74}"/>
+              </a:ext>
+            </a:extLst>
+          </p:cNvPr>
+          <p:cNvSpPr/>
+          <p:nvPr/>
+        </p:nvSpPr>
+        <p:spPr>
+          <a:xfrm>
+            <a:off x="4956042" y="3119167"/>
+            <a:ext cx="1059842" cy="307777"/>
+          </a:xfrm>
+          <a:prstGeom prst="rect">
+            <a:avLst/>
+          </a:prstGeom>
+        </p:spPr>
+        <p:txBody>
+          <a:bodyPr wrap="none">
+            <a:spAutoFit/>
+          </a:bodyPr>
+          <a:lstStyle/>
+          <a:p>
+            <a:r>
+              <a:rPr lang="en-US" sz="1400" b="1" dirty="0"/>
+              <a:t>Any will do.</a:t>
+            </a:r>
+          </a:p>
+        </p:txBody>
+      </p:sp>
+      <p:sp>
+        <p:nvSpPr>
+          <p:cNvPr id="153" name="Rectangle 152">
+            <a:extLst>
+              <a:ext uri="{FF2B5EF4-FFF2-40B4-BE49-F238E27FC236}">
+                <a16:creationId xmlns:a16="http://schemas.microsoft.com/office/drawing/2014/main" id="{F7529302-9D82-4D21-BEBB-54667E7FFAD0}"/>
+              </a:ext>
+            </a:extLst>
+          </p:cNvPr>
+          <p:cNvSpPr/>
+          <p:nvPr/>
+        </p:nvSpPr>
+        <p:spPr>
+          <a:xfrm>
+            <a:off x="5891237" y="1354508"/>
+            <a:ext cx="1338956" cy="307777"/>
+          </a:xfrm>
+          <a:prstGeom prst="rect">
+            <a:avLst/>
+          </a:prstGeom>
+        </p:spPr>
+        <p:txBody>
+          <a:bodyPr wrap="none">
+            <a:spAutoFit/>
+          </a:bodyPr>
+          <a:lstStyle/>
+          <a:p>
+            <a:r>
+              <a:rPr lang="en-US" sz="1400" b="1" dirty="0"/>
+              <a:t>None won’t do.</a:t>
+            </a:r>
+          </a:p>
+        </p:txBody>
+      </p:sp>
+      <p:sp>
+        <p:nvSpPr>
+          <p:cNvPr id="170" name="TextBox 169">
+            <a:extLst>
+              <a:ext uri="{FF2B5EF4-FFF2-40B4-BE49-F238E27FC236}">
+                <a16:creationId xmlns:a16="http://schemas.microsoft.com/office/drawing/2014/main" id="{346F9FE3-F5F3-4891-BACB-C43189A015C4}"/>
+              </a:ext>
+            </a:extLst>
+          </p:cNvPr>
+          <p:cNvSpPr txBox="1"/>
+          <p:nvPr/>
+        </p:nvSpPr>
+        <p:spPr>
+          <a:xfrm>
+            <a:off x="544200" y="1278290"/>
+            <a:ext cx="5462478" cy="461665"/>
+          </a:xfrm>
+          <a:prstGeom prst="rect">
+            <a:avLst/>
+          </a:prstGeom>
+          <a:noFill/>
+        </p:spPr>
+        <p:txBody>
+          <a:bodyPr wrap="square" rtlCol="0">
+            <a:spAutoFit/>
+          </a:bodyPr>
+          <a:lstStyle/>
+          <a:p>
+            <a:r>
+              <a:rPr lang="en-US" sz="2400" dirty="0"/>
+              <a:t>Fallback</a:t>
+            </a:r>
+            <a:r>
+              <a:rPr lang="en-US" dirty="0"/>
+              <a:t> (First </a:t>
+            </a:r>
+            <a:r>
+              <a:rPr lang="en-US" i="1" dirty="0"/>
+              <a:t>solve</a:t>
+            </a:r>
+            <a:r>
+              <a:rPr lang="en-US" dirty="0"/>
+              <a:t> ends sequence)</a:t>
+            </a:r>
+            <a:endParaRPr lang="en-US" sz="2400" dirty="0"/>
+          </a:p>
+        </p:txBody>
+      </p:sp>
+      <p:sp>
+        <p:nvSpPr>
+          <p:cNvPr id="105" name="Rectangle 104">
+            <a:extLst>
+              <a:ext uri="{FF2B5EF4-FFF2-40B4-BE49-F238E27FC236}">
+                <a16:creationId xmlns:a16="http://schemas.microsoft.com/office/drawing/2014/main" id="{38C9C11D-BE39-494E-81A3-3BE86E22D129}"/>
+              </a:ext>
+            </a:extLst>
+          </p:cNvPr>
+          <p:cNvSpPr/>
+          <p:nvPr/>
+        </p:nvSpPr>
+        <p:spPr>
+          <a:xfrm>
+            <a:off x="9835342" y="1787005"/>
+            <a:ext cx="1941365" cy="276999"/>
+          </a:xfrm>
+          <a:prstGeom prst="rect">
+            <a:avLst/>
+          </a:prstGeom>
+        </p:spPr>
+        <p:txBody>
+          <a:bodyPr wrap="none">
+            <a:spAutoFit/>
+          </a:bodyPr>
+          <a:lstStyle/>
+          <a:p>
+            <a:r>
+              <a:rPr lang="en-US" sz="1200" dirty="0"/>
+              <a:t>decision(undefined, reason)</a:t>
+            </a:r>
+          </a:p>
+        </p:txBody>
+      </p:sp>
+      <p:sp>
+        <p:nvSpPr>
+          <p:cNvPr id="107" name="Rectangle 106">
+            <a:extLst>
+              <a:ext uri="{FF2B5EF4-FFF2-40B4-BE49-F238E27FC236}">
+                <a16:creationId xmlns:a16="http://schemas.microsoft.com/office/drawing/2014/main" id="{5F7A4CE4-26C2-422E-B56F-5D87E752A1F2}"/>
+              </a:ext>
+            </a:extLst>
+          </p:cNvPr>
+          <p:cNvSpPr/>
+          <p:nvPr/>
+        </p:nvSpPr>
+        <p:spPr>
+          <a:xfrm>
+            <a:off x="8299359" y="2605107"/>
+            <a:ext cx="1227772" cy="276999"/>
+          </a:xfrm>
+          <a:prstGeom prst="rect">
+            <a:avLst/>
+          </a:prstGeom>
+        </p:spPr>
+        <p:txBody>
+          <a:bodyPr wrap="none">
+            <a:spAutoFit/>
+          </a:bodyPr>
+          <a:lstStyle/>
+          <a:p>
+            <a:r>
+              <a:rPr lang="en-US" sz="1200" dirty="0"/>
+              <a:t>decision(result3)</a:t>
+            </a:r>
+          </a:p>
+        </p:txBody>
+      </p:sp>
+      <p:sp>
+        <p:nvSpPr>
+          <p:cNvPr id="108" name="Rectangle 107">
+            <a:extLst>
+              <a:ext uri="{FF2B5EF4-FFF2-40B4-BE49-F238E27FC236}">
+                <a16:creationId xmlns:a16="http://schemas.microsoft.com/office/drawing/2014/main" id="{153DE0E5-ECC3-4729-AC38-C79C8210D36A}"/>
+              </a:ext>
+            </a:extLst>
+          </p:cNvPr>
+          <p:cNvSpPr/>
+          <p:nvPr/>
+        </p:nvSpPr>
+        <p:spPr>
+          <a:xfrm>
+            <a:off x="2372747" y="1925504"/>
+            <a:ext cx="1843325" cy="276999"/>
+          </a:xfrm>
+          <a:prstGeom prst="rect">
+            <a:avLst/>
+          </a:prstGeom>
+        </p:spPr>
+        <p:txBody>
+          <a:bodyPr wrap="none">
+            <a:spAutoFit/>
+          </a:bodyPr>
+          <a:lstStyle/>
+          <a:p>
+            <a:r>
+              <a:rPr lang="en-US" sz="1200" dirty="0"/>
+              <a:t>activity2(activity3, result1)</a:t>
+            </a:r>
+          </a:p>
+        </p:txBody>
+      </p:sp>
+      <p:sp>
+        <p:nvSpPr>
+          <p:cNvPr id="109" name="Rectangle 108">
+            <a:extLst>
+              <a:ext uri="{FF2B5EF4-FFF2-40B4-BE49-F238E27FC236}">
+                <a16:creationId xmlns:a16="http://schemas.microsoft.com/office/drawing/2014/main" id="{5547FE9F-14D7-44E9-8AAA-5D54286632AE}"/>
+              </a:ext>
+            </a:extLst>
+          </p:cNvPr>
+          <p:cNvSpPr/>
+          <p:nvPr/>
+        </p:nvSpPr>
+        <p:spPr>
+          <a:xfrm>
+            <a:off x="5525763" y="1889941"/>
+            <a:ext cx="1830501" cy="276999"/>
+          </a:xfrm>
+          <a:prstGeom prst="rect">
+            <a:avLst/>
+          </a:prstGeom>
+        </p:spPr>
+        <p:txBody>
+          <a:bodyPr wrap="none">
+            <a:spAutoFit/>
+          </a:bodyPr>
+          <a:lstStyle/>
+          <a:p>
+            <a:r>
+              <a:rPr lang="en-US" sz="1200" dirty="0"/>
+              <a:t>activity3(decision, result2)</a:t>
+            </a:r>
+          </a:p>
+        </p:txBody>
+      </p:sp>
+      <p:sp>
+        <p:nvSpPr>
+          <p:cNvPr id="110" name="Rectangle 109">
+            <a:extLst>
+              <a:ext uri="{FF2B5EF4-FFF2-40B4-BE49-F238E27FC236}">
+                <a16:creationId xmlns:a16="http://schemas.microsoft.com/office/drawing/2014/main" id="{82841701-EA32-4E5A-A8D6-E2A229B35AD0}"/>
+              </a:ext>
+            </a:extLst>
+          </p:cNvPr>
+          <p:cNvSpPr/>
+          <p:nvPr/>
+        </p:nvSpPr>
+        <p:spPr>
+          <a:xfrm>
+            <a:off x="2051932" y="2620986"/>
+            <a:ext cx="1227772" cy="276999"/>
+          </a:xfrm>
+          <a:prstGeom prst="rect">
+            <a:avLst/>
+          </a:prstGeom>
+        </p:spPr>
+        <p:txBody>
+          <a:bodyPr wrap="none">
+            <a:spAutoFit/>
+          </a:bodyPr>
+          <a:lstStyle/>
+          <a:p>
+            <a:r>
+              <a:rPr lang="en-US" sz="1200" dirty="0"/>
+              <a:t>decision(result1)</a:t>
+            </a:r>
+          </a:p>
+        </p:txBody>
+      </p:sp>
+      <p:sp>
+        <p:nvSpPr>
+          <p:cNvPr id="112" name="Rectangle 111">
+            <a:extLst>
+              <a:ext uri="{FF2B5EF4-FFF2-40B4-BE49-F238E27FC236}">
+                <a16:creationId xmlns:a16="http://schemas.microsoft.com/office/drawing/2014/main" id="{EE222F82-EEFF-4791-9215-DE6F748A6A42}"/>
+              </a:ext>
+            </a:extLst>
+          </p:cNvPr>
+          <p:cNvSpPr/>
+          <p:nvPr/>
+        </p:nvSpPr>
+        <p:spPr>
+          <a:xfrm>
+            <a:off x="5348113" y="2600119"/>
+            <a:ext cx="1227772" cy="276999"/>
+          </a:xfrm>
+          <a:prstGeom prst="rect">
+            <a:avLst/>
+          </a:prstGeom>
+        </p:spPr>
+        <p:txBody>
+          <a:bodyPr wrap="none">
+            <a:spAutoFit/>
+          </a:bodyPr>
+          <a:lstStyle/>
+          <a:p>
+            <a:r>
+              <a:rPr lang="en-US" sz="1200" dirty="0"/>
+              <a:t>decision(result2)</a:t>
+            </a:r>
+          </a:p>
+        </p:txBody>
+      </p:sp>
+      <p:sp>
+        <p:nvSpPr>
+          <p:cNvPr id="114" name="Rectangle 113">
+            <a:extLst>
+              <a:ext uri="{FF2B5EF4-FFF2-40B4-BE49-F238E27FC236}">
+                <a16:creationId xmlns:a16="http://schemas.microsoft.com/office/drawing/2014/main" id="{6EF1276D-A384-4482-9639-3AC28CDAD415}"/>
+              </a:ext>
+            </a:extLst>
+          </p:cNvPr>
+          <p:cNvSpPr/>
+          <p:nvPr/>
+        </p:nvSpPr>
+        <p:spPr>
+          <a:xfrm>
+            <a:off x="5284638" y="5213996"/>
+            <a:ext cx="1941365" cy="276999"/>
+          </a:xfrm>
+          <a:prstGeom prst="rect">
+            <a:avLst/>
+          </a:prstGeom>
+        </p:spPr>
+        <p:txBody>
+          <a:bodyPr wrap="none">
+            <a:spAutoFit/>
+          </a:bodyPr>
+          <a:lstStyle/>
+          <a:p>
+            <a:r>
+              <a:rPr lang="en-US" sz="1200" dirty="0"/>
+              <a:t>decision(undefined, reason)</a:t>
+            </a:r>
+          </a:p>
+        </p:txBody>
+      </p:sp>
+      <p:sp>
+        <p:nvSpPr>
+          <p:cNvPr id="115" name="Rectangle 114">
+            <a:extLst>
+              <a:ext uri="{FF2B5EF4-FFF2-40B4-BE49-F238E27FC236}">
+                <a16:creationId xmlns:a16="http://schemas.microsoft.com/office/drawing/2014/main" id="{3BC2B0EA-B7B2-4A73-BECD-D51317216D68}"/>
+              </a:ext>
+            </a:extLst>
+          </p:cNvPr>
+          <p:cNvSpPr/>
+          <p:nvPr/>
+        </p:nvSpPr>
+        <p:spPr>
+          <a:xfrm>
+            <a:off x="2177292" y="5213995"/>
+            <a:ext cx="1941365" cy="276999"/>
+          </a:xfrm>
+          <a:prstGeom prst="rect">
+            <a:avLst/>
+          </a:prstGeom>
+        </p:spPr>
+        <p:txBody>
+          <a:bodyPr wrap="none">
+            <a:spAutoFit/>
+          </a:bodyPr>
+          <a:lstStyle/>
+          <a:p>
+            <a:r>
+              <a:rPr lang="en-US" sz="1200" dirty="0"/>
+              <a:t>decision(undefined, reason)</a:t>
+            </a:r>
+          </a:p>
+        </p:txBody>
+      </p:sp>
+      <p:sp>
+        <p:nvSpPr>
+          <p:cNvPr id="116" name="Rectangle 115">
+            <a:extLst>
+              <a:ext uri="{FF2B5EF4-FFF2-40B4-BE49-F238E27FC236}">
+                <a16:creationId xmlns:a16="http://schemas.microsoft.com/office/drawing/2014/main" id="{0F288824-891E-40D5-9D10-975C22A778C0}"/>
+              </a:ext>
+            </a:extLst>
+          </p:cNvPr>
+          <p:cNvSpPr/>
+          <p:nvPr/>
+        </p:nvSpPr>
+        <p:spPr>
+          <a:xfrm>
+            <a:off x="5466924" y="4655600"/>
+            <a:ext cx="1830501" cy="276999"/>
+          </a:xfrm>
+          <a:prstGeom prst="rect">
+            <a:avLst/>
+          </a:prstGeom>
+        </p:spPr>
+        <p:txBody>
+          <a:bodyPr wrap="none">
+            <a:spAutoFit/>
+          </a:bodyPr>
+          <a:lstStyle/>
+          <a:p>
+            <a:r>
+              <a:rPr lang="en-US" sz="1200" dirty="0"/>
+              <a:t>activity3(decision, result2)</a:t>
+            </a:r>
+          </a:p>
+        </p:txBody>
+      </p:sp>
+      <p:sp>
+        <p:nvSpPr>
+          <p:cNvPr id="118" name="Rectangle 117">
+            <a:extLst>
+              <a:ext uri="{FF2B5EF4-FFF2-40B4-BE49-F238E27FC236}">
+                <a16:creationId xmlns:a16="http://schemas.microsoft.com/office/drawing/2014/main" id="{AE2A7314-BD6E-4BE5-A912-09EE88F758CD}"/>
+              </a:ext>
+            </a:extLst>
+          </p:cNvPr>
+          <p:cNvSpPr/>
+          <p:nvPr/>
+        </p:nvSpPr>
+        <p:spPr>
+          <a:xfrm>
+            <a:off x="2370306" y="4655600"/>
+            <a:ext cx="1843325" cy="276999"/>
+          </a:xfrm>
+          <a:prstGeom prst="rect">
+            <a:avLst/>
+          </a:prstGeom>
+        </p:spPr>
+        <p:txBody>
+          <a:bodyPr wrap="none">
+            <a:spAutoFit/>
+          </a:bodyPr>
+          <a:lstStyle/>
+          <a:p>
+            <a:r>
+              <a:rPr lang="en-US" sz="1200" dirty="0"/>
+              <a:t>activity2(activity3, result1)</a:t>
+            </a:r>
+          </a:p>
+        </p:txBody>
+      </p:sp>
+      <p:sp>
+        <p:nvSpPr>
+          <p:cNvPr id="122" name="Rectangle 121">
+            <a:extLst>
+              <a:ext uri="{FF2B5EF4-FFF2-40B4-BE49-F238E27FC236}">
+                <a16:creationId xmlns:a16="http://schemas.microsoft.com/office/drawing/2014/main" id="{D304B5A5-69C9-436A-BF73-C49076B90301}"/>
+              </a:ext>
+            </a:extLst>
+          </p:cNvPr>
+          <p:cNvSpPr/>
+          <p:nvPr/>
+        </p:nvSpPr>
+        <p:spPr>
+          <a:xfrm>
+            <a:off x="8476237" y="4655599"/>
+            <a:ext cx="1227772" cy="276999"/>
+          </a:xfrm>
+          <a:prstGeom prst="rect">
+            <a:avLst/>
+          </a:prstGeom>
+        </p:spPr>
+        <p:txBody>
+          <a:bodyPr wrap="none">
+            <a:spAutoFit/>
+          </a:bodyPr>
+          <a:lstStyle/>
+          <a:p>
+            <a:r>
+              <a:rPr lang="en-US" sz="1200" dirty="0"/>
+              <a:t>decision(result3)</a:t>
+            </a:r>
+          </a:p>
+        </p:txBody>
+      </p:sp>
+    </p:spTree>
+    <p:extLst>
+      <p:ext uri="{BB962C8B-B14F-4D97-AF65-F5344CB8AC3E}">
+        <p14:creationId xmlns:p14="http://schemas.microsoft.com/office/powerpoint/2010/main" val="566135788"/>
+      </p:ext>
+    </p:extLst>
+  </p:cSld>
+  <p:clrMapOvr>
+    <a:masterClrMapping/>
+  </p:clrMapOvr>
+</p:sld>
+</file>
+
+<file path=ppt/slides/slide3.xml><?xml version="1.0" encoding="utf-8"?>
+<p:sld xmlns:a="http://schemas.openxmlformats.org/drawingml/2006/main" xmlns:r="http://schemas.openxmlformats.org/officeDocument/2006/relationships" xmlns:p="http://schemas.openxmlformats.org/presentationml/2006/main">
+  <p:cSld>
+    <p:spTree>
+      <p:nvGrpSpPr>
+        <p:cNvPr id="1" name=""/>
+        <p:cNvGrpSpPr/>
+        <p:nvPr/>
+      </p:nvGrpSpPr>
+      <p:grpSpPr>
+        <a:xfrm>
+          <a:off x="0" y="0"/>
+          <a:ext cx="0" cy="0"/>
+          <a:chOff x="0" y="0"/>
+          <a:chExt cx="0" cy="0"/>
+        </a:xfrm>
+      </p:grpSpPr>
+      <p:sp>
+        <p:nvSpPr>
+          <p:cNvPr id="2" name="Title 1">
+            <a:extLst>
+              <a:ext uri="{FF2B5EF4-FFF2-40B4-BE49-F238E27FC236}">
+                <a16:creationId xmlns:a16="http://schemas.microsoft.com/office/drawing/2014/main" id="{6B1BED12-2AFD-4E41-9BB8-2982380D1F71}"/>
+              </a:ext>
+            </a:extLst>
+          </p:cNvPr>
+          <p:cNvSpPr>
+            <a:spLocks noGrp="1"/>
+          </p:cNvSpPr>
+          <p:nvPr>
+            <p:ph type="title"/>
+          </p:nvPr>
+        </p:nvSpPr>
+        <p:spPr/>
+        <p:txBody>
+          <a:bodyPr/>
+          <a:lstStyle/>
+          <a:p>
+            <a:r>
+              <a:rPr lang="en-US" dirty="0"/>
+              <a:t>Problem: right-to-left evaluation unreadable programs</a:t>
+            </a:r>
+          </a:p>
+        </p:txBody>
+      </p:sp>
+      <p:pic>
+        <p:nvPicPr>
+          <p:cNvPr id="4" name="Content Placeholder 3">
+            <a:extLst>
+              <a:ext uri="{FF2B5EF4-FFF2-40B4-BE49-F238E27FC236}">
+                <a16:creationId xmlns:a16="http://schemas.microsoft.com/office/drawing/2014/main" id="{3AE63BB2-C60A-4F86-B543-55D532AF5680}"/>
+              </a:ext>
+            </a:extLst>
+          </p:cNvPr>
+          <p:cNvPicPr>
+            <a:picLocks noGrp="1" noChangeAspect="1"/>
+          </p:cNvPicPr>
+          <p:nvPr>
+            <p:ph idx="1"/>
+          </p:nvPr>
+        </p:nvPicPr>
+        <p:blipFill>
+          <a:blip r:embed="rId2"/>
+          <a:stretch>
+            <a:fillRect/>
+          </a:stretch>
+        </p:blipFill>
+        <p:spPr>
+          <a:xfrm>
+            <a:off x="1114425" y="2934494"/>
+            <a:ext cx="9963150" cy="2133600"/>
+          </a:xfrm>
+          <a:prstGeom prst="rect">
+            <a:avLst/>
+          </a:prstGeom>
+        </p:spPr>
+      </p:pic>
+    </p:spTree>
+    <p:extLst>
+      <p:ext uri="{BB962C8B-B14F-4D97-AF65-F5344CB8AC3E}">
+        <p14:creationId xmlns:p14="http://schemas.microsoft.com/office/powerpoint/2010/main" val="3187075728"/>
+      </p:ext>
+    </p:extLst>
+  </p:cSld>
+  <p:clrMapOvr>
+    <a:masterClrMapping/>
+  </p:clrMapOvr>
+</p:sld>
+</file>
+
+<file path=ppt/slides/slide4.xml><?xml version="1.0" encoding="utf-8"?>
+<p:sld xmlns:a="http://schemas.openxmlformats.org/drawingml/2006/main" xmlns:r="http://schemas.openxmlformats.org/officeDocument/2006/relationships" xmlns:p="http://schemas.openxmlformats.org/presentationml/2006/main">
+  <p:cSld>
+    <p:spTree>
+      <p:nvGrpSpPr>
+        <p:cNvPr id="1" name=""/>
+        <p:cNvGrpSpPr/>
+        <p:nvPr/>
+      </p:nvGrpSpPr>
+      <p:grpSpPr>
+        <a:xfrm>
+          <a:off x="0" y="0"/>
+          <a:ext cx="0" cy="0"/>
+          <a:chOff x="0" y="0"/>
+          <a:chExt cx="0" cy="0"/>
+        </a:xfrm>
+      </p:grpSpPr>
       <p:grpSp>
         <p:nvGrpSpPr>
           <p:cNvPr id="350" name="Group 349">
@@ -11710,7 +13849,7 @@
 </p:sld>
 </file>
 
-<file path=ppt/slides/slide3.xml><?xml version="1.0" encoding="utf-8"?>
+<file path=ppt/slides/slide5.xml><?xml version="1.0" encoding="utf-8"?>
 <p:sld xmlns:a="http://schemas.openxmlformats.org/drawingml/2006/main" xmlns:r="http://schemas.openxmlformats.org/officeDocument/2006/relationships" xmlns:p="http://schemas.openxmlformats.org/presentationml/2006/main">
   <p:cSld>
     <p:spTree>
@@ -11840,7 +13979,7 @@
 </p:sld>
 </file>
 
-<file path=ppt/slides/slide4.xml><?xml version="1.0" encoding="utf-8"?>
+<file path=ppt/slides/slide6.xml><?xml version="1.0" encoding="utf-8"?>
 <p:sld xmlns:a="http://schemas.openxmlformats.org/drawingml/2006/main" xmlns:r="http://schemas.openxmlformats.org/officeDocument/2006/relationships" xmlns:p="http://schemas.openxmlformats.org/presentationml/2006/main">
   <p:cSld>
     <p:spTree>
@@ -12384,7 +14523,7 @@
 </p:sld>
 </file>
 
-<file path=ppt/slides/slide5.xml><?xml version="1.0" encoding="utf-8"?>
+<file path=ppt/slides/slide7.xml><?xml version="1.0" encoding="utf-8"?>
 <p:sld xmlns:a="http://schemas.openxmlformats.org/drawingml/2006/main" xmlns:r="http://schemas.openxmlformats.org/officeDocument/2006/relationships" xmlns:p="http://schemas.openxmlformats.org/presentationml/2006/main">
   <p:cSld>
     <p:spTree>
@@ -12509,7 +14648,7 @@
 </p:sld>
 </file>
 
-<file path=ppt/slides/slide6.xml><?xml version="1.0" encoding="utf-8"?>
+<file path=ppt/slides/slide8.xml><?xml version="1.0" encoding="utf-8"?>
 <p:sld xmlns:a="http://schemas.openxmlformats.org/drawingml/2006/main" xmlns:r="http://schemas.openxmlformats.org/officeDocument/2006/relationships" xmlns:p="http://schemas.openxmlformats.org/presentationml/2006/main">
   <p:cSld>
     <p:spTree>

</xml_diff>

<commit_message>
Update diagrams, expanded sequence and fallback
</commit_message>
<xml_diff>
--- a/public/documentation/sources/Hum.pptx
+++ b/public/documentation/sources/Hum.pptx
@@ -119,1878 +119,6 @@
 </p:presentation>
 </file>
 
-<file path=ppt/revisionInfo.xml><?xml version="1.0" encoding="utf-8"?>
-<p1510:revInfo xmlns:a="http://schemas.openxmlformats.org/drawingml/2006/main" xmlns:r="http://schemas.openxmlformats.org/officeDocument/2006/relationships" xmlns:p1510="http://schemas.microsoft.com/office/powerpoint/2015/10/main">
-  <p1510:revLst>
-    <p1510:client id="{9BD08692-A93F-4392-A80C-735B1850CC3F}" v="138" dt="2019-11-05T04:10:05.161"/>
-  </p1510:revLst>
-</p1510:revInfo>
-</file>
-
-<file path=ppt/changesInfos/changesInfo1.xml><?xml version="1.0" encoding="utf-8"?>
-<pc:chgInfo xmlns:a="http://schemas.openxmlformats.org/drawingml/2006/main" xmlns:r="http://schemas.openxmlformats.org/officeDocument/2006/relationships" xmlns:ac="http://schemas.microsoft.com/office/drawing/2013/main/command" xmlns:pc="http://schemas.microsoft.com/office/powerpoint/2013/main/command">
-  <pc:docChgLst>
-    <pc:chgData name="Carlos Quesada" userId="c0ed732e786a5da1" providerId="LiveId" clId="{9BD08692-A93F-4392-A80C-735B1850CC3F}"/>
-    <pc:docChg chg="undo redo custSel addSld delSld modSld">
-      <pc:chgData name="Carlos Quesada" userId="c0ed732e786a5da1" providerId="LiveId" clId="{9BD08692-A93F-4392-A80C-735B1850CC3F}" dt="2019-11-05T04:10:24.732" v="2633" actId="14100"/>
-      <pc:docMkLst>
-        <pc:docMk/>
-      </pc:docMkLst>
-      <pc:sldChg chg="addSp delSp modSp">
-        <pc:chgData name="Carlos Quesada" userId="c0ed732e786a5da1" providerId="LiveId" clId="{9BD08692-A93F-4392-A80C-735B1850CC3F}" dt="2019-11-03T03:38:05.490" v="1496" actId="207"/>
-        <pc:sldMkLst>
-          <pc:docMk/>
-          <pc:sldMk cId="666542315" sldId="256"/>
-        </pc:sldMkLst>
-        <pc:spChg chg="mod">
-          <ac:chgData name="Carlos Quesada" userId="c0ed732e786a5da1" providerId="LiveId" clId="{9BD08692-A93F-4392-A80C-735B1850CC3F}" dt="2019-11-03T03:33:51.633" v="1493" actId="20577"/>
-          <ac:spMkLst>
-            <pc:docMk/>
-            <pc:sldMk cId="666542315" sldId="256"/>
-            <ac:spMk id="10" creationId="{B2A35F1C-3ACC-41FF-8632-486370A9612F}"/>
-          </ac:spMkLst>
-        </pc:spChg>
-        <pc:spChg chg="mod">
-          <ac:chgData name="Carlos Quesada" userId="c0ed732e786a5da1" providerId="LiveId" clId="{9BD08692-A93F-4392-A80C-735B1850CC3F}" dt="2019-11-02T22:45:14.425" v="992" actId="164"/>
-          <ac:spMkLst>
-            <pc:docMk/>
-            <pc:sldMk cId="666542315" sldId="256"/>
-            <ac:spMk id="11" creationId="{D8EB0CE4-1FD2-470D-96B2-9C45758CD755}"/>
-          </ac:spMkLst>
-        </pc:spChg>
-        <pc:spChg chg="mod topLvl">
-          <ac:chgData name="Carlos Quesada" userId="c0ed732e786a5da1" providerId="LiveId" clId="{9BD08692-A93F-4392-A80C-735B1850CC3F}" dt="2019-11-02T22:04:55.558" v="239" actId="14100"/>
-          <ac:spMkLst>
-            <pc:docMk/>
-            <pc:sldMk cId="666542315" sldId="256"/>
-            <ac:spMk id="30" creationId="{A1D95C9A-CAE6-489F-A010-3A155E46EF95}"/>
-          </ac:spMkLst>
-        </pc:spChg>
-        <pc:spChg chg="mod topLvl">
-          <ac:chgData name="Carlos Quesada" userId="c0ed732e786a5da1" providerId="LiveId" clId="{9BD08692-A93F-4392-A80C-735B1850CC3F}" dt="2019-11-02T22:02:55.526" v="207" actId="1076"/>
-          <ac:spMkLst>
-            <pc:docMk/>
-            <pc:sldMk cId="666542315" sldId="256"/>
-            <ac:spMk id="31" creationId="{69A4F743-AD77-4C6F-8653-3E5954457EE5}"/>
-          </ac:spMkLst>
-        </pc:spChg>
-        <pc:spChg chg="mod">
-          <ac:chgData name="Carlos Quesada" userId="c0ed732e786a5da1" providerId="LiveId" clId="{9BD08692-A93F-4392-A80C-735B1850CC3F}" dt="2019-11-02T22:45:14.425" v="992" actId="164"/>
-          <ac:spMkLst>
-            <pc:docMk/>
-            <pc:sldMk cId="666542315" sldId="256"/>
-            <ac:spMk id="51" creationId="{55237D86-D223-42D7-BF5A-EE6774A58764}"/>
-          </ac:spMkLst>
-        </pc:spChg>
-        <pc:spChg chg="mod">
-          <ac:chgData name="Carlos Quesada" userId="c0ed732e786a5da1" providerId="LiveId" clId="{9BD08692-A93F-4392-A80C-735B1850CC3F}" dt="2019-11-02T22:45:02.243" v="989" actId="164"/>
-          <ac:spMkLst>
-            <pc:docMk/>
-            <pc:sldMk cId="666542315" sldId="256"/>
-            <ac:spMk id="54" creationId="{735F9DBA-5CB1-456C-96F2-65071332B2D1}"/>
-          </ac:spMkLst>
-        </pc:spChg>
-        <pc:spChg chg="mod">
-          <ac:chgData name="Carlos Quesada" userId="c0ed732e786a5da1" providerId="LiveId" clId="{9BD08692-A93F-4392-A80C-735B1850CC3F}" dt="2019-11-01T05:46:06.591" v="0" actId="1076"/>
-          <ac:spMkLst>
-            <pc:docMk/>
-            <pc:sldMk cId="666542315" sldId="256"/>
-            <ac:spMk id="58" creationId="{8B652205-9CD7-4D18-9A0A-F079DB665FAF}"/>
-          </ac:spMkLst>
-        </pc:spChg>
-        <pc:spChg chg="mod">
-          <ac:chgData name="Carlos Quesada" userId="c0ed732e786a5da1" providerId="LiveId" clId="{9BD08692-A93F-4392-A80C-735B1850CC3F}" dt="2019-11-02T22:45:02.243" v="989" actId="164"/>
-          <ac:spMkLst>
-            <pc:docMk/>
-            <pc:sldMk cId="666542315" sldId="256"/>
-            <ac:spMk id="72" creationId="{565DB360-9004-4ED2-B4FD-07365E27B4D2}"/>
-          </ac:spMkLst>
-        </pc:spChg>
-        <pc:spChg chg="mod">
-          <ac:chgData name="Carlos Quesada" userId="c0ed732e786a5da1" providerId="LiveId" clId="{9BD08692-A93F-4392-A80C-735B1850CC3F}" dt="2019-11-02T22:45:02.243" v="989" actId="164"/>
-          <ac:spMkLst>
-            <pc:docMk/>
-            <pc:sldMk cId="666542315" sldId="256"/>
-            <ac:spMk id="82" creationId="{74AC24E2-DC44-468E-977C-792F73D705DD}"/>
-          </ac:spMkLst>
-        </pc:spChg>
-        <pc:spChg chg="mod">
-          <ac:chgData name="Carlos Quesada" userId="c0ed732e786a5da1" providerId="LiveId" clId="{9BD08692-A93F-4392-A80C-735B1850CC3F}" dt="2019-11-02T22:45:02.243" v="989" actId="164"/>
-          <ac:spMkLst>
-            <pc:docMk/>
-            <pc:sldMk cId="666542315" sldId="256"/>
-            <ac:spMk id="88" creationId="{C15C70EF-7B4C-473F-887A-9FDB64EAE99B}"/>
-          </ac:spMkLst>
-        </pc:spChg>
-        <pc:spChg chg="mod topLvl">
-          <ac:chgData name="Carlos Quesada" userId="c0ed732e786a5da1" providerId="LiveId" clId="{9BD08692-A93F-4392-A80C-735B1850CC3F}" dt="2019-11-03T03:37:51.582" v="1494" actId="165"/>
-          <ac:spMkLst>
-            <pc:docMk/>
-            <pc:sldMk cId="666542315" sldId="256"/>
-            <ac:spMk id="95" creationId="{C98446F1-43F7-4C08-AACC-B5358BEFB710}"/>
-          </ac:spMkLst>
-        </pc:spChg>
-        <pc:spChg chg="mod">
-          <ac:chgData name="Carlos Quesada" userId="c0ed732e786a5da1" providerId="LiveId" clId="{9BD08692-A93F-4392-A80C-735B1850CC3F}" dt="2019-11-02T22:45:06.067" v="990" actId="164"/>
-          <ac:spMkLst>
-            <pc:docMk/>
-            <pc:sldMk cId="666542315" sldId="256"/>
-            <ac:spMk id="96" creationId="{EC50BD75-2E64-465F-A1D6-40F1428C9193}"/>
-          </ac:spMkLst>
-        </pc:spChg>
-        <pc:spChg chg="mod">
-          <ac:chgData name="Carlos Quesada" userId="c0ed732e786a5da1" providerId="LiveId" clId="{9BD08692-A93F-4392-A80C-735B1850CC3F}" dt="2019-11-02T22:45:06.067" v="990" actId="164"/>
-          <ac:spMkLst>
-            <pc:docMk/>
-            <pc:sldMk cId="666542315" sldId="256"/>
-            <ac:spMk id="106" creationId="{E4D92D40-90E4-4DDD-9ADB-AA6479A4493B}"/>
-          </ac:spMkLst>
-        </pc:spChg>
-        <pc:spChg chg="mod">
-          <ac:chgData name="Carlos Quesada" userId="c0ed732e786a5da1" providerId="LiveId" clId="{9BD08692-A93F-4392-A80C-735B1850CC3F}" dt="2019-11-02T22:45:06.067" v="990" actId="164"/>
-          <ac:spMkLst>
-            <pc:docMk/>
-            <pc:sldMk cId="666542315" sldId="256"/>
-            <ac:spMk id="111" creationId="{FE00284F-8E9D-4E3D-A0DA-F4DBEA1D0F91}"/>
-          </ac:spMkLst>
-        </pc:spChg>
-        <pc:spChg chg="mod">
-          <ac:chgData name="Carlos Quesada" userId="c0ed732e786a5da1" providerId="LiveId" clId="{9BD08692-A93F-4392-A80C-735B1850CC3F}" dt="2019-11-02T22:45:06.067" v="990" actId="164"/>
-          <ac:spMkLst>
-            <pc:docMk/>
-            <pc:sldMk cId="666542315" sldId="256"/>
-            <ac:spMk id="123" creationId="{E8B7DE2B-B790-48B1-A1DA-0121EDBF3E01}"/>
-          </ac:spMkLst>
-        </pc:spChg>
-        <pc:spChg chg="mod">
-          <ac:chgData name="Carlos Quesada" userId="c0ed732e786a5da1" providerId="LiveId" clId="{9BD08692-A93F-4392-A80C-735B1850CC3F}" dt="2019-11-02T22:45:06.067" v="990" actId="164"/>
-          <ac:spMkLst>
-            <pc:docMk/>
-            <pc:sldMk cId="666542315" sldId="256"/>
-            <ac:spMk id="129" creationId="{7394365D-FB0D-4F25-8D67-C6753AD42A8A}"/>
-          </ac:spMkLst>
-        </pc:spChg>
-        <pc:spChg chg="mod">
-          <ac:chgData name="Carlos Quesada" userId="c0ed732e786a5da1" providerId="LiveId" clId="{9BD08692-A93F-4392-A80C-735B1850CC3F}" dt="2019-11-02T22:45:06.067" v="990" actId="164"/>
-          <ac:spMkLst>
-            <pc:docMk/>
-            <pc:sldMk cId="666542315" sldId="256"/>
-            <ac:spMk id="152" creationId="{49E27D63-F47E-46E6-A231-625EA11F6C74}"/>
-          </ac:spMkLst>
-        </pc:spChg>
-        <pc:spChg chg="mod">
-          <ac:chgData name="Carlos Quesada" userId="c0ed732e786a5da1" providerId="LiveId" clId="{9BD08692-A93F-4392-A80C-735B1850CC3F}" dt="2019-11-02T22:45:06.067" v="990" actId="164"/>
-          <ac:spMkLst>
-            <pc:docMk/>
-            <pc:sldMk cId="666542315" sldId="256"/>
-            <ac:spMk id="153" creationId="{F7529302-9D82-4D21-BEBB-54667E7FFAD0}"/>
-          </ac:spMkLst>
-        </pc:spChg>
-        <pc:spChg chg="mod">
-          <ac:chgData name="Carlos Quesada" userId="c0ed732e786a5da1" providerId="LiveId" clId="{9BD08692-A93F-4392-A80C-735B1850CC3F}" dt="2019-11-02T22:45:02.243" v="989" actId="164"/>
-          <ac:spMkLst>
-            <pc:docMk/>
-            <pc:sldMk cId="666542315" sldId="256"/>
-            <ac:spMk id="158" creationId="{086731A4-E1F1-432D-ACD5-64FDEEFF49C0}"/>
-          </ac:spMkLst>
-        </pc:spChg>
-        <pc:spChg chg="mod">
-          <ac:chgData name="Carlos Quesada" userId="c0ed732e786a5da1" providerId="LiveId" clId="{9BD08692-A93F-4392-A80C-735B1850CC3F}" dt="2019-11-02T22:45:02.243" v="989" actId="164"/>
-          <ac:spMkLst>
-            <pc:docMk/>
-            <pc:sldMk cId="666542315" sldId="256"/>
-            <ac:spMk id="159" creationId="{B79D64FB-3C90-4F49-ACEC-F1428DFA0C9D}"/>
-          </ac:spMkLst>
-        </pc:spChg>
-        <pc:spChg chg="add mod">
-          <ac:chgData name="Carlos Quesada" userId="c0ed732e786a5da1" providerId="LiveId" clId="{9BD08692-A93F-4392-A80C-735B1850CC3F}" dt="2019-11-02T22:45:02.243" v="989" actId="164"/>
-          <ac:spMkLst>
-            <pc:docMk/>
-            <pc:sldMk cId="666542315" sldId="256"/>
-            <ac:spMk id="168" creationId="{931BD952-1907-4136-A093-336F73B27107}"/>
-          </ac:spMkLst>
-        </pc:spChg>
-        <pc:spChg chg="add mod">
-          <ac:chgData name="Carlos Quesada" userId="c0ed732e786a5da1" providerId="LiveId" clId="{9BD08692-A93F-4392-A80C-735B1850CC3F}" dt="2019-11-03T03:31:48.530" v="1435" actId="114"/>
-          <ac:spMkLst>
-            <pc:docMk/>
-            <pc:sldMk cId="666542315" sldId="256"/>
-            <ac:spMk id="170" creationId="{346F9FE3-F5F3-4891-BACB-C43189A015C4}"/>
-          </ac:spMkLst>
-        </pc:spChg>
-        <pc:spChg chg="mod topLvl">
-          <ac:chgData name="Carlos Quesada" userId="c0ed732e786a5da1" providerId="LiveId" clId="{9BD08692-A93F-4392-A80C-735B1850CC3F}" dt="2019-11-02T22:05:04.597" v="243" actId="14100"/>
-          <ac:spMkLst>
-            <pc:docMk/>
-            <pc:sldMk cId="666542315" sldId="256"/>
-            <ac:spMk id="172" creationId="{DC7ACD07-EADA-425A-9C0C-BC0ED711393C}"/>
-          </ac:spMkLst>
-        </pc:spChg>
-        <pc:spChg chg="del mod topLvl">
-          <ac:chgData name="Carlos Quesada" userId="c0ed732e786a5da1" providerId="LiveId" clId="{9BD08692-A93F-4392-A80C-735B1850CC3F}" dt="2019-11-02T21:53:50.628" v="77"/>
-          <ac:spMkLst>
-            <pc:docMk/>
-            <pc:sldMk cId="666542315" sldId="256"/>
-            <ac:spMk id="173" creationId="{86D127EA-F579-4938-915F-098C59B22309}"/>
-          </ac:spMkLst>
-        </pc:spChg>
-        <pc:spChg chg="add mod">
-          <ac:chgData name="Carlos Quesada" userId="c0ed732e786a5da1" providerId="LiveId" clId="{9BD08692-A93F-4392-A80C-735B1850CC3F}" dt="2019-11-02T21:55:42.762" v="121" actId="164"/>
-          <ac:spMkLst>
-            <pc:docMk/>
-            <pc:sldMk cId="666542315" sldId="256"/>
-            <ac:spMk id="185" creationId="{83DFFF60-D8DE-497D-800F-C56038701FA8}"/>
-          </ac:spMkLst>
-        </pc:spChg>
-        <pc:spChg chg="add del">
-          <ac:chgData name="Carlos Quesada" userId="c0ed732e786a5da1" providerId="LiveId" clId="{9BD08692-A93F-4392-A80C-735B1850CC3F}" dt="2019-11-02T21:54:21.795" v="83"/>
-          <ac:spMkLst>
-            <pc:docMk/>
-            <pc:sldMk cId="666542315" sldId="256"/>
-            <ac:spMk id="188" creationId="{614D9720-1AA8-4A85-88A5-AE769BE38DA9}"/>
-          </ac:spMkLst>
-        </pc:spChg>
-        <pc:spChg chg="add del">
-          <ac:chgData name="Carlos Quesada" userId="c0ed732e786a5da1" providerId="LiveId" clId="{9BD08692-A93F-4392-A80C-735B1850CC3F}" dt="2019-11-02T21:54:21.795" v="83"/>
-          <ac:spMkLst>
-            <pc:docMk/>
-            <pc:sldMk cId="666542315" sldId="256"/>
-            <ac:spMk id="189" creationId="{36DF8131-AE74-4811-B60E-85388CD94F1C}"/>
-          </ac:spMkLst>
-        </pc:spChg>
-        <pc:spChg chg="mod">
-          <ac:chgData name="Carlos Quesada" userId="c0ed732e786a5da1" providerId="LiveId" clId="{9BD08692-A93F-4392-A80C-735B1850CC3F}" dt="2019-11-02T21:54:29.732" v="86" actId="1076"/>
-          <ac:spMkLst>
-            <pc:docMk/>
-            <pc:sldMk cId="666542315" sldId="256"/>
-            <ac:spMk id="192" creationId="{4637B69E-56C8-42F6-AEBD-BE9F539C7EEE}"/>
-          </ac:spMkLst>
-        </pc:spChg>
-        <pc:spChg chg="mod topLvl">
-          <ac:chgData name="Carlos Quesada" userId="c0ed732e786a5da1" providerId="LiveId" clId="{9BD08692-A93F-4392-A80C-735B1850CC3F}" dt="2019-11-02T22:45:14.425" v="992" actId="164"/>
-          <ac:spMkLst>
-            <pc:docMk/>
-            <pc:sldMk cId="666542315" sldId="256"/>
-            <ac:spMk id="196" creationId="{14C5C4EF-F3AD-40BF-8B02-8A7AB8829751}"/>
-          </ac:spMkLst>
-        </pc:spChg>
-        <pc:spChg chg="mod topLvl">
-          <ac:chgData name="Carlos Quesada" userId="c0ed732e786a5da1" providerId="LiveId" clId="{9BD08692-A93F-4392-A80C-735B1850CC3F}" dt="2019-11-02T22:45:14.425" v="992" actId="164"/>
-          <ac:spMkLst>
-            <pc:docMk/>
-            <pc:sldMk cId="666542315" sldId="256"/>
-            <ac:spMk id="197" creationId="{D6C2EC41-D736-4D2F-9194-6F2574B2E904}"/>
-          </ac:spMkLst>
-        </pc:spChg>
-        <pc:spChg chg="add mod">
-          <ac:chgData name="Carlos Quesada" userId="c0ed732e786a5da1" providerId="LiveId" clId="{9BD08692-A93F-4392-A80C-735B1850CC3F}" dt="2019-11-02T21:57:42.914" v="137" actId="164"/>
-          <ac:spMkLst>
-            <pc:docMk/>
-            <pc:sldMk cId="666542315" sldId="256"/>
-            <ac:spMk id="206" creationId="{3FE54584-F124-4F5A-89A4-4A14EBE9C944}"/>
-          </ac:spMkLst>
-        </pc:spChg>
-        <pc:spChg chg="add mod">
-          <ac:chgData name="Carlos Quesada" userId="c0ed732e786a5da1" providerId="LiveId" clId="{9BD08692-A93F-4392-A80C-735B1850CC3F}" dt="2019-11-02T22:45:14.425" v="992" actId="164"/>
-          <ac:spMkLst>
-            <pc:docMk/>
-            <pc:sldMk cId="666542315" sldId="256"/>
-            <ac:spMk id="207" creationId="{9E4DA092-78B0-4722-B913-64D7AF770420}"/>
-          </ac:spMkLst>
-        </pc:spChg>
-        <pc:spChg chg="add mod">
-          <ac:chgData name="Carlos Quesada" userId="c0ed732e786a5da1" providerId="LiveId" clId="{9BD08692-A93F-4392-A80C-735B1850CC3F}" dt="2019-11-02T22:45:14.425" v="992" actId="164"/>
-          <ac:spMkLst>
-            <pc:docMk/>
-            <pc:sldMk cId="666542315" sldId="256"/>
-            <ac:spMk id="258" creationId="{36B2580F-8E92-426E-AA28-E3CB7531E8E9}"/>
-          </ac:spMkLst>
-        </pc:spChg>
-        <pc:spChg chg="add mod">
-          <ac:chgData name="Carlos Quesada" userId="c0ed732e786a5da1" providerId="LiveId" clId="{9BD08692-A93F-4392-A80C-735B1850CC3F}" dt="2019-11-02T22:45:14.425" v="992" actId="164"/>
-          <ac:spMkLst>
-            <pc:docMk/>
-            <pc:sldMk cId="666542315" sldId="256"/>
-            <ac:spMk id="259" creationId="{D7C1C1A1-7616-493F-B856-8C2CFFE265F4}"/>
-          </ac:spMkLst>
-        </pc:spChg>
-        <pc:spChg chg="add mod">
-          <ac:chgData name="Carlos Quesada" userId="c0ed732e786a5da1" providerId="LiveId" clId="{9BD08692-A93F-4392-A80C-735B1850CC3F}" dt="2019-11-02T22:45:14.425" v="992" actId="164"/>
-          <ac:spMkLst>
-            <pc:docMk/>
-            <pc:sldMk cId="666542315" sldId="256"/>
-            <ac:spMk id="265" creationId="{6AB64E17-C0C8-45D2-BA2B-0A34C571ACF9}"/>
-          </ac:spMkLst>
-        </pc:spChg>
-        <pc:spChg chg="add mod ord">
-          <ac:chgData name="Carlos Quesada" userId="c0ed732e786a5da1" providerId="LiveId" clId="{9BD08692-A93F-4392-A80C-735B1850CC3F}" dt="2019-11-02T22:45:06.067" v="990" actId="164"/>
-          <ac:spMkLst>
-            <pc:docMk/>
-            <pc:sldMk cId="666542315" sldId="256"/>
-            <ac:spMk id="270" creationId="{ED16BC00-970C-4BF4-BF80-309A42237CFC}"/>
-          </ac:spMkLst>
-        </pc:spChg>
-        <pc:spChg chg="add mod ord">
-          <ac:chgData name="Carlos Quesada" userId="c0ed732e786a5da1" providerId="LiveId" clId="{9BD08692-A93F-4392-A80C-735B1850CC3F}" dt="2019-11-02T22:45:02.243" v="989" actId="164"/>
-          <ac:spMkLst>
-            <pc:docMk/>
-            <pc:sldMk cId="666542315" sldId="256"/>
-            <ac:spMk id="271" creationId="{0AB25064-C4BA-495F-BA40-056A6F16C8DA}"/>
-          </ac:spMkLst>
-        </pc:spChg>
-        <pc:spChg chg="mod topLvl">
-          <ac:chgData name="Carlos Quesada" userId="c0ed732e786a5da1" providerId="LiveId" clId="{9BD08692-A93F-4392-A80C-735B1850CC3F}" dt="2019-11-03T03:37:51.582" v="1494" actId="165"/>
-          <ac:spMkLst>
-            <pc:docMk/>
-            <pc:sldMk cId="666542315" sldId="256"/>
-            <ac:spMk id="280" creationId="{AB7F00D2-568C-4AFC-8254-8B54AA40A043}"/>
-          </ac:spMkLst>
-        </pc:spChg>
-        <pc:spChg chg="mod topLvl">
-          <ac:chgData name="Carlos Quesada" userId="c0ed732e786a5da1" providerId="LiveId" clId="{9BD08692-A93F-4392-A80C-735B1850CC3F}" dt="2019-11-03T03:37:51.582" v="1494" actId="165"/>
-          <ac:spMkLst>
-            <pc:docMk/>
-            <pc:sldMk cId="666542315" sldId="256"/>
-            <ac:spMk id="281" creationId="{D2C2DC70-B0DF-4B89-BD2C-CA97E3C8FDB3}"/>
-          </ac:spMkLst>
-        </pc:spChg>
-        <pc:spChg chg="add del">
-          <ac:chgData name="Carlos Quesada" userId="c0ed732e786a5da1" providerId="LiveId" clId="{9BD08692-A93F-4392-A80C-735B1850CC3F}" dt="2019-11-02T22:31:17.195" v="809"/>
-          <ac:spMkLst>
-            <pc:docMk/>
-            <pc:sldMk cId="666542315" sldId="256"/>
-            <ac:spMk id="283" creationId="{D9C3D513-2B33-4640-A943-51CE9843BB23}"/>
-          </ac:spMkLst>
-        </pc:spChg>
-        <pc:spChg chg="add mod topLvl">
-          <ac:chgData name="Carlos Quesada" userId="c0ed732e786a5da1" providerId="LiveId" clId="{9BD08692-A93F-4392-A80C-735B1850CC3F}" dt="2019-11-03T03:37:51.582" v="1494" actId="165"/>
-          <ac:spMkLst>
-            <pc:docMk/>
-            <pc:sldMk cId="666542315" sldId="256"/>
-            <ac:spMk id="284" creationId="{82632296-A69E-4A5C-938A-B8D785187FD0}"/>
-          </ac:spMkLst>
-        </pc:spChg>
-        <pc:spChg chg="mod topLvl">
-          <ac:chgData name="Carlos Quesada" userId="c0ed732e786a5da1" providerId="LiveId" clId="{9BD08692-A93F-4392-A80C-735B1850CC3F}" dt="2019-11-03T03:37:51.582" v="1494" actId="165"/>
-          <ac:spMkLst>
-            <pc:docMk/>
-            <pc:sldMk cId="666542315" sldId="256"/>
-            <ac:spMk id="286" creationId="{91A7B8FB-A7AA-4BFF-A86E-96BDFBFB0BDB}"/>
-          </ac:spMkLst>
-        </pc:spChg>
-        <pc:spChg chg="add mod topLvl">
-          <ac:chgData name="Carlos Quesada" userId="c0ed732e786a5da1" providerId="LiveId" clId="{9BD08692-A93F-4392-A80C-735B1850CC3F}" dt="2019-11-03T03:37:51.582" v="1494" actId="165"/>
-          <ac:spMkLst>
-            <pc:docMk/>
-            <pc:sldMk cId="666542315" sldId="256"/>
-            <ac:spMk id="288" creationId="{576B31EE-94EA-4A6D-89FF-F384A34F0531}"/>
-          </ac:spMkLst>
-        </pc:spChg>
-        <pc:spChg chg="add mod topLvl">
-          <ac:chgData name="Carlos Quesada" userId="c0ed732e786a5da1" providerId="LiveId" clId="{9BD08692-A93F-4392-A80C-735B1850CC3F}" dt="2019-11-03T03:37:51.582" v="1494" actId="165"/>
-          <ac:spMkLst>
-            <pc:docMk/>
-            <pc:sldMk cId="666542315" sldId="256"/>
-            <ac:spMk id="289" creationId="{D387F7EC-512B-4DBD-9D1F-ACBA82CC183A}"/>
-          </ac:spMkLst>
-        </pc:spChg>
-        <pc:spChg chg="add mod topLvl">
-          <ac:chgData name="Carlos Quesada" userId="c0ed732e786a5da1" providerId="LiveId" clId="{9BD08692-A93F-4392-A80C-735B1850CC3F}" dt="2019-11-03T03:37:51.582" v="1494" actId="165"/>
-          <ac:spMkLst>
-            <pc:docMk/>
-            <pc:sldMk cId="666542315" sldId="256"/>
-            <ac:spMk id="290" creationId="{D807701F-002C-44EE-83C4-51A8A7D5F0F6}"/>
-          </ac:spMkLst>
-        </pc:spChg>
-        <pc:spChg chg="add mod topLvl">
-          <ac:chgData name="Carlos Quesada" userId="c0ed732e786a5da1" providerId="LiveId" clId="{9BD08692-A93F-4392-A80C-735B1850CC3F}" dt="2019-11-03T03:37:51.582" v="1494" actId="165"/>
-          <ac:spMkLst>
-            <pc:docMk/>
-            <pc:sldMk cId="666542315" sldId="256"/>
-            <ac:spMk id="310" creationId="{F957171A-0D1A-4B7C-A8A6-098018E614DC}"/>
-          </ac:spMkLst>
-        </pc:spChg>
-        <pc:spChg chg="add mod topLvl">
-          <ac:chgData name="Carlos Quesada" userId="c0ed732e786a5da1" providerId="LiveId" clId="{9BD08692-A93F-4392-A80C-735B1850CC3F}" dt="2019-11-03T03:37:51.582" v="1494" actId="165"/>
-          <ac:spMkLst>
-            <pc:docMk/>
-            <pc:sldMk cId="666542315" sldId="256"/>
-            <ac:spMk id="311" creationId="{5B54CE10-34A5-4D25-926E-56FCF3C08088}"/>
-          </ac:spMkLst>
-        </pc:spChg>
-        <pc:spChg chg="add mod topLvl">
-          <ac:chgData name="Carlos Quesada" userId="c0ed732e786a5da1" providerId="LiveId" clId="{9BD08692-A93F-4392-A80C-735B1850CC3F}" dt="2019-11-03T03:37:51.582" v="1494" actId="165"/>
-          <ac:spMkLst>
-            <pc:docMk/>
-            <pc:sldMk cId="666542315" sldId="256"/>
-            <ac:spMk id="313" creationId="{6C36212C-66EE-42B1-B064-E45F3BBA6669}"/>
-          </ac:spMkLst>
-        </pc:spChg>
-        <pc:spChg chg="add mod topLvl">
-          <ac:chgData name="Carlos Quesada" userId="c0ed732e786a5da1" providerId="LiveId" clId="{9BD08692-A93F-4392-A80C-735B1850CC3F}" dt="2019-11-03T03:37:51.582" v="1494" actId="165"/>
-          <ac:spMkLst>
-            <pc:docMk/>
-            <pc:sldMk cId="666542315" sldId="256"/>
-            <ac:spMk id="314" creationId="{FF004591-9E85-462E-9B36-512B0DF2B003}"/>
-          </ac:spMkLst>
-        </pc:spChg>
-        <pc:spChg chg="add mod ord topLvl">
-          <ac:chgData name="Carlos Quesada" userId="c0ed732e786a5da1" providerId="LiveId" clId="{9BD08692-A93F-4392-A80C-735B1850CC3F}" dt="2019-11-03T03:38:05.490" v="1496" actId="207"/>
-          <ac:spMkLst>
-            <pc:docMk/>
-            <pc:sldMk cId="666542315" sldId="256"/>
-            <ac:spMk id="346" creationId="{1E5181F5-2DE4-4C0D-AD4D-E0CC93FEC37B}"/>
-          </ac:spMkLst>
-        </pc:spChg>
-        <pc:spChg chg="add mod ord">
-          <ac:chgData name="Carlos Quesada" userId="c0ed732e786a5da1" providerId="LiveId" clId="{9BD08692-A93F-4392-A80C-735B1850CC3F}" dt="2019-11-02T22:45:14.425" v="992" actId="164"/>
-          <ac:spMkLst>
-            <pc:docMk/>
-            <pc:sldMk cId="666542315" sldId="256"/>
-            <ac:spMk id="349" creationId="{71A6A709-81B3-4923-8143-61A8355CE117}"/>
-          </ac:spMkLst>
-        </pc:spChg>
-        <pc:spChg chg="mod topLvl">
-          <ac:chgData name="Carlos Quesada" userId="c0ed732e786a5da1" providerId="LiveId" clId="{9BD08692-A93F-4392-A80C-735B1850CC3F}" dt="2019-11-03T03:38:05.490" v="1496" actId="207"/>
-          <ac:spMkLst>
-            <pc:docMk/>
-            <pc:sldMk cId="666542315" sldId="256"/>
-            <ac:spMk id="355" creationId="{6AA99490-6A68-4B5E-9118-ACC9AEC369A5}"/>
-          </ac:spMkLst>
-        </pc:spChg>
-        <pc:spChg chg="mod topLvl">
-          <ac:chgData name="Carlos Quesada" userId="c0ed732e786a5da1" providerId="LiveId" clId="{9BD08692-A93F-4392-A80C-735B1850CC3F}" dt="2019-11-03T03:37:55.917" v="1495" actId="165"/>
-          <ac:spMkLst>
-            <pc:docMk/>
-            <pc:sldMk cId="666542315" sldId="256"/>
-            <ac:spMk id="356" creationId="{FC09FE60-D40B-4477-A986-99AAC2FA8792}"/>
-          </ac:spMkLst>
-        </pc:spChg>
-        <pc:spChg chg="mod topLvl">
-          <ac:chgData name="Carlos Quesada" userId="c0ed732e786a5da1" providerId="LiveId" clId="{9BD08692-A93F-4392-A80C-735B1850CC3F}" dt="2019-11-03T03:37:55.917" v="1495" actId="165"/>
-          <ac:spMkLst>
-            <pc:docMk/>
-            <pc:sldMk cId="666542315" sldId="256"/>
-            <ac:spMk id="358" creationId="{C523985D-5315-4910-AEEE-D0575AE4182B}"/>
-          </ac:spMkLst>
-        </pc:spChg>
-        <pc:spChg chg="mod topLvl">
-          <ac:chgData name="Carlos Quesada" userId="c0ed732e786a5da1" providerId="LiveId" clId="{9BD08692-A93F-4392-A80C-735B1850CC3F}" dt="2019-11-03T03:37:55.917" v="1495" actId="165"/>
-          <ac:spMkLst>
-            <pc:docMk/>
-            <pc:sldMk cId="666542315" sldId="256"/>
-            <ac:spMk id="365" creationId="{5806E040-6D2C-4845-A79D-C4361512DF3B}"/>
-          </ac:spMkLst>
-        </pc:spChg>
-        <pc:spChg chg="mod topLvl">
-          <ac:chgData name="Carlos Quesada" userId="c0ed732e786a5da1" providerId="LiveId" clId="{9BD08692-A93F-4392-A80C-735B1850CC3F}" dt="2019-11-03T03:37:55.917" v="1495" actId="165"/>
-          <ac:spMkLst>
-            <pc:docMk/>
-            <pc:sldMk cId="666542315" sldId="256"/>
-            <ac:spMk id="366" creationId="{2A99EAE2-D05E-43C6-B209-516A144C9A63}"/>
-          </ac:spMkLst>
-        </pc:spChg>
-        <pc:spChg chg="mod topLvl">
-          <ac:chgData name="Carlos Quesada" userId="c0ed732e786a5da1" providerId="LiveId" clId="{9BD08692-A93F-4392-A80C-735B1850CC3F}" dt="2019-11-03T03:37:55.917" v="1495" actId="165"/>
-          <ac:spMkLst>
-            <pc:docMk/>
-            <pc:sldMk cId="666542315" sldId="256"/>
-            <ac:spMk id="373" creationId="{4DF86F46-E7E5-41CC-B9D1-A4B23CE2037C}"/>
-          </ac:spMkLst>
-        </pc:spChg>
-        <pc:spChg chg="mod topLvl">
-          <ac:chgData name="Carlos Quesada" userId="c0ed732e786a5da1" providerId="LiveId" clId="{9BD08692-A93F-4392-A80C-735B1850CC3F}" dt="2019-11-03T03:37:55.917" v="1495" actId="165"/>
-          <ac:spMkLst>
-            <pc:docMk/>
-            <pc:sldMk cId="666542315" sldId="256"/>
-            <ac:spMk id="374" creationId="{30AD659A-57FD-41A8-BC39-62982AAABF9E}"/>
-          </ac:spMkLst>
-        </pc:spChg>
-        <pc:spChg chg="mod topLvl">
-          <ac:chgData name="Carlos Quesada" userId="c0ed732e786a5da1" providerId="LiveId" clId="{9BD08692-A93F-4392-A80C-735B1850CC3F}" dt="2019-11-03T03:37:55.917" v="1495" actId="165"/>
-          <ac:spMkLst>
-            <pc:docMk/>
-            <pc:sldMk cId="666542315" sldId="256"/>
-            <ac:spMk id="375" creationId="{19A039C4-85B7-483D-8765-901DDCBD944A}"/>
-          </ac:spMkLst>
-        </pc:spChg>
-        <pc:spChg chg="mod topLvl">
-          <ac:chgData name="Carlos Quesada" userId="c0ed732e786a5da1" providerId="LiveId" clId="{9BD08692-A93F-4392-A80C-735B1850CC3F}" dt="2019-11-03T03:37:55.917" v="1495" actId="165"/>
-          <ac:spMkLst>
-            <pc:docMk/>
-            <pc:sldMk cId="666542315" sldId="256"/>
-            <ac:spMk id="376" creationId="{6171FADC-AC53-4758-A6BD-16582967C1CC}"/>
-          </ac:spMkLst>
-        </pc:spChg>
-        <pc:spChg chg="mod topLvl">
-          <ac:chgData name="Carlos Quesada" userId="c0ed732e786a5da1" providerId="LiveId" clId="{9BD08692-A93F-4392-A80C-735B1850CC3F}" dt="2019-11-03T03:37:55.917" v="1495" actId="165"/>
-          <ac:spMkLst>
-            <pc:docMk/>
-            <pc:sldMk cId="666542315" sldId="256"/>
-            <ac:spMk id="377" creationId="{ED403663-C641-44F3-9061-263FB4B49211}"/>
-          </ac:spMkLst>
-        </pc:spChg>
-        <pc:spChg chg="mod topLvl">
-          <ac:chgData name="Carlos Quesada" userId="c0ed732e786a5da1" providerId="LiveId" clId="{9BD08692-A93F-4392-A80C-735B1850CC3F}" dt="2019-11-03T03:37:55.917" v="1495" actId="165"/>
-          <ac:spMkLst>
-            <pc:docMk/>
-            <pc:sldMk cId="666542315" sldId="256"/>
-            <ac:spMk id="378" creationId="{65D0C4C3-7ECC-489D-B33A-13828ABE2B9E}"/>
-          </ac:spMkLst>
-        </pc:spChg>
-        <pc:grpChg chg="del mod">
-          <ac:chgData name="Carlos Quesada" userId="c0ed732e786a5da1" providerId="LiveId" clId="{9BD08692-A93F-4392-A80C-735B1850CC3F}" dt="2019-11-02T21:51:40.233" v="44" actId="478"/>
-          <ac:grpSpMkLst>
-            <pc:docMk/>
-            <pc:sldMk cId="666542315" sldId="256"/>
-            <ac:grpSpMk id="24" creationId="{DFBCA106-8DA1-4E61-9852-1D08F67B3F28}"/>
-          </ac:grpSpMkLst>
-        </pc:grpChg>
-        <pc:grpChg chg="del mod">
-          <ac:chgData name="Carlos Quesada" userId="c0ed732e786a5da1" providerId="LiveId" clId="{9BD08692-A93F-4392-A80C-735B1850CC3F}" dt="2019-11-02T21:51:40.233" v="44" actId="478"/>
-          <ac:grpSpMkLst>
-            <pc:docMk/>
-            <pc:sldMk cId="666542315" sldId="256"/>
-            <ac:grpSpMk id="25" creationId="{D254EA64-E817-4284-8D5F-E5DEBAD084E1}"/>
-          </ac:grpSpMkLst>
-        </pc:grpChg>
-        <pc:grpChg chg="del mod">
-          <ac:chgData name="Carlos Quesada" userId="c0ed732e786a5da1" providerId="LiveId" clId="{9BD08692-A93F-4392-A80C-735B1850CC3F}" dt="2019-11-02T21:51:48.725" v="46" actId="165"/>
-          <ac:grpSpMkLst>
-            <pc:docMk/>
-            <pc:sldMk cId="666542315" sldId="256"/>
-            <ac:grpSpMk id="29" creationId="{F4006CC3-415C-491C-B756-1FE6CF7292C7}"/>
-          </ac:grpSpMkLst>
-        </pc:grpChg>
-        <pc:grpChg chg="del mod">
-          <ac:chgData name="Carlos Quesada" userId="c0ed732e786a5da1" providerId="LiveId" clId="{9BD08692-A93F-4392-A80C-735B1850CC3F}" dt="2019-11-02T21:50:43.689" v="27"/>
-          <ac:grpSpMkLst>
-            <pc:docMk/>
-            <pc:sldMk cId="666542315" sldId="256"/>
-            <ac:grpSpMk id="46" creationId="{181BC017-0824-43E4-82A1-91A982B2FF8D}"/>
-          </ac:grpSpMkLst>
-        </pc:grpChg>
-        <pc:grpChg chg="mod">
-          <ac:chgData name="Carlos Quesada" userId="c0ed732e786a5da1" providerId="LiveId" clId="{9BD08692-A93F-4392-A80C-735B1850CC3F}" dt="2019-11-02T22:45:02.243" v="989" actId="164"/>
-          <ac:grpSpMkLst>
-            <pc:docMk/>
-            <pc:sldMk cId="666542315" sldId="256"/>
-            <ac:grpSpMk id="56" creationId="{AAB32CCB-2D7E-46D5-92B1-52FB5490A8A0}"/>
-          </ac:grpSpMkLst>
-        </pc:grpChg>
-        <pc:grpChg chg="mod">
-          <ac:chgData name="Carlos Quesada" userId="c0ed732e786a5da1" providerId="LiveId" clId="{9BD08692-A93F-4392-A80C-735B1850CC3F}" dt="2019-11-02T22:45:02.243" v="989" actId="164"/>
-          <ac:grpSpMkLst>
-            <pc:docMk/>
-            <pc:sldMk cId="666542315" sldId="256"/>
-            <ac:grpSpMk id="67" creationId="{076050FA-E559-412B-B4D8-E79524E140CE}"/>
-          </ac:grpSpMkLst>
-        </pc:grpChg>
-        <pc:grpChg chg="mod">
-          <ac:chgData name="Carlos Quesada" userId="c0ed732e786a5da1" providerId="LiveId" clId="{9BD08692-A93F-4392-A80C-735B1850CC3F}" dt="2019-11-02T22:45:06.067" v="990" actId="164"/>
-          <ac:grpSpMkLst>
-            <pc:docMk/>
-            <pc:sldMk cId="666542315" sldId="256"/>
-            <ac:grpSpMk id="98" creationId="{BBFC636D-32B7-4A92-80CE-FA12E6F0DE71}"/>
-          </ac:grpSpMkLst>
-        </pc:grpChg>
-        <pc:grpChg chg="mod">
-          <ac:chgData name="Carlos Quesada" userId="c0ed732e786a5da1" providerId="LiveId" clId="{9BD08692-A93F-4392-A80C-735B1850CC3F}" dt="2019-11-02T22:45:06.067" v="990" actId="164"/>
-          <ac:grpSpMkLst>
-            <pc:docMk/>
-            <pc:sldMk cId="666542315" sldId="256"/>
-            <ac:grpSpMk id="102" creationId="{D952C019-4955-4B86-89D8-A38DFDCC3FE4}"/>
-          </ac:grpSpMkLst>
-        </pc:grpChg>
-        <pc:grpChg chg="add del">
-          <ac:chgData name="Carlos Quesada" userId="c0ed732e786a5da1" providerId="LiveId" clId="{9BD08692-A93F-4392-A80C-735B1850CC3F}" dt="2019-11-02T21:51:00.281" v="39" actId="165"/>
-          <ac:grpSpMkLst>
-            <pc:docMk/>
-            <pc:sldMk cId="666542315" sldId="256"/>
-            <ac:grpSpMk id="171" creationId="{F1F544D8-ECCD-4CCA-B138-3B8CDD8B8B57}"/>
-          </ac:grpSpMkLst>
-        </pc:grpChg>
-        <pc:grpChg chg="add del mod">
-          <ac:chgData name="Carlos Quesada" userId="c0ed732e786a5da1" providerId="LiveId" clId="{9BD08692-A93F-4392-A80C-735B1850CC3F}" dt="2019-11-02T21:59:29.622" v="156" actId="165"/>
-          <ac:grpSpMkLst>
-            <pc:docMk/>
-            <pc:sldMk cId="666542315" sldId="256"/>
-            <ac:grpSpMk id="187" creationId="{F5EE0AD3-4388-4661-8699-C6641585E160}"/>
-          </ac:grpSpMkLst>
-        </pc:grpChg>
-        <pc:grpChg chg="add del mod">
-          <ac:chgData name="Carlos Quesada" userId="c0ed732e786a5da1" providerId="LiveId" clId="{9BD08692-A93F-4392-A80C-735B1850CC3F}" dt="2019-11-02T21:54:30.116" v="87"/>
-          <ac:grpSpMkLst>
-            <pc:docMk/>
-            <pc:sldMk cId="666542315" sldId="256"/>
-            <ac:grpSpMk id="191" creationId="{E1253B97-BC44-4E5F-B898-698F902E3126}"/>
-          </ac:grpSpMkLst>
-        </pc:grpChg>
-        <pc:grpChg chg="add del mod">
-          <ac:chgData name="Carlos Quesada" userId="c0ed732e786a5da1" providerId="LiveId" clId="{9BD08692-A93F-4392-A80C-735B1850CC3F}" dt="2019-11-02T21:59:42.079" v="160" actId="165"/>
-          <ac:grpSpMkLst>
-            <pc:docMk/>
-            <pc:sldMk cId="666542315" sldId="256"/>
-            <ac:grpSpMk id="195" creationId="{DAAAB714-D83F-4B33-94F5-5D3DB7F7F3EF}"/>
-          </ac:grpSpMkLst>
-        </pc:grpChg>
-        <pc:grpChg chg="add mod">
-          <ac:chgData name="Carlos Quesada" userId="c0ed732e786a5da1" providerId="LiveId" clId="{9BD08692-A93F-4392-A80C-735B1850CC3F}" dt="2019-11-02T22:45:14.425" v="992" actId="164"/>
-          <ac:grpSpMkLst>
-            <pc:docMk/>
-            <pc:sldMk cId="666542315" sldId="256"/>
-            <ac:grpSpMk id="200" creationId="{B2B3D0EF-CB3F-4D57-A062-24FF6F83ECB6}"/>
-          </ac:grpSpMkLst>
-        </pc:grpChg>
-        <pc:grpChg chg="add mod topLvl">
-          <ac:chgData name="Carlos Quesada" userId="c0ed732e786a5da1" providerId="LiveId" clId="{9BD08692-A93F-4392-A80C-735B1850CC3F}" dt="2019-11-02T22:45:14.425" v="992" actId="164"/>
-          <ac:grpSpMkLst>
-            <pc:docMk/>
-            <pc:sldMk cId="666542315" sldId="256"/>
-            <ac:grpSpMk id="211" creationId="{57D6B324-7866-4ECC-9605-878992A599A9}"/>
-          </ac:grpSpMkLst>
-        </pc:grpChg>
-        <pc:grpChg chg="add mod">
-          <ac:chgData name="Carlos Quesada" userId="c0ed732e786a5da1" providerId="LiveId" clId="{9BD08692-A93F-4392-A80C-735B1850CC3F}" dt="2019-11-02T22:45:14.425" v="992" actId="164"/>
-          <ac:grpSpMkLst>
-            <pc:docMk/>
-            <pc:sldMk cId="666542315" sldId="256"/>
-            <ac:grpSpMk id="222" creationId="{56FAC2C8-AD78-4975-A7C8-856F00FF6198}"/>
-          </ac:grpSpMkLst>
-        </pc:grpChg>
-        <pc:grpChg chg="add del mod">
-          <ac:chgData name="Carlos Quesada" userId="c0ed732e786a5da1" providerId="LiveId" clId="{9BD08692-A93F-4392-A80C-735B1850CC3F}" dt="2019-11-02T22:10:03.613" v="409" actId="165"/>
-          <ac:grpSpMkLst>
-            <pc:docMk/>
-            <pc:sldMk cId="666542315" sldId="256"/>
-            <ac:grpSpMk id="223" creationId="{F6BA3DB4-8A97-46C8-9782-6A3FC35BC794}"/>
-          </ac:grpSpMkLst>
-        </pc:grpChg>
-        <pc:grpChg chg="add del mod">
-          <ac:chgData name="Carlos Quesada" userId="c0ed732e786a5da1" providerId="LiveId" clId="{9BD08692-A93F-4392-A80C-735B1850CC3F}" dt="2019-11-02T22:13:42.116" v="696" actId="165"/>
-          <ac:grpSpMkLst>
-            <pc:docMk/>
-            <pc:sldMk cId="666542315" sldId="256"/>
-            <ac:grpSpMk id="231" creationId="{BFF25D3C-2920-48EF-9AAA-F7047EB5F3DF}"/>
-          </ac:grpSpMkLst>
-        </pc:grpChg>
-        <pc:grpChg chg="add del mod">
-          <ac:chgData name="Carlos Quesada" userId="c0ed732e786a5da1" providerId="LiveId" clId="{9BD08692-A93F-4392-A80C-735B1850CC3F}" dt="2019-11-02T22:33:48.089" v="847" actId="165"/>
-          <ac:grpSpMkLst>
-            <pc:docMk/>
-            <pc:sldMk cId="666542315" sldId="256"/>
-            <ac:grpSpMk id="279" creationId="{41203760-2E8E-4F81-A91D-80925F90F634}"/>
-          </ac:grpSpMkLst>
-        </pc:grpChg>
-        <pc:grpChg chg="add del mod">
-          <ac:chgData name="Carlos Quesada" userId="c0ed732e786a5da1" providerId="LiveId" clId="{9BD08692-A93F-4392-A80C-735B1850CC3F}" dt="2019-11-02T22:31:43.403" v="814" actId="165"/>
-          <ac:grpSpMkLst>
-            <pc:docMk/>
-            <pc:sldMk cId="666542315" sldId="256"/>
-            <ac:grpSpMk id="285" creationId="{DD18614D-5825-42D4-BFF5-EEBA5B30211D}"/>
-          </ac:grpSpMkLst>
-        </pc:grpChg>
-        <pc:grpChg chg="add mod">
-          <ac:chgData name="Carlos Quesada" userId="c0ed732e786a5da1" providerId="LiveId" clId="{9BD08692-A93F-4392-A80C-735B1850CC3F}" dt="2019-11-02T23:09:28.776" v="1171" actId="1076"/>
-          <ac:grpSpMkLst>
-            <pc:docMk/>
-            <pc:sldMk cId="666542315" sldId="256"/>
-            <ac:grpSpMk id="350" creationId="{74BC22C1-B8DF-4036-9624-CC3886C1EBF0}"/>
-          </ac:grpSpMkLst>
-        </pc:grpChg>
-        <pc:grpChg chg="add mod">
-          <ac:chgData name="Carlos Quesada" userId="c0ed732e786a5da1" providerId="LiveId" clId="{9BD08692-A93F-4392-A80C-735B1850CC3F}" dt="2019-11-02T22:57:19.268" v="1087" actId="1076"/>
-          <ac:grpSpMkLst>
-            <pc:docMk/>
-            <pc:sldMk cId="666542315" sldId="256"/>
-            <ac:grpSpMk id="351" creationId="{BB70ABDC-9CAC-47E2-83A9-771454C8C042}"/>
-          </ac:grpSpMkLst>
-        </pc:grpChg>
-        <pc:grpChg chg="add del mod">
-          <ac:chgData name="Carlos Quesada" userId="c0ed732e786a5da1" providerId="LiveId" clId="{9BD08692-A93F-4392-A80C-735B1850CC3F}" dt="2019-11-03T03:37:51.582" v="1494" actId="165"/>
-          <ac:grpSpMkLst>
-            <pc:docMk/>
-            <pc:sldMk cId="666542315" sldId="256"/>
-            <ac:grpSpMk id="352" creationId="{CA183A55-255F-4717-B2B6-25BEB70AC043}"/>
-          </ac:grpSpMkLst>
-        </pc:grpChg>
-        <pc:grpChg chg="add del mod">
-          <ac:chgData name="Carlos Quesada" userId="c0ed732e786a5da1" providerId="LiveId" clId="{9BD08692-A93F-4392-A80C-735B1850CC3F}" dt="2019-11-02T23:09:16.980" v="1168" actId="478"/>
-          <ac:grpSpMkLst>
-            <pc:docMk/>
-            <pc:sldMk cId="666542315" sldId="256"/>
-            <ac:grpSpMk id="353" creationId="{6D1DCD88-4388-4524-A9F4-A2EB6156C50F}"/>
-          </ac:grpSpMkLst>
-        </pc:grpChg>
-        <pc:grpChg chg="add del mod">
-          <ac:chgData name="Carlos Quesada" userId="c0ed732e786a5da1" providerId="LiveId" clId="{9BD08692-A93F-4392-A80C-735B1850CC3F}" dt="2019-11-03T03:37:55.917" v="1495" actId="165"/>
-          <ac:grpSpMkLst>
-            <pc:docMk/>
-            <pc:sldMk cId="666542315" sldId="256"/>
-            <ac:grpSpMk id="354" creationId="{4AFCB904-E9A1-45B7-AD03-ED33C9A61F16}"/>
-          </ac:grpSpMkLst>
-        </pc:grpChg>
-        <pc:grpChg chg="mod topLvl">
-          <ac:chgData name="Carlos Quesada" userId="c0ed732e786a5da1" providerId="LiveId" clId="{9BD08692-A93F-4392-A80C-735B1850CC3F}" dt="2019-11-03T03:37:55.917" v="1495" actId="165"/>
-          <ac:grpSpMkLst>
-            <pc:docMk/>
-            <pc:sldMk cId="666542315" sldId="256"/>
-            <ac:grpSpMk id="360" creationId="{FC1D3BAA-0D44-43DF-BD23-0FF514AA4D83}"/>
-          </ac:grpSpMkLst>
-        </pc:grpChg>
-        <pc:grpChg chg="mod topLvl">
-          <ac:chgData name="Carlos Quesada" userId="c0ed732e786a5da1" providerId="LiveId" clId="{9BD08692-A93F-4392-A80C-735B1850CC3F}" dt="2019-11-03T03:37:55.917" v="1495" actId="165"/>
-          <ac:grpSpMkLst>
-            <pc:docMk/>
-            <pc:sldMk cId="666542315" sldId="256"/>
-            <ac:grpSpMk id="361" creationId="{E38DA6E0-5B37-4772-B6FA-A40A83FFEAB6}"/>
-          </ac:grpSpMkLst>
-        </pc:grpChg>
-        <pc:cxnChg chg="mod">
-          <ac:chgData name="Carlos Quesada" userId="c0ed732e786a5da1" providerId="LiveId" clId="{9BD08692-A93F-4392-A80C-735B1850CC3F}" dt="2019-11-02T22:45:14.425" v="992" actId="164"/>
-          <ac:cxnSpMkLst>
-            <pc:docMk/>
-            <pc:sldMk cId="666542315" sldId="256"/>
-            <ac:cxnSpMk id="13" creationId="{C9EA8B35-4A9E-4441-BB48-E1659546DC17}"/>
-          </ac:cxnSpMkLst>
-        </pc:cxnChg>
-        <pc:cxnChg chg="mod">
-          <ac:chgData name="Carlos Quesada" userId="c0ed732e786a5da1" providerId="LiveId" clId="{9BD08692-A93F-4392-A80C-735B1850CC3F}" dt="2019-11-02T23:09:16.980" v="1168" actId="478"/>
-          <ac:cxnSpMkLst>
-            <pc:docMk/>
-            <pc:sldMk cId="666542315" sldId="256"/>
-            <ac:cxnSpMk id="14" creationId="{1A2F42C8-77A8-464E-AF62-66F8B36E071B}"/>
-          </ac:cxnSpMkLst>
-        </pc:cxnChg>
-        <pc:cxnChg chg="mod">
-          <ac:chgData name="Carlos Quesada" userId="c0ed732e786a5da1" providerId="LiveId" clId="{9BD08692-A93F-4392-A80C-735B1850CC3F}" dt="2019-11-02T21:51:40.233" v="44" actId="478"/>
-          <ac:cxnSpMkLst>
-            <pc:docMk/>
-            <pc:sldMk cId="666542315" sldId="256"/>
-            <ac:cxnSpMk id="23" creationId="{B09E5999-D5C8-409C-A17B-FC5066AF2904}"/>
-          </ac:cxnSpMkLst>
-        </pc:cxnChg>
-        <pc:cxnChg chg="mod">
-          <ac:chgData name="Carlos Quesada" userId="c0ed732e786a5da1" providerId="LiveId" clId="{9BD08692-A93F-4392-A80C-735B1850CC3F}" dt="2019-11-02T21:51:40.233" v="44" actId="478"/>
-          <ac:cxnSpMkLst>
-            <pc:docMk/>
-            <pc:sldMk cId="666542315" sldId="256"/>
-            <ac:cxnSpMk id="28" creationId="{68ED528C-FB89-415D-865A-830C36049341}"/>
-          </ac:cxnSpMkLst>
-        </pc:cxnChg>
-        <pc:cxnChg chg="del mod topLvl">
-          <ac:chgData name="Carlos Quesada" userId="c0ed732e786a5da1" providerId="LiveId" clId="{9BD08692-A93F-4392-A80C-735B1850CC3F}" dt="2019-11-02T21:52:57.083" v="53" actId="478"/>
-          <ac:cxnSpMkLst>
-            <pc:docMk/>
-            <pc:sldMk cId="666542315" sldId="256"/>
-            <ac:cxnSpMk id="32" creationId="{07A1B9B3-02A1-4DB0-9121-67777BB319B2}"/>
-          </ac:cxnSpMkLst>
-        </pc:cxnChg>
-        <pc:cxnChg chg="del mod">
-          <ac:chgData name="Carlos Quesada" userId="c0ed732e786a5da1" providerId="LiveId" clId="{9BD08692-A93F-4392-A80C-735B1850CC3F}" dt="2019-11-02T21:51:40.233" v="44" actId="478"/>
-          <ac:cxnSpMkLst>
-            <pc:docMk/>
-            <pc:sldMk cId="666542315" sldId="256"/>
-            <ac:cxnSpMk id="33" creationId="{6A8B3CEE-9D9D-43D5-BCC2-59357A7F337D}"/>
-          </ac:cxnSpMkLst>
-        </pc:cxnChg>
-        <pc:cxnChg chg="del mod">
-          <ac:chgData name="Carlos Quesada" userId="c0ed732e786a5da1" providerId="LiveId" clId="{9BD08692-A93F-4392-A80C-735B1850CC3F}" dt="2019-11-02T21:51:40.233" v="44" actId="478"/>
-          <ac:cxnSpMkLst>
-            <pc:docMk/>
-            <pc:sldMk cId="666542315" sldId="256"/>
-            <ac:cxnSpMk id="34" creationId="{DAC945AC-4425-418D-AF9C-A77FCBFF4110}"/>
-          </ac:cxnSpMkLst>
-        </pc:cxnChg>
-        <pc:cxnChg chg="mod topLvl">
-          <ac:chgData name="Carlos Quesada" userId="c0ed732e786a5da1" providerId="LiveId" clId="{9BD08692-A93F-4392-A80C-735B1850CC3F}" dt="2019-11-02T23:09:16.980" v="1168" actId="478"/>
-          <ac:cxnSpMkLst>
-            <pc:docMk/>
-            <pc:sldMk cId="666542315" sldId="256"/>
-            <ac:cxnSpMk id="35" creationId="{571BAC18-B3F1-4E60-80C2-110A3D5B11C0}"/>
-          </ac:cxnSpMkLst>
-        </pc:cxnChg>
-        <pc:cxnChg chg="del mod">
-          <ac:chgData name="Carlos Quesada" userId="c0ed732e786a5da1" providerId="LiveId" clId="{9BD08692-A93F-4392-A80C-735B1850CC3F}" dt="2019-11-02T21:53:02.362" v="54" actId="478"/>
-          <ac:cxnSpMkLst>
-            <pc:docMk/>
-            <pc:sldMk cId="666542315" sldId="256"/>
-            <ac:cxnSpMk id="42" creationId="{E380BDF0-197A-4745-A6B3-0875FCAA741C}"/>
-          </ac:cxnSpMkLst>
-        </pc:cxnChg>
-        <pc:cxnChg chg="del mod">
-          <ac:chgData name="Carlos Quesada" userId="c0ed732e786a5da1" providerId="LiveId" clId="{9BD08692-A93F-4392-A80C-735B1850CC3F}" dt="2019-11-02T22:04:29.964" v="232" actId="478"/>
-          <ac:cxnSpMkLst>
-            <pc:docMk/>
-            <pc:sldMk cId="666542315" sldId="256"/>
-            <ac:cxnSpMk id="43" creationId="{5B84077F-DE99-4081-BB5A-075CBA51FA90}"/>
-          </ac:cxnSpMkLst>
-        </pc:cxnChg>
-        <pc:cxnChg chg="mod">
-          <ac:chgData name="Carlos Quesada" userId="c0ed732e786a5da1" providerId="LiveId" clId="{9BD08692-A93F-4392-A80C-735B1850CC3F}" dt="2019-11-02T22:45:02.243" v="989" actId="164"/>
-          <ac:cxnSpMkLst>
-            <pc:docMk/>
-            <pc:sldMk cId="666542315" sldId="256"/>
-            <ac:cxnSpMk id="55" creationId="{D22DFC66-F956-431F-A9C4-393DEC2B97B9}"/>
-          </ac:cxnSpMkLst>
-        </pc:cxnChg>
-        <pc:cxnChg chg="mod">
-          <ac:chgData name="Carlos Quesada" userId="c0ed732e786a5da1" providerId="LiveId" clId="{9BD08692-A93F-4392-A80C-735B1850CC3F}" dt="2019-11-02T22:45:02.243" v="989" actId="164"/>
-          <ac:cxnSpMkLst>
-            <pc:docMk/>
-            <pc:sldMk cId="666542315" sldId="256"/>
-            <ac:cxnSpMk id="74" creationId="{39A80621-31ED-4A93-8064-437131DCBE80}"/>
-          </ac:cxnSpMkLst>
-        </pc:cxnChg>
-        <pc:cxnChg chg="mod">
-          <ac:chgData name="Carlos Quesada" userId="c0ed732e786a5da1" providerId="LiveId" clId="{9BD08692-A93F-4392-A80C-735B1850CC3F}" dt="2019-11-02T22:45:02.243" v="989" actId="164"/>
-          <ac:cxnSpMkLst>
-            <pc:docMk/>
-            <pc:sldMk cId="666542315" sldId="256"/>
-            <ac:cxnSpMk id="75" creationId="{944F0AFD-D16B-4A21-95DD-CAA08DE5FED0}"/>
-          </ac:cxnSpMkLst>
-        </pc:cxnChg>
-        <pc:cxnChg chg="mod">
-          <ac:chgData name="Carlos Quesada" userId="c0ed732e786a5da1" providerId="LiveId" clId="{9BD08692-A93F-4392-A80C-735B1850CC3F}" dt="2019-11-02T22:45:02.243" v="989" actId="164"/>
-          <ac:cxnSpMkLst>
-            <pc:docMk/>
-            <pc:sldMk cId="666542315" sldId="256"/>
-            <ac:cxnSpMk id="78" creationId="{C9E32D5B-F5A8-496D-97F8-E51E8844E558}"/>
-          </ac:cxnSpMkLst>
-        </pc:cxnChg>
-        <pc:cxnChg chg="mod">
-          <ac:chgData name="Carlos Quesada" userId="c0ed732e786a5da1" providerId="LiveId" clId="{9BD08692-A93F-4392-A80C-735B1850CC3F}" dt="2019-11-02T22:45:02.243" v="989" actId="164"/>
-          <ac:cxnSpMkLst>
-            <pc:docMk/>
-            <pc:sldMk cId="666542315" sldId="256"/>
-            <ac:cxnSpMk id="89" creationId="{01FF7671-B6C8-4B3F-B0E7-BC0A18A9CC1B}"/>
-          </ac:cxnSpMkLst>
-        </pc:cxnChg>
-        <pc:cxnChg chg="mod">
-          <ac:chgData name="Carlos Quesada" userId="c0ed732e786a5da1" providerId="LiveId" clId="{9BD08692-A93F-4392-A80C-735B1850CC3F}" dt="2019-11-02T22:45:02.243" v="989" actId="164"/>
-          <ac:cxnSpMkLst>
-            <pc:docMk/>
-            <pc:sldMk cId="666542315" sldId="256"/>
-            <ac:cxnSpMk id="92" creationId="{479E5507-7E38-47AC-8168-F1FABD7D076D}"/>
-          </ac:cxnSpMkLst>
-        </pc:cxnChg>
-        <pc:cxnChg chg="mod">
-          <ac:chgData name="Carlos Quesada" userId="c0ed732e786a5da1" providerId="LiveId" clId="{9BD08692-A93F-4392-A80C-735B1850CC3F}" dt="2019-11-02T22:45:06.067" v="990" actId="164"/>
-          <ac:cxnSpMkLst>
-            <pc:docMk/>
-            <pc:sldMk cId="666542315" sldId="256"/>
-            <ac:cxnSpMk id="97" creationId="{EE047658-CAAA-4FFD-BC1E-1D74AAC0E962}"/>
-          </ac:cxnSpMkLst>
-        </pc:cxnChg>
-        <pc:cxnChg chg="mod">
-          <ac:chgData name="Carlos Quesada" userId="c0ed732e786a5da1" providerId="LiveId" clId="{9BD08692-A93F-4392-A80C-735B1850CC3F}" dt="2019-11-02T22:45:06.067" v="990" actId="164"/>
-          <ac:cxnSpMkLst>
-            <pc:docMk/>
-            <pc:sldMk cId="666542315" sldId="256"/>
-            <ac:cxnSpMk id="120" creationId="{89A7FB32-64DD-48A4-814C-96A456E89E16}"/>
-          </ac:cxnSpMkLst>
-        </pc:cxnChg>
-        <pc:cxnChg chg="mod">
-          <ac:chgData name="Carlos Quesada" userId="c0ed732e786a5da1" providerId="LiveId" clId="{9BD08692-A93F-4392-A80C-735B1850CC3F}" dt="2019-11-02T22:45:06.067" v="990" actId="164"/>
-          <ac:cxnSpMkLst>
-            <pc:docMk/>
-            <pc:sldMk cId="666542315" sldId="256"/>
-            <ac:cxnSpMk id="126" creationId="{ABBF06A7-6932-4FA1-9B4A-C7C650E1A3A8}"/>
-          </ac:cxnSpMkLst>
-        </pc:cxnChg>
-        <pc:cxnChg chg="mod">
-          <ac:chgData name="Carlos Quesada" userId="c0ed732e786a5da1" providerId="LiveId" clId="{9BD08692-A93F-4392-A80C-735B1850CC3F}" dt="2019-11-02T22:45:06.067" v="990" actId="164"/>
-          <ac:cxnSpMkLst>
-            <pc:docMk/>
-            <pc:sldMk cId="666542315" sldId="256"/>
-            <ac:cxnSpMk id="131" creationId="{F25B3486-3D84-4B5B-9E2C-A56D55E5993D}"/>
-          </ac:cxnSpMkLst>
-        </pc:cxnChg>
-        <pc:cxnChg chg="mod">
-          <ac:chgData name="Carlos Quesada" userId="c0ed732e786a5da1" providerId="LiveId" clId="{9BD08692-A93F-4392-A80C-735B1850CC3F}" dt="2019-11-02T22:45:06.067" v="990" actId="164"/>
-          <ac:cxnSpMkLst>
-            <pc:docMk/>
-            <pc:sldMk cId="666542315" sldId="256"/>
-            <ac:cxnSpMk id="132" creationId="{6ACFCBAC-AF59-45FA-BB1F-ACFF730DED3F}"/>
-          </ac:cxnSpMkLst>
-        </pc:cxnChg>
-        <pc:cxnChg chg="mod">
-          <ac:chgData name="Carlos Quesada" userId="c0ed732e786a5da1" providerId="LiveId" clId="{9BD08692-A93F-4392-A80C-735B1850CC3F}" dt="2019-11-02T22:45:06.067" v="990" actId="164"/>
-          <ac:cxnSpMkLst>
-            <pc:docMk/>
-            <pc:sldMk cId="666542315" sldId="256"/>
-            <ac:cxnSpMk id="141" creationId="{39A6B3A8-021A-49D3-A975-96B09FCC699F}"/>
-          </ac:cxnSpMkLst>
-        </pc:cxnChg>
-        <pc:cxnChg chg="mod">
-          <ac:chgData name="Carlos Quesada" userId="c0ed732e786a5da1" providerId="LiveId" clId="{9BD08692-A93F-4392-A80C-735B1850CC3F}" dt="2019-11-02T22:45:06.067" v="990" actId="164"/>
-          <ac:cxnSpMkLst>
-            <pc:docMk/>
-            <pc:sldMk cId="666542315" sldId="256"/>
-            <ac:cxnSpMk id="144" creationId="{CAE866DE-95F5-4296-AA48-5026DF863AEA}"/>
-          </ac:cxnSpMkLst>
-        </pc:cxnChg>
-        <pc:cxnChg chg="del mod topLvl">
-          <ac:chgData name="Carlos Quesada" userId="c0ed732e786a5da1" providerId="LiveId" clId="{9BD08692-A93F-4392-A80C-735B1850CC3F}" dt="2019-11-02T21:51:03.282" v="40" actId="478"/>
-          <ac:cxnSpMkLst>
-            <pc:docMk/>
-            <pc:sldMk cId="666542315" sldId="256"/>
-            <ac:cxnSpMk id="174" creationId="{31C33914-0C5A-4BEA-A815-6DC31E9C8D52}"/>
-          </ac:cxnSpMkLst>
-        </pc:cxnChg>
-        <pc:cxnChg chg="add del">
-          <ac:chgData name="Carlos Quesada" userId="c0ed732e786a5da1" providerId="LiveId" clId="{9BD08692-A93F-4392-A80C-735B1850CC3F}" dt="2019-11-02T21:54:21.795" v="83"/>
-          <ac:cxnSpMkLst>
-            <pc:docMk/>
-            <pc:sldMk cId="666542315" sldId="256"/>
-            <ac:cxnSpMk id="190" creationId="{3DB8F9B8-7B45-4264-B7F4-CF43C2B35912}"/>
-          </ac:cxnSpMkLst>
-        </pc:cxnChg>
-        <pc:cxnChg chg="mod">
-          <ac:chgData name="Carlos Quesada" userId="c0ed732e786a5da1" providerId="LiveId" clId="{9BD08692-A93F-4392-A80C-735B1850CC3F}" dt="2019-11-02T21:54:29.732" v="86" actId="1076"/>
-          <ac:cxnSpMkLst>
-            <pc:docMk/>
-            <pc:sldMk cId="666542315" sldId="256"/>
-            <ac:cxnSpMk id="194" creationId="{69066026-5B39-4350-9C99-90F61C907749}"/>
-          </ac:cxnSpMkLst>
-        </pc:cxnChg>
-        <pc:cxnChg chg="mod topLvl">
-          <ac:chgData name="Carlos Quesada" userId="c0ed732e786a5da1" providerId="LiveId" clId="{9BD08692-A93F-4392-A80C-735B1850CC3F}" dt="2019-11-02T23:09:16.980" v="1168" actId="478"/>
-          <ac:cxnSpMkLst>
-            <pc:docMk/>
-            <pc:sldMk cId="666542315" sldId="256"/>
-            <ac:cxnSpMk id="198" creationId="{6E48CC3E-443B-4111-BFE1-337A29C78455}"/>
-          </ac:cxnSpMkLst>
-        </pc:cxnChg>
-        <pc:cxnChg chg="add mod">
-          <ac:chgData name="Carlos Quesada" userId="c0ed732e786a5da1" providerId="LiveId" clId="{9BD08692-A93F-4392-A80C-735B1850CC3F}" dt="2019-11-02T21:55:42.762" v="121" actId="164"/>
-          <ac:cxnSpMkLst>
-            <pc:docMk/>
-            <pc:sldMk cId="666542315" sldId="256"/>
-            <ac:cxnSpMk id="199" creationId="{31518236-906D-462C-8475-23B00ED27954}"/>
-          </ac:cxnSpMkLst>
-        </pc:cxnChg>
-        <pc:cxnChg chg="add mod topLvl">
-          <ac:chgData name="Carlos Quesada" userId="c0ed732e786a5da1" providerId="LiveId" clId="{9BD08692-A93F-4392-A80C-735B1850CC3F}" dt="2019-11-02T22:45:14.425" v="992" actId="164"/>
-          <ac:cxnSpMkLst>
-            <pc:docMk/>
-            <pc:sldMk cId="666542315" sldId="256"/>
-            <ac:cxnSpMk id="201" creationId="{D922AF07-9F76-433E-B825-CC44AA4185DA}"/>
-          </ac:cxnSpMkLst>
-        </pc:cxnChg>
-        <pc:cxnChg chg="add mod">
-          <ac:chgData name="Carlos Quesada" userId="c0ed732e786a5da1" providerId="LiveId" clId="{9BD08692-A93F-4392-A80C-735B1850CC3F}" dt="2019-11-02T23:09:16.980" v="1168" actId="478"/>
-          <ac:cxnSpMkLst>
-            <pc:docMk/>
-            <pc:sldMk cId="666542315" sldId="256"/>
-            <ac:cxnSpMk id="208" creationId="{88B126C8-169E-4CD0-8A72-1D91C403A41E}"/>
-          </ac:cxnSpMkLst>
-        </pc:cxnChg>
-        <pc:cxnChg chg="add mod">
-          <ac:chgData name="Carlos Quesada" userId="c0ed732e786a5da1" providerId="LiveId" clId="{9BD08692-A93F-4392-A80C-735B1850CC3F}" dt="2019-11-02T23:09:16.980" v="1168" actId="478"/>
-          <ac:cxnSpMkLst>
-            <pc:docMk/>
-            <pc:sldMk cId="666542315" sldId="256"/>
-            <ac:cxnSpMk id="212" creationId="{5DAA343F-7B4C-4CF2-BD8D-E870ACE844A7}"/>
-          </ac:cxnSpMkLst>
-        </pc:cxnChg>
-        <pc:cxnChg chg="add mod topLvl">
-          <ac:chgData name="Carlos Quesada" userId="c0ed732e786a5da1" providerId="LiveId" clId="{9BD08692-A93F-4392-A80C-735B1850CC3F}" dt="2019-11-02T23:09:16.980" v="1168" actId="478"/>
-          <ac:cxnSpMkLst>
-            <pc:docMk/>
-            <pc:sldMk cId="666542315" sldId="256"/>
-            <ac:cxnSpMk id="215" creationId="{145A451C-67E3-4202-AB6D-6DDFBF3390FC}"/>
-          </ac:cxnSpMkLst>
-        </pc:cxnChg>
-        <pc:cxnChg chg="add del mod">
-          <ac:chgData name="Carlos Quesada" userId="c0ed732e786a5da1" providerId="LiveId" clId="{9BD08692-A93F-4392-A80C-735B1850CC3F}" dt="2019-11-02T22:03:37.827" v="215" actId="478"/>
-          <ac:cxnSpMkLst>
-            <pc:docMk/>
-            <pc:sldMk cId="666542315" sldId="256"/>
-            <ac:cxnSpMk id="220" creationId="{086B4506-BDE5-4135-AF69-CB0AFDAAA6DC}"/>
-          </ac:cxnSpMkLst>
-        </pc:cxnChg>
-        <pc:cxnChg chg="add mod">
-          <ac:chgData name="Carlos Quesada" userId="c0ed732e786a5da1" providerId="LiveId" clId="{9BD08692-A93F-4392-A80C-735B1850CC3F}" dt="2019-11-02T23:09:16.980" v="1168" actId="478"/>
-          <ac:cxnSpMkLst>
-            <pc:docMk/>
-            <pc:sldMk cId="666542315" sldId="256"/>
-            <ac:cxnSpMk id="225" creationId="{C3E819B8-9473-4E8C-BD7D-90A94E4AA21B}"/>
-          </ac:cxnSpMkLst>
-        </pc:cxnChg>
-        <pc:cxnChg chg="add mod">
-          <ac:chgData name="Carlos Quesada" userId="c0ed732e786a5da1" providerId="LiveId" clId="{9BD08692-A93F-4392-A80C-735B1850CC3F}" dt="2019-11-02T23:09:16.980" v="1168" actId="478"/>
-          <ac:cxnSpMkLst>
-            <pc:docMk/>
-            <pc:sldMk cId="666542315" sldId="256"/>
-            <ac:cxnSpMk id="234" creationId="{13EB15C4-59C9-4227-BB71-917D208C7D78}"/>
-          </ac:cxnSpMkLst>
-        </pc:cxnChg>
-        <pc:cxnChg chg="add mod">
-          <ac:chgData name="Carlos Quesada" userId="c0ed732e786a5da1" providerId="LiveId" clId="{9BD08692-A93F-4392-A80C-735B1850CC3F}" dt="2019-11-02T23:09:16.980" v="1168" actId="478"/>
-          <ac:cxnSpMkLst>
-            <pc:docMk/>
-            <pc:sldMk cId="666542315" sldId="256"/>
-            <ac:cxnSpMk id="248" creationId="{17D98AEE-C51B-4603-A94E-5B1113276EA3}"/>
-          </ac:cxnSpMkLst>
-        </pc:cxnChg>
-        <pc:cxnChg chg="add mod">
-          <ac:chgData name="Carlos Quesada" userId="c0ed732e786a5da1" providerId="LiveId" clId="{9BD08692-A93F-4392-A80C-735B1850CC3F}" dt="2019-11-02T23:09:16.980" v="1168" actId="478"/>
-          <ac:cxnSpMkLst>
-            <pc:docMk/>
-            <pc:sldMk cId="666542315" sldId="256"/>
-            <ac:cxnSpMk id="252" creationId="{6D7966B1-D727-4B4F-8CB9-7BB7BCA82C05}"/>
-          </ac:cxnSpMkLst>
-        </pc:cxnChg>
-        <pc:cxnChg chg="mod topLvl">
-          <ac:chgData name="Carlos Quesada" userId="c0ed732e786a5da1" providerId="LiveId" clId="{9BD08692-A93F-4392-A80C-735B1850CC3F}" dt="2019-11-03T03:37:51.582" v="1494" actId="165"/>
-          <ac:cxnSpMkLst>
-            <pc:docMk/>
-            <pc:sldMk cId="666542315" sldId="256"/>
-            <ac:cxnSpMk id="282" creationId="{486CF5FF-56D8-4AD0-8966-A96C1E595A30}"/>
-          </ac:cxnSpMkLst>
-        </pc:cxnChg>
-        <pc:cxnChg chg="del mod topLvl">
-          <ac:chgData name="Carlos Quesada" userId="c0ed732e786a5da1" providerId="LiveId" clId="{9BD08692-A93F-4392-A80C-735B1850CC3F}" dt="2019-11-02T22:31:45.839" v="815" actId="478"/>
-          <ac:cxnSpMkLst>
-            <pc:docMk/>
-            <pc:sldMk cId="666542315" sldId="256"/>
-            <ac:cxnSpMk id="287" creationId="{E0D409E5-7CD4-48CB-9D00-A57FD2AEA3C7}"/>
-          </ac:cxnSpMkLst>
-        </pc:cxnChg>
-        <pc:cxnChg chg="add mod topLvl">
-          <ac:chgData name="Carlos Quesada" userId="c0ed732e786a5da1" providerId="LiveId" clId="{9BD08692-A93F-4392-A80C-735B1850CC3F}" dt="2019-11-03T03:37:51.582" v="1494" actId="165"/>
-          <ac:cxnSpMkLst>
-            <pc:docMk/>
-            <pc:sldMk cId="666542315" sldId="256"/>
-            <ac:cxnSpMk id="291" creationId="{559B7824-D015-4BC4-B135-8CB3FFCBC40B}"/>
-          </ac:cxnSpMkLst>
-        </pc:cxnChg>
-        <pc:cxnChg chg="add mod topLvl">
-          <ac:chgData name="Carlos Quesada" userId="c0ed732e786a5da1" providerId="LiveId" clId="{9BD08692-A93F-4392-A80C-735B1850CC3F}" dt="2019-11-03T03:37:51.582" v="1494" actId="165"/>
-          <ac:cxnSpMkLst>
-            <pc:docMk/>
-            <pc:sldMk cId="666542315" sldId="256"/>
-            <ac:cxnSpMk id="292" creationId="{AE35D520-C52B-422F-AEC9-05D841F2A45E}"/>
-          </ac:cxnSpMkLst>
-        </pc:cxnChg>
-        <pc:cxnChg chg="add mod topLvl">
-          <ac:chgData name="Carlos Quesada" userId="c0ed732e786a5da1" providerId="LiveId" clId="{9BD08692-A93F-4392-A80C-735B1850CC3F}" dt="2019-11-03T03:37:51.582" v="1494" actId="165"/>
-          <ac:cxnSpMkLst>
-            <pc:docMk/>
-            <pc:sldMk cId="666542315" sldId="256"/>
-            <ac:cxnSpMk id="294" creationId="{5BC79388-DC09-43A8-85A3-869C51E69387}"/>
-          </ac:cxnSpMkLst>
-        </pc:cxnChg>
-        <pc:cxnChg chg="add mod topLvl">
-          <ac:chgData name="Carlos Quesada" userId="c0ed732e786a5da1" providerId="LiveId" clId="{9BD08692-A93F-4392-A80C-735B1850CC3F}" dt="2019-11-03T03:37:51.582" v="1494" actId="165"/>
-          <ac:cxnSpMkLst>
-            <pc:docMk/>
-            <pc:sldMk cId="666542315" sldId="256"/>
-            <ac:cxnSpMk id="299" creationId="{256EB240-470A-4B46-8D2D-06C0D9F1B9A6}"/>
-          </ac:cxnSpMkLst>
-        </pc:cxnChg>
-        <pc:cxnChg chg="add mod topLvl">
-          <ac:chgData name="Carlos Quesada" userId="c0ed732e786a5da1" providerId="LiveId" clId="{9BD08692-A93F-4392-A80C-735B1850CC3F}" dt="2019-11-03T03:37:51.582" v="1494" actId="165"/>
-          <ac:cxnSpMkLst>
-            <pc:docMk/>
-            <pc:sldMk cId="666542315" sldId="256"/>
-            <ac:cxnSpMk id="301" creationId="{896A86C2-606E-4EE0-BCBA-AA8F3515D174}"/>
-          </ac:cxnSpMkLst>
-        </pc:cxnChg>
-        <pc:cxnChg chg="add mod topLvl">
-          <ac:chgData name="Carlos Quesada" userId="c0ed732e786a5da1" providerId="LiveId" clId="{9BD08692-A93F-4392-A80C-735B1850CC3F}" dt="2019-11-03T03:37:51.582" v="1494" actId="165"/>
-          <ac:cxnSpMkLst>
-            <pc:docMk/>
-            <pc:sldMk cId="666542315" sldId="256"/>
-            <ac:cxnSpMk id="307" creationId="{A57BF09D-CC78-4E84-87DE-B62FDF498474}"/>
-          </ac:cxnSpMkLst>
-        </pc:cxnChg>
-        <pc:cxnChg chg="add mod topLvl">
-          <ac:chgData name="Carlos Quesada" userId="c0ed732e786a5da1" providerId="LiveId" clId="{9BD08692-A93F-4392-A80C-735B1850CC3F}" dt="2019-11-03T03:37:51.582" v="1494" actId="165"/>
-          <ac:cxnSpMkLst>
-            <pc:docMk/>
-            <pc:sldMk cId="666542315" sldId="256"/>
-            <ac:cxnSpMk id="312" creationId="{AAACE148-0715-416C-BF9D-B10FB1F72AC0}"/>
-          </ac:cxnSpMkLst>
-        </pc:cxnChg>
-        <pc:cxnChg chg="add mod topLvl">
-          <ac:chgData name="Carlos Quesada" userId="c0ed732e786a5da1" providerId="LiveId" clId="{9BD08692-A93F-4392-A80C-735B1850CC3F}" dt="2019-11-03T03:37:51.582" v="1494" actId="165"/>
-          <ac:cxnSpMkLst>
-            <pc:docMk/>
-            <pc:sldMk cId="666542315" sldId="256"/>
-            <ac:cxnSpMk id="315" creationId="{0497BC20-6359-4999-81AD-D38D8AE48F22}"/>
-          </ac:cxnSpMkLst>
-        </pc:cxnChg>
-        <pc:cxnChg chg="add mod topLvl">
-          <ac:chgData name="Carlos Quesada" userId="c0ed732e786a5da1" providerId="LiveId" clId="{9BD08692-A93F-4392-A80C-735B1850CC3F}" dt="2019-11-03T03:37:51.582" v="1494" actId="165"/>
-          <ac:cxnSpMkLst>
-            <pc:docMk/>
-            <pc:sldMk cId="666542315" sldId="256"/>
-            <ac:cxnSpMk id="317" creationId="{2B9800A3-4430-4715-8A3E-F81E1E4CD943}"/>
-          </ac:cxnSpMkLst>
-        </pc:cxnChg>
-        <pc:cxnChg chg="add mod topLvl">
-          <ac:chgData name="Carlos Quesada" userId="c0ed732e786a5da1" providerId="LiveId" clId="{9BD08692-A93F-4392-A80C-735B1850CC3F}" dt="2019-11-03T03:37:51.582" v="1494" actId="165"/>
-          <ac:cxnSpMkLst>
-            <pc:docMk/>
-            <pc:sldMk cId="666542315" sldId="256"/>
-            <ac:cxnSpMk id="318" creationId="{263AB653-2205-47F2-96D5-EE12B9CEC2B4}"/>
-          </ac:cxnSpMkLst>
-        </pc:cxnChg>
-        <pc:cxnChg chg="add mod topLvl">
-          <ac:chgData name="Carlos Quesada" userId="c0ed732e786a5da1" providerId="LiveId" clId="{9BD08692-A93F-4392-A80C-735B1850CC3F}" dt="2019-11-03T03:37:51.582" v="1494" actId="165"/>
-          <ac:cxnSpMkLst>
-            <pc:docMk/>
-            <pc:sldMk cId="666542315" sldId="256"/>
-            <ac:cxnSpMk id="321" creationId="{36D9A300-B485-470A-877F-178490798FBC}"/>
-          </ac:cxnSpMkLst>
-        </pc:cxnChg>
-        <pc:cxnChg chg="add mod topLvl">
-          <ac:chgData name="Carlos Quesada" userId="c0ed732e786a5da1" providerId="LiveId" clId="{9BD08692-A93F-4392-A80C-735B1850CC3F}" dt="2019-11-03T03:37:51.582" v="1494" actId="165"/>
-          <ac:cxnSpMkLst>
-            <pc:docMk/>
-            <pc:sldMk cId="666542315" sldId="256"/>
-            <ac:cxnSpMk id="324" creationId="{95DC5BE0-B794-4BBD-BEEF-D3D42DC41F7F}"/>
-          </ac:cxnSpMkLst>
-        </pc:cxnChg>
-        <pc:cxnChg chg="mod topLvl">
-          <ac:chgData name="Carlos Quesada" userId="c0ed732e786a5da1" providerId="LiveId" clId="{9BD08692-A93F-4392-A80C-735B1850CC3F}" dt="2019-11-03T03:37:55.917" v="1495" actId="165"/>
-          <ac:cxnSpMkLst>
-            <pc:docMk/>
-            <pc:sldMk cId="666542315" sldId="256"/>
-            <ac:cxnSpMk id="357" creationId="{77115E52-AD33-42C7-A379-6C1E181C4876}"/>
-          </ac:cxnSpMkLst>
-        </pc:cxnChg>
-        <pc:cxnChg chg="mod topLvl">
-          <ac:chgData name="Carlos Quesada" userId="c0ed732e786a5da1" providerId="LiveId" clId="{9BD08692-A93F-4392-A80C-735B1850CC3F}" dt="2019-11-03T03:37:55.917" v="1495" actId="165"/>
-          <ac:cxnSpMkLst>
-            <pc:docMk/>
-            <pc:sldMk cId="666542315" sldId="256"/>
-            <ac:cxnSpMk id="359" creationId="{7AA49F30-A928-4E48-8DCB-30A5616FCB2B}"/>
-          </ac:cxnSpMkLst>
-        </pc:cxnChg>
-        <pc:cxnChg chg="mod topLvl">
-          <ac:chgData name="Carlos Quesada" userId="c0ed732e786a5da1" providerId="LiveId" clId="{9BD08692-A93F-4392-A80C-735B1850CC3F}" dt="2019-11-03T03:37:55.917" v="1495" actId="165"/>
-          <ac:cxnSpMkLst>
-            <pc:docMk/>
-            <pc:sldMk cId="666542315" sldId="256"/>
-            <ac:cxnSpMk id="362" creationId="{F61ECEAA-56F0-4B89-BFF8-E6F0A73D339E}"/>
-          </ac:cxnSpMkLst>
-        </pc:cxnChg>
-        <pc:cxnChg chg="mod topLvl">
-          <ac:chgData name="Carlos Quesada" userId="c0ed732e786a5da1" providerId="LiveId" clId="{9BD08692-A93F-4392-A80C-735B1850CC3F}" dt="2019-11-03T03:37:55.917" v="1495" actId="165"/>
-          <ac:cxnSpMkLst>
-            <pc:docMk/>
-            <pc:sldMk cId="666542315" sldId="256"/>
-            <ac:cxnSpMk id="363" creationId="{88A3BD59-296F-4F12-9D96-2A4C73DB2688}"/>
-          </ac:cxnSpMkLst>
-        </pc:cxnChg>
-        <pc:cxnChg chg="mod topLvl">
-          <ac:chgData name="Carlos Quesada" userId="c0ed732e786a5da1" providerId="LiveId" clId="{9BD08692-A93F-4392-A80C-735B1850CC3F}" dt="2019-11-03T03:37:55.917" v="1495" actId="165"/>
-          <ac:cxnSpMkLst>
-            <pc:docMk/>
-            <pc:sldMk cId="666542315" sldId="256"/>
-            <ac:cxnSpMk id="364" creationId="{A6BC35D2-9B2B-4231-A606-0FFA8E96BBB5}"/>
-          </ac:cxnSpMkLst>
-        </pc:cxnChg>
-        <pc:cxnChg chg="mod topLvl">
-          <ac:chgData name="Carlos Quesada" userId="c0ed732e786a5da1" providerId="LiveId" clId="{9BD08692-A93F-4392-A80C-735B1850CC3F}" dt="2019-11-03T03:37:55.917" v="1495" actId="165"/>
-          <ac:cxnSpMkLst>
-            <pc:docMk/>
-            <pc:sldMk cId="666542315" sldId="256"/>
-            <ac:cxnSpMk id="367" creationId="{EE29CCE5-A1C7-4447-924C-CC065F657D19}"/>
-          </ac:cxnSpMkLst>
-        </pc:cxnChg>
-        <pc:cxnChg chg="mod topLvl">
-          <ac:chgData name="Carlos Quesada" userId="c0ed732e786a5da1" providerId="LiveId" clId="{9BD08692-A93F-4392-A80C-735B1850CC3F}" dt="2019-11-03T03:37:55.917" v="1495" actId="165"/>
-          <ac:cxnSpMkLst>
-            <pc:docMk/>
-            <pc:sldMk cId="666542315" sldId="256"/>
-            <ac:cxnSpMk id="368" creationId="{06DD6D5A-A52B-4DEE-8126-C54792C1A254}"/>
-          </ac:cxnSpMkLst>
-        </pc:cxnChg>
-        <pc:cxnChg chg="mod topLvl">
-          <ac:chgData name="Carlos Quesada" userId="c0ed732e786a5da1" providerId="LiveId" clId="{9BD08692-A93F-4392-A80C-735B1850CC3F}" dt="2019-11-03T03:37:55.917" v="1495" actId="165"/>
-          <ac:cxnSpMkLst>
-            <pc:docMk/>
-            <pc:sldMk cId="666542315" sldId="256"/>
-            <ac:cxnSpMk id="369" creationId="{8486EDC8-F3A8-4738-B167-CBD3EFF5B3F4}"/>
-          </ac:cxnSpMkLst>
-        </pc:cxnChg>
-        <pc:cxnChg chg="mod topLvl">
-          <ac:chgData name="Carlos Quesada" userId="c0ed732e786a5da1" providerId="LiveId" clId="{9BD08692-A93F-4392-A80C-735B1850CC3F}" dt="2019-11-03T03:37:55.917" v="1495" actId="165"/>
-          <ac:cxnSpMkLst>
-            <pc:docMk/>
-            <pc:sldMk cId="666542315" sldId="256"/>
-            <ac:cxnSpMk id="370" creationId="{3989B8D0-E6D3-401E-95AF-66B587D15ABC}"/>
-          </ac:cxnSpMkLst>
-        </pc:cxnChg>
-        <pc:cxnChg chg="mod topLvl">
-          <ac:chgData name="Carlos Quesada" userId="c0ed732e786a5da1" providerId="LiveId" clId="{9BD08692-A93F-4392-A80C-735B1850CC3F}" dt="2019-11-03T03:37:55.917" v="1495" actId="165"/>
-          <ac:cxnSpMkLst>
-            <pc:docMk/>
-            <pc:sldMk cId="666542315" sldId="256"/>
-            <ac:cxnSpMk id="371" creationId="{883A25E1-9FE9-4CE1-BCED-07C9E7CF5F49}"/>
-          </ac:cxnSpMkLst>
-        </pc:cxnChg>
-        <pc:cxnChg chg="mod topLvl">
-          <ac:chgData name="Carlos Quesada" userId="c0ed732e786a5da1" providerId="LiveId" clId="{9BD08692-A93F-4392-A80C-735B1850CC3F}" dt="2019-11-03T03:37:55.917" v="1495" actId="165"/>
-          <ac:cxnSpMkLst>
-            <pc:docMk/>
-            <pc:sldMk cId="666542315" sldId="256"/>
-            <ac:cxnSpMk id="372" creationId="{3BCCFB90-03B7-440D-846C-42942EB8873A}"/>
-          </ac:cxnSpMkLst>
-        </pc:cxnChg>
-      </pc:sldChg>
-      <pc:sldChg chg="delSp modSp add">
-        <pc:chgData name="Carlos Quesada" userId="c0ed732e786a5da1" providerId="LiveId" clId="{9BD08692-A93F-4392-A80C-735B1850CC3F}" dt="2019-11-05T00:41:30.587" v="2114" actId="20577"/>
-        <pc:sldMkLst>
-          <pc:docMk/>
-          <pc:sldMk cId="2798251605" sldId="257"/>
-        </pc:sldMkLst>
-        <pc:spChg chg="del">
-          <ac:chgData name="Carlos Quesada" userId="c0ed732e786a5da1" providerId="LiveId" clId="{9BD08692-A93F-4392-A80C-735B1850CC3F}" dt="2019-11-02T23:10:43.755" v="1205" actId="478"/>
-          <ac:spMkLst>
-            <pc:docMk/>
-            <pc:sldMk cId="2798251605" sldId="257"/>
-            <ac:spMk id="2" creationId="{25694230-F8FF-4A84-8AB6-88FF318C004D}"/>
-          </ac:spMkLst>
-        </pc:spChg>
-        <pc:spChg chg="mod">
-          <ac:chgData name="Carlos Quesada" userId="c0ed732e786a5da1" providerId="LiveId" clId="{9BD08692-A93F-4392-A80C-735B1850CC3F}" dt="2019-11-05T00:41:30.587" v="2114" actId="20577"/>
-          <ac:spMkLst>
-            <pc:docMk/>
-            <pc:sldMk cId="2798251605" sldId="257"/>
-            <ac:spMk id="3" creationId="{5D4A5BFF-D8C3-4B48-8415-96497FAFFEF2}"/>
-          </ac:spMkLst>
-        </pc:spChg>
-      </pc:sldChg>
-      <pc:sldChg chg="addSp delSp modSp add del">
-        <pc:chgData name="Carlos Quesada" userId="c0ed732e786a5da1" providerId="LiveId" clId="{9BD08692-A93F-4392-A80C-735B1850CC3F}" dt="2019-11-02T23:09:14.859" v="1167" actId="2696"/>
-        <pc:sldMkLst>
-          <pc:docMk/>
-          <pc:sldMk cId="2884005628" sldId="257"/>
-        </pc:sldMkLst>
-        <pc:spChg chg="del">
-          <ac:chgData name="Carlos Quesada" userId="c0ed732e786a5da1" providerId="LiveId" clId="{9BD08692-A93F-4392-A80C-735B1850CC3F}" dt="2019-11-02T23:00:17.216" v="1092" actId="478"/>
-          <ac:spMkLst>
-            <pc:docMk/>
-            <pc:sldMk cId="2884005628" sldId="257"/>
-            <ac:spMk id="2" creationId="{52E22A5B-0301-44B8-81C8-9C1709149F5F}"/>
-          </ac:spMkLst>
-        </pc:spChg>
-        <pc:spChg chg="del">
-          <ac:chgData name="Carlos Quesada" userId="c0ed732e786a5da1" providerId="LiveId" clId="{9BD08692-A93F-4392-A80C-735B1850CC3F}" dt="2019-11-02T23:00:17.216" v="1092" actId="478"/>
-          <ac:spMkLst>
-            <pc:docMk/>
-            <pc:sldMk cId="2884005628" sldId="257"/>
-            <ac:spMk id="3" creationId="{204AEA86-6BEF-47FB-995E-811BE6A9327C}"/>
-          </ac:spMkLst>
-        </pc:spChg>
-        <pc:spChg chg="del mod topLvl">
-          <ac:chgData name="Carlos Quesada" userId="c0ed732e786a5da1" providerId="LiveId" clId="{9BD08692-A93F-4392-A80C-735B1850CC3F}" dt="2019-11-02T23:00:29.725" v="1097" actId="478"/>
-          <ac:spMkLst>
-            <pc:docMk/>
-            <pc:sldMk cId="2884005628" sldId="257"/>
-            <ac:spMk id="36" creationId="{B2010857-47FB-4D85-8976-1DAF71C4A5CD}"/>
-          </ac:spMkLst>
-        </pc:spChg>
-        <pc:spChg chg="mod topLvl">
-          <ac:chgData name="Carlos Quesada" userId="c0ed732e786a5da1" providerId="LiveId" clId="{9BD08692-A93F-4392-A80C-735B1850CC3F}" dt="2019-11-02T23:09:09.571" v="1164" actId="164"/>
-          <ac:spMkLst>
-            <pc:docMk/>
-            <pc:sldMk cId="2884005628" sldId="257"/>
-            <ac:spMk id="37" creationId="{170FEFF6-4C15-4C7C-B16A-B283B78513C9}"/>
-          </ac:spMkLst>
-        </pc:spChg>
-        <pc:spChg chg="mod topLvl">
-          <ac:chgData name="Carlos Quesada" userId="c0ed732e786a5da1" providerId="LiveId" clId="{9BD08692-A93F-4392-A80C-735B1850CC3F}" dt="2019-11-02T23:09:09.571" v="1164" actId="164"/>
-          <ac:spMkLst>
-            <pc:docMk/>
-            <pc:sldMk cId="2884005628" sldId="257"/>
-            <ac:spMk id="41" creationId="{FED253F0-0E78-4BB3-9EB5-494E9BB0E77C}"/>
-          </ac:spMkLst>
-        </pc:spChg>
-        <pc:spChg chg="del mod topLvl">
-          <ac:chgData name="Carlos Quesada" userId="c0ed732e786a5da1" providerId="LiveId" clId="{9BD08692-A93F-4392-A80C-735B1850CC3F}" dt="2019-11-02T23:02:21.139" v="1121" actId="478"/>
-          <ac:spMkLst>
-            <pc:docMk/>
-            <pc:sldMk cId="2884005628" sldId="257"/>
-            <ac:spMk id="43" creationId="{115451D9-DDB2-437B-8F31-9A4715E65206}"/>
-          </ac:spMkLst>
-        </pc:spChg>
-        <pc:spChg chg="mod topLvl">
-          <ac:chgData name="Carlos Quesada" userId="c0ed732e786a5da1" providerId="LiveId" clId="{9BD08692-A93F-4392-A80C-735B1850CC3F}" dt="2019-11-02T23:09:09.571" v="1164" actId="164"/>
-          <ac:spMkLst>
-            <pc:docMk/>
-            <pc:sldMk cId="2884005628" sldId="257"/>
-            <ac:spMk id="47" creationId="{D6F83B20-26F4-4C39-8708-C0EC43CCD7C2}"/>
-          </ac:spMkLst>
-        </pc:spChg>
-        <pc:spChg chg="mod topLvl">
-          <ac:chgData name="Carlos Quesada" userId="c0ed732e786a5da1" providerId="LiveId" clId="{9BD08692-A93F-4392-A80C-735B1850CC3F}" dt="2019-11-02T23:09:09.571" v="1164" actId="164"/>
-          <ac:spMkLst>
-            <pc:docMk/>
-            <pc:sldMk cId="2884005628" sldId="257"/>
-            <ac:spMk id="48" creationId="{5FD46D04-68FA-44ED-81A9-6C956923F9D6}"/>
-          </ac:spMkLst>
-        </pc:spChg>
-        <pc:spChg chg="mod topLvl">
-          <ac:chgData name="Carlos Quesada" userId="c0ed732e786a5da1" providerId="LiveId" clId="{9BD08692-A93F-4392-A80C-735B1850CC3F}" dt="2019-11-02T23:09:09.571" v="1164" actId="164"/>
-          <ac:spMkLst>
-            <pc:docMk/>
-            <pc:sldMk cId="2884005628" sldId="257"/>
-            <ac:spMk id="55" creationId="{3D26F115-CCC4-4C9B-BF1D-EBB096DE39AC}"/>
-          </ac:spMkLst>
-        </pc:spChg>
-        <pc:spChg chg="mod topLvl">
-          <ac:chgData name="Carlos Quesada" userId="c0ed732e786a5da1" providerId="LiveId" clId="{9BD08692-A93F-4392-A80C-735B1850CC3F}" dt="2019-11-02T23:09:09.571" v="1164" actId="164"/>
-          <ac:spMkLst>
-            <pc:docMk/>
-            <pc:sldMk cId="2884005628" sldId="257"/>
-            <ac:spMk id="56" creationId="{BBB1A6E6-B4A0-4F62-8F67-79E2F743C670}"/>
-          </ac:spMkLst>
-        </pc:spChg>
-        <pc:spChg chg="mod topLvl">
-          <ac:chgData name="Carlos Quesada" userId="c0ed732e786a5da1" providerId="LiveId" clId="{9BD08692-A93F-4392-A80C-735B1850CC3F}" dt="2019-11-02T23:09:09.571" v="1164" actId="164"/>
-          <ac:spMkLst>
-            <pc:docMk/>
-            <pc:sldMk cId="2884005628" sldId="257"/>
-            <ac:spMk id="57" creationId="{11F6B580-522D-4252-A0E5-3AA56E02C13C}"/>
-          </ac:spMkLst>
-        </pc:spChg>
-        <pc:spChg chg="del">
-          <ac:chgData name="Carlos Quesada" userId="c0ed732e786a5da1" providerId="LiveId" clId="{9BD08692-A93F-4392-A80C-735B1850CC3F}" dt="2019-11-02T23:02:07.545" v="1117" actId="478"/>
-          <ac:spMkLst>
-            <pc:docMk/>
-            <pc:sldMk cId="2884005628" sldId="257"/>
-            <ac:spMk id="58" creationId="{34DD2403-5C30-45D9-BF46-BDF6156B748E}"/>
-          </ac:spMkLst>
-        </pc:spChg>
-        <pc:spChg chg="mod">
-          <ac:chgData name="Carlos Quesada" userId="c0ed732e786a5da1" providerId="LiveId" clId="{9BD08692-A93F-4392-A80C-735B1850CC3F}" dt="2019-11-02T23:01:25.373" v="1105" actId="688"/>
-          <ac:spMkLst>
-            <pc:docMk/>
-            <pc:sldMk cId="2884005628" sldId="257"/>
-            <ac:spMk id="60" creationId="{300E1A2C-5AFF-45C1-879E-7401D8D27A83}"/>
-          </ac:spMkLst>
-        </pc:spChg>
-        <pc:spChg chg="del">
-          <ac:chgData name="Carlos Quesada" userId="c0ed732e786a5da1" providerId="LiveId" clId="{9BD08692-A93F-4392-A80C-735B1850CC3F}" dt="2019-11-02T23:01:47.082" v="1110" actId="478"/>
-          <ac:spMkLst>
-            <pc:docMk/>
-            <pc:sldMk cId="2884005628" sldId="257"/>
-            <ac:spMk id="61" creationId="{5A55245C-D418-4105-BF68-E07520CF1B1A}"/>
-          </ac:spMkLst>
-        </pc:spChg>
-        <pc:spChg chg="mod">
-          <ac:chgData name="Carlos Quesada" userId="c0ed732e786a5da1" providerId="LiveId" clId="{9BD08692-A93F-4392-A80C-735B1850CC3F}" dt="2019-11-02T23:01:35.752" v="1107" actId="688"/>
-          <ac:spMkLst>
-            <pc:docMk/>
-            <pc:sldMk cId="2884005628" sldId="257"/>
-            <ac:spMk id="63" creationId="{D0831941-F803-439B-B59B-DA9EC4174AC9}"/>
-          </ac:spMkLst>
-        </pc:spChg>
-        <pc:spChg chg="add mod">
-          <ac:chgData name="Carlos Quesada" userId="c0ed732e786a5da1" providerId="LiveId" clId="{9BD08692-A93F-4392-A80C-735B1850CC3F}" dt="2019-11-02T23:00:33.991" v="1099" actId="571"/>
-          <ac:spMkLst>
-            <pc:docMk/>
-            <pc:sldMk cId="2884005628" sldId="257"/>
-            <ac:spMk id="68" creationId="{74440286-56B1-4A49-9067-098DB0C1E359}"/>
-          </ac:spMkLst>
-        </pc:spChg>
-        <pc:spChg chg="add mod">
-          <ac:chgData name="Carlos Quesada" userId="c0ed732e786a5da1" providerId="LiveId" clId="{9BD08692-A93F-4392-A80C-735B1850CC3F}" dt="2019-11-02T23:09:09.571" v="1164" actId="164"/>
-          <ac:spMkLst>
-            <pc:docMk/>
-            <pc:sldMk cId="2884005628" sldId="257"/>
-            <ac:spMk id="74" creationId="{5AB04298-C14E-4076-8C46-2C98EE341872}"/>
-          </ac:spMkLst>
-        </pc:spChg>
-        <pc:spChg chg="add mod">
-          <ac:chgData name="Carlos Quesada" userId="c0ed732e786a5da1" providerId="LiveId" clId="{9BD08692-A93F-4392-A80C-735B1850CC3F}" dt="2019-11-02T23:09:09.571" v="1164" actId="164"/>
-          <ac:spMkLst>
-            <pc:docMk/>
-            <pc:sldMk cId="2884005628" sldId="257"/>
-            <ac:spMk id="75" creationId="{7C8BD9FF-1579-43F0-BF4A-93BF3476E66A}"/>
-          </ac:spMkLst>
-        </pc:spChg>
-        <pc:spChg chg="add mod">
-          <ac:chgData name="Carlos Quesada" userId="c0ed732e786a5da1" providerId="LiveId" clId="{9BD08692-A93F-4392-A80C-735B1850CC3F}" dt="2019-11-02T23:09:09.571" v="1164" actId="164"/>
-          <ac:spMkLst>
-            <pc:docMk/>
-            <pc:sldMk cId="2884005628" sldId="257"/>
-            <ac:spMk id="76" creationId="{1BBD185D-DF96-45E1-8CDD-33A1823FC94F}"/>
-          </ac:spMkLst>
-        </pc:spChg>
-        <pc:spChg chg="add mod ord">
-          <ac:chgData name="Carlos Quesada" userId="c0ed732e786a5da1" providerId="LiveId" clId="{9BD08692-A93F-4392-A80C-735B1850CC3F}" dt="2019-11-02T23:09:09.571" v="1164" actId="164"/>
-          <ac:spMkLst>
-            <pc:docMk/>
-            <pc:sldMk cId="2884005628" sldId="257"/>
-            <ac:spMk id="80" creationId="{358885FF-C92C-4100-9BE4-F3585FCBEAAF}"/>
-          </ac:spMkLst>
-        </pc:spChg>
-        <pc:grpChg chg="add del">
-          <ac:chgData name="Carlos Quesada" userId="c0ed732e786a5da1" providerId="LiveId" clId="{9BD08692-A93F-4392-A80C-735B1850CC3F}" dt="2019-11-02T23:09:12.155" v="1166" actId="478"/>
-          <ac:grpSpMkLst>
-            <pc:docMk/>
-            <pc:sldMk cId="2884005628" sldId="257"/>
-            <ac:grpSpMk id="4" creationId="{0DB0BC44-63B5-4E3D-A044-E979EBC4DBE2}"/>
-          </ac:grpSpMkLst>
-        </pc:grpChg>
-        <pc:grpChg chg="add del mod">
-          <ac:chgData name="Carlos Quesada" userId="c0ed732e786a5da1" providerId="LiveId" clId="{9BD08692-A93F-4392-A80C-735B1850CC3F}" dt="2019-11-02T23:00:27.170" v="1096" actId="165"/>
-          <ac:grpSpMkLst>
-            <pc:docMk/>
-            <pc:sldMk cId="2884005628" sldId="257"/>
-            <ac:grpSpMk id="35" creationId="{EF0E96EC-6243-451D-99B7-2ED8E0B48B24}"/>
-          </ac:grpSpMkLst>
-        </pc:grpChg>
-        <pc:grpChg chg="mod topLvl">
-          <ac:chgData name="Carlos Quesada" userId="c0ed732e786a5da1" providerId="LiveId" clId="{9BD08692-A93F-4392-A80C-735B1850CC3F}" dt="2019-11-02T23:09:09.571" v="1164" actId="164"/>
-          <ac:grpSpMkLst>
-            <pc:docMk/>
-            <pc:sldMk cId="2884005628" sldId="257"/>
-            <ac:grpSpMk id="40" creationId="{364BB78C-9CEA-4AA8-B469-E6A703C75AE0}"/>
-          </ac:grpSpMkLst>
-        </pc:grpChg>
-        <pc:grpChg chg="mod topLvl">
-          <ac:chgData name="Carlos Quesada" userId="c0ed732e786a5da1" providerId="LiveId" clId="{9BD08692-A93F-4392-A80C-735B1850CC3F}" dt="2019-11-02T23:09:09.571" v="1164" actId="164"/>
-          <ac:grpSpMkLst>
-            <pc:docMk/>
-            <pc:sldMk cId="2884005628" sldId="257"/>
-            <ac:grpSpMk id="42" creationId="{77348FA4-E091-4A89-B83F-1EF1B8461D2C}"/>
-          </ac:grpSpMkLst>
-        </pc:grpChg>
-        <pc:grpChg chg="del mod topLvl">
-          <ac:chgData name="Carlos Quesada" userId="c0ed732e786a5da1" providerId="LiveId" clId="{9BD08692-A93F-4392-A80C-735B1850CC3F}" dt="2019-11-02T23:02:07.545" v="1117" actId="478"/>
-          <ac:grpSpMkLst>
-            <pc:docMk/>
-            <pc:sldMk cId="2884005628" sldId="257"/>
-            <ac:grpSpMk id="45" creationId="{17B430B4-38BC-4962-9B55-4FDC650C03E5}"/>
-          </ac:grpSpMkLst>
-        </pc:grpChg>
-        <pc:grpChg chg="add del mod">
-          <ac:chgData name="Carlos Quesada" userId="c0ed732e786a5da1" providerId="LiveId" clId="{9BD08692-A93F-4392-A80C-735B1850CC3F}" dt="2019-11-02T23:02:18.599" v="1120" actId="165"/>
-          <ac:grpSpMkLst>
-            <pc:docMk/>
-            <pc:sldMk cId="2884005628" sldId="257"/>
-            <ac:grpSpMk id="69" creationId="{E1941ACA-208F-4F3C-921C-E006062ED827}"/>
-          </ac:grpSpMkLst>
-        </pc:grpChg>
-        <pc:grpChg chg="add del mod">
-          <ac:chgData name="Carlos Quesada" userId="c0ed732e786a5da1" providerId="LiveId" clId="{9BD08692-A93F-4392-A80C-735B1850CC3F}" dt="2019-11-02T23:09:10.519" v="1165"/>
-          <ac:grpSpMkLst>
-            <pc:docMk/>
-            <pc:sldMk cId="2884005628" sldId="257"/>
-            <ac:grpSpMk id="81" creationId="{62B2A3F7-0E92-4026-9183-C11D8EECAC0C}"/>
-          </ac:grpSpMkLst>
-        </pc:grpChg>
-        <pc:cxnChg chg="mod">
-          <ac:chgData name="Carlos Quesada" userId="c0ed732e786a5da1" providerId="LiveId" clId="{9BD08692-A93F-4392-A80C-735B1850CC3F}" dt="2019-11-02T23:09:12.155" v="1166" actId="478"/>
-          <ac:cxnSpMkLst>
-            <pc:docMk/>
-            <pc:sldMk cId="2884005628" sldId="257"/>
-            <ac:cxnSpMk id="8" creationId="{83B8CE71-4913-4870-9E3B-45DE023257CF}"/>
-          </ac:cxnSpMkLst>
-        </pc:cxnChg>
-        <pc:cxnChg chg="mod">
-          <ac:chgData name="Carlos Quesada" userId="c0ed732e786a5da1" providerId="LiveId" clId="{9BD08692-A93F-4392-A80C-735B1850CC3F}" dt="2019-11-02T23:09:12.155" v="1166" actId="478"/>
-          <ac:cxnSpMkLst>
-            <pc:docMk/>
-            <pc:sldMk cId="2884005628" sldId="257"/>
-            <ac:cxnSpMk id="15" creationId="{0349685D-E373-4F53-B094-552D4DB33160}"/>
-          </ac:cxnSpMkLst>
-        </pc:cxnChg>
-        <pc:cxnChg chg="mod">
-          <ac:chgData name="Carlos Quesada" userId="c0ed732e786a5da1" providerId="LiveId" clId="{9BD08692-A93F-4392-A80C-735B1850CC3F}" dt="2019-11-02T23:09:12.155" v="1166" actId="478"/>
-          <ac:cxnSpMkLst>
-            <pc:docMk/>
-            <pc:sldMk cId="2884005628" sldId="257"/>
-            <ac:cxnSpMk id="18" creationId="{E3AD60AA-106E-4B86-AA41-7AB700D427F2}"/>
-          </ac:cxnSpMkLst>
-        </pc:cxnChg>
-        <pc:cxnChg chg="mod">
-          <ac:chgData name="Carlos Quesada" userId="c0ed732e786a5da1" providerId="LiveId" clId="{9BD08692-A93F-4392-A80C-735B1850CC3F}" dt="2019-11-02T23:09:12.155" v="1166" actId="478"/>
-          <ac:cxnSpMkLst>
-            <pc:docMk/>
-            <pc:sldMk cId="2884005628" sldId="257"/>
-            <ac:cxnSpMk id="19" creationId="{BE409DCE-060A-4C2B-A211-F1402DE56C53}"/>
-          </ac:cxnSpMkLst>
-        </pc:cxnChg>
-        <pc:cxnChg chg="mod">
-          <ac:chgData name="Carlos Quesada" userId="c0ed732e786a5da1" providerId="LiveId" clId="{9BD08692-A93F-4392-A80C-735B1850CC3F}" dt="2019-11-02T23:09:12.155" v="1166" actId="478"/>
-          <ac:cxnSpMkLst>
-            <pc:docMk/>
-            <pc:sldMk cId="2884005628" sldId="257"/>
-            <ac:cxnSpMk id="20" creationId="{2CD4CD68-DF9E-44F8-A951-EE4F167B226E}"/>
-          </ac:cxnSpMkLst>
-        </pc:cxnChg>
-        <pc:cxnChg chg="mod">
-          <ac:chgData name="Carlos Quesada" userId="c0ed732e786a5da1" providerId="LiveId" clId="{9BD08692-A93F-4392-A80C-735B1850CC3F}" dt="2019-11-02T23:09:12.155" v="1166" actId="478"/>
-          <ac:cxnSpMkLst>
-            <pc:docMk/>
-            <pc:sldMk cId="2884005628" sldId="257"/>
-            <ac:cxnSpMk id="21" creationId="{580682E9-BDD1-46F1-9772-9074D62989F2}"/>
-          </ac:cxnSpMkLst>
-        </pc:cxnChg>
-        <pc:cxnChg chg="mod">
-          <ac:chgData name="Carlos Quesada" userId="c0ed732e786a5da1" providerId="LiveId" clId="{9BD08692-A93F-4392-A80C-735B1850CC3F}" dt="2019-11-02T23:09:12.155" v="1166" actId="478"/>
-          <ac:cxnSpMkLst>
-            <pc:docMk/>
-            <pc:sldMk cId="2884005628" sldId="257"/>
-            <ac:cxnSpMk id="22" creationId="{6E49C86E-AC72-4ED1-A40B-0BBBB94D126B}"/>
-          </ac:cxnSpMkLst>
-        </pc:cxnChg>
-        <pc:cxnChg chg="mod">
-          <ac:chgData name="Carlos Quesada" userId="c0ed732e786a5da1" providerId="LiveId" clId="{9BD08692-A93F-4392-A80C-735B1850CC3F}" dt="2019-11-02T23:09:12.155" v="1166" actId="478"/>
-          <ac:cxnSpMkLst>
-            <pc:docMk/>
-            <pc:sldMk cId="2884005628" sldId="257"/>
-            <ac:cxnSpMk id="23" creationId="{290A419E-F703-48C6-8F73-0A4C27134739}"/>
-          </ac:cxnSpMkLst>
-        </pc:cxnChg>
-        <pc:cxnChg chg="mod">
-          <ac:chgData name="Carlos Quesada" userId="c0ed732e786a5da1" providerId="LiveId" clId="{9BD08692-A93F-4392-A80C-735B1850CC3F}" dt="2019-11-02T23:09:12.155" v="1166" actId="478"/>
-          <ac:cxnSpMkLst>
-            <pc:docMk/>
-            <pc:sldMk cId="2884005628" sldId="257"/>
-            <ac:cxnSpMk id="28" creationId="{5E438425-6AE9-4087-BF36-CDE016DD688E}"/>
-          </ac:cxnSpMkLst>
-        </pc:cxnChg>
-        <pc:cxnChg chg="mod">
-          <ac:chgData name="Carlos Quesada" userId="c0ed732e786a5da1" providerId="LiveId" clId="{9BD08692-A93F-4392-A80C-735B1850CC3F}" dt="2019-11-02T23:09:12.155" v="1166" actId="478"/>
-          <ac:cxnSpMkLst>
-            <pc:docMk/>
-            <pc:sldMk cId="2884005628" sldId="257"/>
-            <ac:cxnSpMk id="34" creationId="{5FADA781-73C0-4A1E-B065-CE612FE46D92}"/>
-          </ac:cxnSpMkLst>
-        </pc:cxnChg>
-        <pc:cxnChg chg="mod topLvl">
-          <ac:chgData name="Carlos Quesada" userId="c0ed732e786a5da1" providerId="LiveId" clId="{9BD08692-A93F-4392-A80C-735B1850CC3F}" dt="2019-11-02T23:09:09.571" v="1164" actId="164"/>
-          <ac:cxnSpMkLst>
-            <pc:docMk/>
-            <pc:sldMk cId="2884005628" sldId="257"/>
-            <ac:cxnSpMk id="38" creationId="{75B82AF7-E7EE-4195-BECD-B638937D8DD2}"/>
-          </ac:cxnSpMkLst>
-        </pc:cxnChg>
-        <pc:cxnChg chg="mod topLvl">
-          <ac:chgData name="Carlos Quesada" userId="c0ed732e786a5da1" providerId="LiveId" clId="{9BD08692-A93F-4392-A80C-735B1850CC3F}" dt="2019-11-02T23:09:09.571" v="1164" actId="164"/>
-          <ac:cxnSpMkLst>
-            <pc:docMk/>
-            <pc:sldMk cId="2884005628" sldId="257"/>
-            <ac:cxnSpMk id="39" creationId="{FBDAF4B3-32BE-447C-9C23-98C3570EF4C6}"/>
-          </ac:cxnSpMkLst>
-        </pc:cxnChg>
-        <pc:cxnChg chg="mod topLvl">
-          <ac:chgData name="Carlos Quesada" userId="c0ed732e786a5da1" providerId="LiveId" clId="{9BD08692-A93F-4392-A80C-735B1850CC3F}" dt="2019-11-02T23:09:09.571" v="1164" actId="164"/>
-          <ac:cxnSpMkLst>
-            <pc:docMk/>
-            <pc:sldMk cId="2884005628" sldId="257"/>
-            <ac:cxnSpMk id="44" creationId="{9ED9BF79-5126-4F83-AC24-230E5630C38D}"/>
-          </ac:cxnSpMkLst>
-        </pc:cxnChg>
-        <pc:cxnChg chg="mod topLvl">
-          <ac:chgData name="Carlos Quesada" userId="c0ed732e786a5da1" providerId="LiveId" clId="{9BD08692-A93F-4392-A80C-735B1850CC3F}" dt="2019-11-02T23:09:09.571" v="1164" actId="164"/>
-          <ac:cxnSpMkLst>
-            <pc:docMk/>
-            <pc:sldMk cId="2884005628" sldId="257"/>
-            <ac:cxnSpMk id="46" creationId="{DC979EA9-5DB4-415D-AD91-E392D54385D6}"/>
-          </ac:cxnSpMkLst>
-        </pc:cxnChg>
-        <pc:cxnChg chg="mod topLvl">
-          <ac:chgData name="Carlos Quesada" userId="c0ed732e786a5da1" providerId="LiveId" clId="{9BD08692-A93F-4392-A80C-735B1850CC3F}" dt="2019-11-02T23:09:09.571" v="1164" actId="164"/>
-          <ac:cxnSpMkLst>
-            <pc:docMk/>
-            <pc:sldMk cId="2884005628" sldId="257"/>
-            <ac:cxnSpMk id="49" creationId="{11A54CC6-04EE-4965-ADB7-42F5A1CFF602}"/>
-          </ac:cxnSpMkLst>
-        </pc:cxnChg>
-        <pc:cxnChg chg="mod topLvl">
-          <ac:chgData name="Carlos Quesada" userId="c0ed732e786a5da1" providerId="LiveId" clId="{9BD08692-A93F-4392-A80C-735B1850CC3F}" dt="2019-11-02T23:09:09.571" v="1164" actId="164"/>
-          <ac:cxnSpMkLst>
-            <pc:docMk/>
-            <pc:sldMk cId="2884005628" sldId="257"/>
-            <ac:cxnSpMk id="50" creationId="{314FCAC7-916C-4523-B34E-A1B913CB0210}"/>
-          </ac:cxnSpMkLst>
-        </pc:cxnChg>
-        <pc:cxnChg chg="mod topLvl">
-          <ac:chgData name="Carlos Quesada" userId="c0ed732e786a5da1" providerId="LiveId" clId="{9BD08692-A93F-4392-A80C-735B1850CC3F}" dt="2019-11-02T23:09:09.571" v="1164" actId="164"/>
-          <ac:cxnSpMkLst>
-            <pc:docMk/>
-            <pc:sldMk cId="2884005628" sldId="257"/>
-            <ac:cxnSpMk id="51" creationId="{07512895-E80A-4CF7-B749-C641492737EB}"/>
-          </ac:cxnSpMkLst>
-        </pc:cxnChg>
-        <pc:cxnChg chg="mod topLvl">
-          <ac:chgData name="Carlos Quesada" userId="c0ed732e786a5da1" providerId="LiveId" clId="{9BD08692-A93F-4392-A80C-735B1850CC3F}" dt="2019-11-02T23:09:09.571" v="1164" actId="164"/>
-          <ac:cxnSpMkLst>
-            <pc:docMk/>
-            <pc:sldMk cId="2884005628" sldId="257"/>
-            <ac:cxnSpMk id="52" creationId="{5CEFCF29-DE45-45A2-983D-252B9BD3FCCA}"/>
-          </ac:cxnSpMkLst>
-        </pc:cxnChg>
-        <pc:cxnChg chg="mod topLvl">
-          <ac:chgData name="Carlos Quesada" userId="c0ed732e786a5da1" providerId="LiveId" clId="{9BD08692-A93F-4392-A80C-735B1850CC3F}" dt="2019-11-02T23:09:09.571" v="1164" actId="164"/>
-          <ac:cxnSpMkLst>
-            <pc:docMk/>
-            <pc:sldMk cId="2884005628" sldId="257"/>
-            <ac:cxnSpMk id="53" creationId="{30FFB093-2272-45A6-B417-66CCDA833189}"/>
-          </ac:cxnSpMkLst>
-        </pc:cxnChg>
-        <pc:cxnChg chg="mod topLvl">
-          <ac:chgData name="Carlos Quesada" userId="c0ed732e786a5da1" providerId="LiveId" clId="{9BD08692-A93F-4392-A80C-735B1850CC3F}" dt="2019-11-02T23:09:09.571" v="1164" actId="164"/>
-          <ac:cxnSpMkLst>
-            <pc:docMk/>
-            <pc:sldMk cId="2884005628" sldId="257"/>
-            <ac:cxnSpMk id="54" creationId="{85AEECCE-BB32-4F4E-AD71-873639DE6978}"/>
-          </ac:cxnSpMkLst>
-        </pc:cxnChg>
-        <pc:cxnChg chg="mod topLvl">
-          <ac:chgData name="Carlos Quesada" userId="c0ed732e786a5da1" providerId="LiveId" clId="{9BD08692-A93F-4392-A80C-735B1850CC3F}" dt="2019-11-02T23:09:09.571" v="1164" actId="164"/>
-          <ac:cxnSpMkLst>
-            <pc:docMk/>
-            <pc:sldMk cId="2884005628" sldId="257"/>
-            <ac:cxnSpMk id="59" creationId="{0EC27852-5CF5-44C5-9919-376840DA0778}"/>
-          </ac:cxnSpMkLst>
-        </pc:cxnChg>
-        <pc:cxnChg chg="mod">
-          <ac:chgData name="Carlos Quesada" userId="c0ed732e786a5da1" providerId="LiveId" clId="{9BD08692-A93F-4392-A80C-735B1850CC3F}" dt="2019-11-02T23:01:40.727" v="1108" actId="14100"/>
-          <ac:cxnSpMkLst>
-            <pc:docMk/>
-            <pc:sldMk cId="2884005628" sldId="257"/>
-            <ac:cxnSpMk id="65" creationId="{107CE6C9-009F-451B-9F4C-283F508C958B}"/>
-          </ac:cxnSpMkLst>
-        </pc:cxnChg>
-      </pc:sldChg>
-      <pc:sldChg chg="addSp delSp modSp add">
-        <pc:chgData name="Carlos Quesada" userId="c0ed732e786a5da1" providerId="LiveId" clId="{9BD08692-A93F-4392-A80C-735B1850CC3F}" dt="2019-11-05T02:51:48.846" v="2547" actId="20577"/>
-        <pc:sldMkLst>
-          <pc:docMk/>
-          <pc:sldMk cId="400130567" sldId="258"/>
-        </pc:sldMkLst>
-        <pc:spChg chg="del">
-          <ac:chgData name="Carlos Quesada" userId="c0ed732e786a5da1" providerId="LiveId" clId="{9BD08692-A93F-4392-A80C-735B1850CC3F}" dt="2019-11-05T00:04:45.866" v="1954" actId="478"/>
-          <ac:spMkLst>
-            <pc:docMk/>
-            <pc:sldMk cId="400130567" sldId="258"/>
-            <ac:spMk id="2" creationId="{769412F6-3D35-44EE-8C60-8258B96B295C}"/>
-          </ac:spMkLst>
-        </pc:spChg>
-        <pc:spChg chg="del">
-          <ac:chgData name="Carlos Quesada" userId="c0ed732e786a5da1" providerId="LiveId" clId="{9BD08692-A93F-4392-A80C-735B1850CC3F}" dt="2019-11-05T00:04:45.866" v="1954" actId="478"/>
-          <ac:spMkLst>
-            <pc:docMk/>
-            <pc:sldMk cId="400130567" sldId="258"/>
-            <ac:spMk id="3" creationId="{03D68E7B-7C9D-413E-ADD2-8448B2FB60A1}"/>
-          </ac:spMkLst>
-        </pc:spChg>
-        <pc:spChg chg="add mod">
-          <ac:chgData name="Carlos Quesada" userId="c0ed732e786a5da1" providerId="LiveId" clId="{9BD08692-A93F-4392-A80C-735B1850CC3F}" dt="2019-11-05T00:13:25.656" v="2072" actId="1076"/>
-          <ac:spMkLst>
-            <pc:docMk/>
-            <pc:sldMk cId="400130567" sldId="258"/>
-            <ac:spMk id="4" creationId="{AE538888-58C5-4BA5-B578-F6749CD8C0A4}"/>
-          </ac:spMkLst>
-        </pc:spChg>
-        <pc:spChg chg="add mod">
-          <ac:chgData name="Carlos Quesada" userId="c0ed732e786a5da1" providerId="LiveId" clId="{9BD08692-A93F-4392-A80C-735B1850CC3F}" dt="2019-11-05T02:51:48.846" v="2547" actId="20577"/>
-          <ac:spMkLst>
-            <pc:docMk/>
-            <pc:sldMk cId="400130567" sldId="258"/>
-            <ac:spMk id="5" creationId="{0D33ACAA-063D-41E8-AA1C-5A7462E1F460}"/>
-          </ac:spMkLst>
-        </pc:spChg>
-        <pc:spChg chg="add mod">
-          <ac:chgData name="Carlos Quesada" userId="c0ed732e786a5da1" providerId="LiveId" clId="{9BD08692-A93F-4392-A80C-735B1850CC3F}" dt="2019-11-05T02:49:34.135" v="2514" actId="14100"/>
-          <ac:spMkLst>
-            <pc:docMk/>
-            <pc:sldMk cId="400130567" sldId="258"/>
-            <ac:spMk id="6" creationId="{5F8ED6B4-7F10-44E5-92E0-01FDAF129E59}"/>
-          </ac:spMkLst>
-        </pc:spChg>
-        <pc:spChg chg="add mod">
-          <ac:chgData name="Carlos Quesada" userId="c0ed732e786a5da1" providerId="LiveId" clId="{9BD08692-A93F-4392-A80C-735B1850CC3F}" dt="2019-11-05T02:49:38.536" v="2515" actId="14100"/>
-          <ac:spMkLst>
-            <pc:docMk/>
-            <pc:sldMk cId="400130567" sldId="258"/>
-            <ac:spMk id="7" creationId="{F71E73FC-6E92-4592-B5D7-20C1A058E66D}"/>
-          </ac:spMkLst>
-        </pc:spChg>
-        <pc:spChg chg="add mod">
-          <ac:chgData name="Carlos Quesada" userId="c0ed732e786a5da1" providerId="LiveId" clId="{9BD08692-A93F-4392-A80C-735B1850CC3F}" dt="2019-11-05T00:13:25.656" v="2072" actId="1076"/>
-          <ac:spMkLst>
-            <pc:docMk/>
-            <pc:sldMk cId="400130567" sldId="258"/>
-            <ac:spMk id="8" creationId="{E285286A-CFFB-4B24-8357-F2BB8A1F90E3}"/>
-          </ac:spMkLst>
-        </pc:spChg>
-        <pc:spChg chg="add del">
-          <ac:chgData name="Carlos Quesada" userId="c0ed732e786a5da1" providerId="LiveId" clId="{9BD08692-A93F-4392-A80C-735B1850CC3F}" dt="2019-11-05T00:12:27.578" v="2060"/>
-          <ac:spMkLst>
-            <pc:docMk/>
-            <pc:sldMk cId="400130567" sldId="258"/>
-            <ac:spMk id="9" creationId="{966A8BD9-0A7E-4A2B-8415-9A865DBDBA34}"/>
-          </ac:spMkLst>
-        </pc:spChg>
-        <pc:spChg chg="add del mod">
-          <ac:chgData name="Carlos Quesada" userId="c0ed732e786a5da1" providerId="LiveId" clId="{9BD08692-A93F-4392-A80C-735B1850CC3F}" dt="2019-11-05T00:12:49.158" v="2067" actId="478"/>
-          <ac:spMkLst>
-            <pc:docMk/>
-            <pc:sldMk cId="400130567" sldId="258"/>
-            <ac:spMk id="10" creationId="{FBD69AD2-1DBF-4163-98BF-3E57B582BFDC}"/>
-          </ac:spMkLst>
-        </pc:spChg>
-        <pc:spChg chg="add del">
-          <ac:chgData name="Carlos Quesada" userId="c0ed732e786a5da1" providerId="LiveId" clId="{9BD08692-A93F-4392-A80C-735B1850CC3F}" dt="2019-11-05T00:12:34.529" v="2063"/>
-          <ac:spMkLst>
-            <pc:docMk/>
-            <pc:sldMk cId="400130567" sldId="258"/>
-            <ac:spMk id="11" creationId="{6BB42F58-5508-455F-8C8B-D1A576C990D5}"/>
-          </ac:spMkLst>
-        </pc:spChg>
-        <pc:spChg chg="add del mod">
-          <ac:chgData name="Carlos Quesada" userId="c0ed732e786a5da1" providerId="LiveId" clId="{9BD08692-A93F-4392-A80C-735B1850CC3F}" dt="2019-11-05T00:12:46.588" v="2066" actId="478"/>
-          <ac:spMkLst>
-            <pc:docMk/>
-            <pc:sldMk cId="400130567" sldId="258"/>
-            <ac:spMk id="12" creationId="{90CB0249-145C-4ACC-B433-DF91B675DF0F}"/>
-          </ac:spMkLst>
-        </pc:spChg>
-        <pc:spChg chg="add mod">
-          <ac:chgData name="Carlos Quesada" userId="c0ed732e786a5da1" providerId="LiveId" clId="{9BD08692-A93F-4392-A80C-735B1850CC3F}" dt="2019-11-05T00:13:19.203" v="2071" actId="14100"/>
-          <ac:spMkLst>
-            <pc:docMk/>
-            <pc:sldMk cId="400130567" sldId="258"/>
-            <ac:spMk id="13" creationId="{7E62EBCE-C087-4EE3-84A2-0340B41D26B9}"/>
-          </ac:spMkLst>
-        </pc:spChg>
-        <pc:spChg chg="add mod">
-          <ac:chgData name="Carlos Quesada" userId="c0ed732e786a5da1" providerId="LiveId" clId="{9BD08692-A93F-4392-A80C-735B1850CC3F}" dt="2019-11-05T00:39:32.652" v="2074" actId="1076"/>
-          <ac:spMkLst>
-            <pc:docMk/>
-            <pc:sldMk cId="400130567" sldId="258"/>
-            <ac:spMk id="14" creationId="{AAC6BD64-B5AE-4278-A2B6-6A1178C5DD34}"/>
-          </ac:spMkLst>
-        </pc:spChg>
-        <pc:spChg chg="add mod">
-          <ac:chgData name="Carlos Quesada" userId="c0ed732e786a5da1" providerId="LiveId" clId="{9BD08692-A93F-4392-A80C-735B1850CC3F}" dt="2019-11-05T00:52:47.719" v="2221" actId="13822"/>
-          <ac:spMkLst>
-            <pc:docMk/>
-            <pc:sldMk cId="400130567" sldId="258"/>
-            <ac:spMk id="15" creationId="{DB3152E5-EBB2-4AD8-9EFD-DEAA60D50C9C}"/>
-          </ac:spMkLst>
-        </pc:spChg>
-        <pc:spChg chg="add mod">
-          <ac:chgData name="Carlos Quesada" userId="c0ed732e786a5da1" providerId="LiveId" clId="{9BD08692-A93F-4392-A80C-735B1850CC3F}" dt="2019-11-05T00:52:59.507" v="2223" actId="2085"/>
-          <ac:spMkLst>
-            <pc:docMk/>
-            <pc:sldMk cId="400130567" sldId="258"/>
-            <ac:spMk id="16" creationId="{C693310C-AF41-4CC9-976E-454E5F0513C7}"/>
-          </ac:spMkLst>
-        </pc:spChg>
-        <pc:cxnChg chg="add mod">
-          <ac:chgData name="Carlos Quesada" userId="c0ed732e786a5da1" providerId="LiveId" clId="{9BD08692-A93F-4392-A80C-735B1850CC3F}" dt="2019-11-05T00:53:19.632" v="2226" actId="13822"/>
-          <ac:cxnSpMkLst>
-            <pc:docMk/>
-            <pc:sldMk cId="400130567" sldId="258"/>
-            <ac:cxnSpMk id="18" creationId="{36456A14-AD73-4154-91C3-FE1B54940B17}"/>
-          </ac:cxnSpMkLst>
-        </pc:cxnChg>
-      </pc:sldChg>
-      <pc:sldChg chg="modSp add">
-        <pc:chgData name="Carlos Quesada" userId="c0ed732e786a5da1" providerId="LiveId" clId="{9BD08692-A93F-4392-A80C-735B1850CC3F}" dt="2019-11-05T03:27:46.412" v="2598" actId="404"/>
-        <pc:sldMkLst>
-          <pc:docMk/>
-          <pc:sldMk cId="2295829730" sldId="259"/>
-        </pc:sldMkLst>
-        <pc:spChg chg="mod">
-          <ac:chgData name="Carlos Quesada" userId="c0ed732e786a5da1" providerId="LiveId" clId="{9BD08692-A93F-4392-A80C-735B1850CC3F}" dt="2019-11-05T00:57:21.160" v="2295" actId="20577"/>
-          <ac:spMkLst>
-            <pc:docMk/>
-            <pc:sldMk cId="2295829730" sldId="259"/>
-            <ac:spMk id="2" creationId="{CF905A3F-186B-4925-87F4-D78AD6038889}"/>
-          </ac:spMkLst>
-        </pc:spChg>
-        <pc:spChg chg="mod">
-          <ac:chgData name="Carlos Quesada" userId="c0ed732e786a5da1" providerId="LiveId" clId="{9BD08692-A93F-4392-A80C-735B1850CC3F}" dt="2019-11-05T03:27:46.412" v="2598" actId="404"/>
-          <ac:spMkLst>
-            <pc:docMk/>
-            <pc:sldMk cId="2295829730" sldId="259"/>
-            <ac:spMk id="3" creationId="{8493DC87-B7F5-4863-A066-16E5DFA6AB00}"/>
-          </ac:spMkLst>
-        </pc:spChg>
-      </pc:sldChg>
-      <pc:sldChg chg="addSp delSp modSp add">
-        <pc:chgData name="Carlos Quesada" userId="c0ed732e786a5da1" providerId="LiveId" clId="{9BD08692-A93F-4392-A80C-735B1850CC3F}" dt="2019-11-05T04:10:24.732" v="2633" actId="14100"/>
-        <pc:sldMkLst>
-          <pc:docMk/>
-          <pc:sldMk cId="619697819" sldId="260"/>
-        </pc:sldMkLst>
-        <pc:spChg chg="del">
-          <ac:chgData name="Carlos Quesada" userId="c0ed732e786a5da1" providerId="LiveId" clId="{9BD08692-A93F-4392-A80C-735B1850CC3F}" dt="2019-11-05T04:05:08.235" v="2600" actId="478"/>
-          <ac:spMkLst>
-            <pc:docMk/>
-            <pc:sldMk cId="619697819" sldId="260"/>
-            <ac:spMk id="2" creationId="{6817C317-FC00-418A-B261-B179842DBFF8}"/>
-          </ac:spMkLst>
-        </pc:spChg>
-        <pc:spChg chg="del">
-          <ac:chgData name="Carlos Quesada" userId="c0ed732e786a5da1" providerId="LiveId" clId="{9BD08692-A93F-4392-A80C-735B1850CC3F}" dt="2019-11-05T04:05:08.235" v="2600" actId="478"/>
-          <ac:spMkLst>
-            <pc:docMk/>
-            <pc:sldMk cId="619697819" sldId="260"/>
-            <ac:spMk id="3" creationId="{EEAB2233-18D1-43E9-A70E-A4F24F7A4DCD}"/>
-          </ac:spMkLst>
-        </pc:spChg>
-        <pc:spChg chg="add mod">
-          <ac:chgData name="Carlos Quesada" userId="c0ed732e786a5da1" providerId="LiveId" clId="{9BD08692-A93F-4392-A80C-735B1850CC3F}" dt="2019-11-05T04:10:02.432" v="2627" actId="14100"/>
-          <ac:spMkLst>
-            <pc:docMk/>
-            <pc:sldMk cId="619697819" sldId="260"/>
-            <ac:spMk id="5" creationId="{1FE94B99-3CF1-41CF-B9F2-10E6D43848FA}"/>
-          </ac:spMkLst>
-        </pc:spChg>
-        <pc:spChg chg="add mod">
-          <ac:chgData name="Carlos Quesada" userId="c0ed732e786a5da1" providerId="LiveId" clId="{9BD08692-A93F-4392-A80C-735B1850CC3F}" dt="2019-11-05T04:08:09.584" v="2615" actId="688"/>
-          <ac:spMkLst>
-            <pc:docMk/>
-            <pc:sldMk cId="619697819" sldId="260"/>
-            <ac:spMk id="6" creationId="{9434629E-B008-4291-BADD-3CB46D42DBA9}"/>
-          </ac:spMkLst>
-        </pc:spChg>
-        <pc:spChg chg="add mod">
-          <ac:chgData name="Carlos Quesada" userId="c0ed732e786a5da1" providerId="LiveId" clId="{9BD08692-A93F-4392-A80C-735B1850CC3F}" dt="2019-11-05T04:09:23.063" v="2618" actId="14100"/>
-          <ac:spMkLst>
-            <pc:docMk/>
-            <pc:sldMk cId="619697819" sldId="260"/>
-            <ac:spMk id="7" creationId="{DEA93F86-4A2B-4E1F-8DB2-13569B21AB74}"/>
-          </ac:spMkLst>
-        </pc:spChg>
-        <pc:spChg chg="add mod">
-          <ac:chgData name="Carlos Quesada" userId="c0ed732e786a5da1" providerId="LiveId" clId="{9BD08692-A93F-4392-A80C-735B1850CC3F}" dt="2019-11-05T04:10:24.732" v="2633" actId="14100"/>
-          <ac:spMkLst>
-            <pc:docMk/>
-            <pc:sldMk cId="619697819" sldId="260"/>
-            <ac:spMk id="8" creationId="{BCF05EBF-3344-429F-8C43-3ADC0AB95A59}"/>
-          </ac:spMkLst>
-        </pc:spChg>
-        <pc:picChg chg="add">
-          <ac:chgData name="Carlos Quesada" userId="c0ed732e786a5da1" providerId="LiveId" clId="{9BD08692-A93F-4392-A80C-735B1850CC3F}" dt="2019-11-05T04:05:09.404" v="2601"/>
-          <ac:picMkLst>
-            <pc:docMk/>
-            <pc:sldMk cId="619697819" sldId="260"/>
-            <ac:picMk id="4" creationId="{7001AFC6-D1BB-47C2-B733-018D9E4086AB}"/>
-          </ac:picMkLst>
-        </pc:picChg>
-      </pc:sldChg>
-    </pc:docChg>
-  </pc:docChgLst>
-</pc:chgInfo>
-</file>
-
 <file path=ppt/slideLayouts/slideLayout1.xml><?xml version="1.0" encoding="utf-8"?>
 <p:sldLayout xmlns:a="http://schemas.openxmlformats.org/drawingml/2006/main" xmlns:r="http://schemas.openxmlformats.org/officeDocument/2006/relationships" xmlns:p="http://schemas.openxmlformats.org/presentationml/2006/main" type="title" preserve="1">
   <p:cSld name="Title Slide">
@@ -2138,7 +266,7 @@
           <a:p>
             <a:fld id="{EA726304-1CAA-4280-8B62-A33B971AD302}" type="datetimeFigureOut">
               <a:rPr lang="en-US" smtClean="0"/>
-              <a:t>11/13/2019</a:t>
+              <a:t>11/15/2019</a:t>
             </a:fld>
             <a:endParaRPr lang="en-US"/>
           </a:p>
@@ -2336,7 +464,7 @@
           <a:p>
             <a:fld id="{EA726304-1CAA-4280-8B62-A33B971AD302}" type="datetimeFigureOut">
               <a:rPr lang="en-US" smtClean="0"/>
-              <a:t>11/13/2019</a:t>
+              <a:t>11/15/2019</a:t>
             </a:fld>
             <a:endParaRPr lang="en-US"/>
           </a:p>
@@ -2544,7 +672,7 @@
           <a:p>
             <a:fld id="{EA726304-1CAA-4280-8B62-A33B971AD302}" type="datetimeFigureOut">
               <a:rPr lang="en-US" smtClean="0"/>
-              <a:t>11/13/2019</a:t>
+              <a:t>11/15/2019</a:t>
             </a:fld>
             <a:endParaRPr lang="en-US"/>
           </a:p>
@@ -2742,7 +870,7 @@
           <a:p>
             <a:fld id="{EA726304-1CAA-4280-8B62-A33B971AD302}" type="datetimeFigureOut">
               <a:rPr lang="en-US" smtClean="0"/>
-              <a:t>11/13/2019</a:t>
+              <a:t>11/15/2019</a:t>
             </a:fld>
             <a:endParaRPr lang="en-US"/>
           </a:p>
@@ -3017,7 +1145,7 @@
           <a:p>
             <a:fld id="{EA726304-1CAA-4280-8B62-A33B971AD302}" type="datetimeFigureOut">
               <a:rPr lang="en-US" smtClean="0"/>
-              <a:t>11/13/2019</a:t>
+              <a:t>11/15/2019</a:t>
             </a:fld>
             <a:endParaRPr lang="en-US"/>
           </a:p>
@@ -3282,7 +1410,7 @@
           <a:p>
             <a:fld id="{EA726304-1CAA-4280-8B62-A33B971AD302}" type="datetimeFigureOut">
               <a:rPr lang="en-US" smtClean="0"/>
-              <a:t>11/13/2019</a:t>
+              <a:t>11/15/2019</a:t>
             </a:fld>
             <a:endParaRPr lang="en-US"/>
           </a:p>
@@ -3694,7 +1822,7 @@
           <a:p>
             <a:fld id="{EA726304-1CAA-4280-8B62-A33B971AD302}" type="datetimeFigureOut">
               <a:rPr lang="en-US" smtClean="0"/>
-              <a:t>11/13/2019</a:t>
+              <a:t>11/15/2019</a:t>
             </a:fld>
             <a:endParaRPr lang="en-US"/>
           </a:p>
@@ -3835,7 +1963,7 @@
           <a:p>
             <a:fld id="{EA726304-1CAA-4280-8B62-A33B971AD302}" type="datetimeFigureOut">
               <a:rPr lang="en-US" smtClean="0"/>
-              <a:t>11/13/2019</a:t>
+              <a:t>11/15/2019</a:t>
             </a:fld>
             <a:endParaRPr lang="en-US"/>
           </a:p>
@@ -3948,7 +2076,7 @@
           <a:p>
             <a:fld id="{EA726304-1CAA-4280-8B62-A33B971AD302}" type="datetimeFigureOut">
               <a:rPr lang="en-US" smtClean="0"/>
-              <a:t>11/13/2019</a:t>
+              <a:t>11/15/2019</a:t>
             </a:fld>
             <a:endParaRPr lang="en-US"/>
           </a:p>
@@ -4259,7 +2387,7 @@
           <a:p>
             <a:fld id="{EA726304-1CAA-4280-8B62-A33B971AD302}" type="datetimeFigureOut">
               <a:rPr lang="en-US" smtClean="0"/>
-              <a:t>11/13/2019</a:t>
+              <a:t>11/15/2019</a:t>
             </a:fld>
             <a:endParaRPr lang="en-US"/>
           </a:p>
@@ -4547,7 +2675,7 @@
           <a:p>
             <a:fld id="{EA726304-1CAA-4280-8B62-A33B971AD302}" type="datetimeFigureOut">
               <a:rPr lang="en-US" smtClean="0"/>
-              <a:t>11/13/2019</a:t>
+              <a:t>11/15/2019</a:t>
             </a:fld>
             <a:endParaRPr lang="en-US"/>
           </a:p>
@@ -4788,7 +2916,7 @@
           <a:p>
             <a:fld id="{EA726304-1CAA-4280-8B62-A33B971AD302}" type="datetimeFigureOut">
               <a:rPr lang="en-US" smtClean="0"/>
-              <a:t>11/13/2019</a:t>
+              <a:t>11/15/2019</a:t>
             </a:fld>
             <a:endParaRPr lang="en-US"/>
           </a:p>
@@ -9546,7 +7674,7 @@
         <p:spPr>
           <a:xfrm>
             <a:off x="683241" y="4007966"/>
-            <a:ext cx="4496744" cy="461665"/>
+            <a:ext cx="1402948" cy="461665"/>
           </a:xfrm>
           <a:prstGeom prst="rect">
             <a:avLst/>
@@ -9563,11 +7691,6 @@
               <a:rPr lang="en-US" sz="2400" dirty="0"/>
               <a:t>Sequence</a:t>
             </a:r>
-            <a:r>
-              <a:rPr lang="en-US" dirty="0"/>
-              <a:t> (Fix-forward, all solves required)</a:t>
-            </a:r>
-            <a:endParaRPr lang="en-US" sz="2400" dirty="0"/>
           </a:p>
         </p:txBody>
       </p:sp>
@@ -11122,19 +9245,6 @@
               <a:rPr lang="en-US" sz="2400" dirty="0"/>
               <a:t>Fallback</a:t>
             </a:r>
-            <a:r>
-              <a:rPr lang="en-US" dirty="0"/>
-              <a:t> (First </a:t>
-            </a:r>
-            <a:r>
-              <a:rPr lang="en-US" i="1" dirty="0"/>
-              <a:t>solve</a:t>
-            </a:r>
-            <a:r>
-              <a:rPr lang="en-US" dirty="0"/>
-              <a:t> ends sequence)</a:t>
-            </a:r>
-            <a:endParaRPr lang="en-US" sz="2400" dirty="0"/>
           </a:p>
         </p:txBody>
       </p:sp>

</xml_diff>